<commit_message>
bug fix + new instruction slides
</commit_message>
<xml_diff>
--- a/CSR APP Instruction.pptx
+++ b/CSR APP Instruction.pptx
@@ -5,16 +5,25 @@
     <p:sldMasterId id="2147483648" r:id="rId1"/>
   </p:sldMasterIdLst>
   <p:notesMasterIdLst>
-    <p:notesMasterId r:id="rId5"/>
+    <p:notesMasterId r:id="rId6"/>
   </p:notesMasterIdLst>
+  <p:handoutMasterIdLst>
+    <p:handoutMasterId r:id="rId17"/>
+  </p:handoutMasterIdLst>
   <p:sldIdLst>
     <p:sldId id="256" r:id="rId3"/>
-    <p:sldId id="258" r:id="rId4"/>
-    <p:sldId id="257" r:id="rId6"/>
-    <p:sldId id="259" r:id="rId7"/>
-    <p:sldId id="262" r:id="rId8"/>
-    <p:sldId id="260" r:id="rId9"/>
-    <p:sldId id="261" r:id="rId10"/>
+    <p:sldId id="262" r:id="rId4"/>
+    <p:sldId id="258" r:id="rId5"/>
+    <p:sldId id="269" r:id="rId7"/>
+    <p:sldId id="267" r:id="rId8"/>
+    <p:sldId id="268" r:id="rId9"/>
+    <p:sldId id="263" r:id="rId10"/>
+    <p:sldId id="264" r:id="rId11"/>
+    <p:sldId id="257" r:id="rId12"/>
+    <p:sldId id="265" r:id="rId13"/>
+    <p:sldId id="266" r:id="rId14"/>
+    <p:sldId id="260" r:id="rId15"/>
+    <p:sldId id="261" r:id="rId16"/>
   </p:sldIdLst>
   <p:sldSz cx="12192000" cy="6858000"/>
   <p:notesSz cx="6858000" cy="9144000"/>
@@ -116,7 +125,7 @@
   <p:extLst>
     <p:ext uri="{EFAFB233-063F-42B5-8137-9DF3F51BA10A}">
       <p15:sldGuideLst xmlns:p15="http://schemas.microsoft.com/office/powerpoint/2012/main">
-        <p15:guide id="1" orient="horz" pos="2159" userDrawn="1">
+        <p15:guide id="1" orient="horz" pos="2195" userDrawn="1">
           <p15:clr>
             <a:srgbClr val="A4A3A4"/>
           </p15:clr>
@@ -136,6 +145,164 @@
 <p:cmAuthorLst xmlns:a="http://schemas.openxmlformats.org/drawingml/2006/main" xmlns:r="http://schemas.openxmlformats.org/officeDocument/2006/relationships" xmlns:p="http://schemas.openxmlformats.org/presentationml/2006/main">
   <p:cmAuthor id="1" name="C Ho" initials="CH" lastIdx="0" clrIdx="0"/>
 </p:cmAuthorLst>
+</file>
+
+<file path=ppt/handoutMasters/handoutMaster1.xml><?xml version="1.0" encoding="utf-8"?>
+<p:handoutMaster xmlns:a="http://schemas.openxmlformats.org/drawingml/2006/main" xmlns:r="http://schemas.openxmlformats.org/officeDocument/2006/relationships" xmlns:p="http://schemas.openxmlformats.org/presentationml/2006/main">
+  <p:cSld>
+    <p:bg>
+      <p:bgRef idx="1001">
+        <a:schemeClr val="bg1"/>
+      </p:bgRef>
+    </p:bg>
+    <p:spTree>
+      <p:nvGrpSpPr>
+        <p:cNvPr id="1" name=""/>
+        <p:cNvGrpSpPr/>
+        <p:nvPr/>
+      </p:nvGrpSpPr>
+      <p:grpSpPr>
+        <a:xfrm>
+          <a:off x="0" y="0"/>
+          <a:ext cx="0" cy="0"/>
+          <a:chOff x="0" y="0"/>
+          <a:chExt cx="0" cy="0"/>
+        </a:xfrm>
+      </p:grpSpPr>
+      <p:sp>
+        <p:nvSpPr>
+          <p:cNvPr id="2" name="页眉占位符 1"/>
+          <p:cNvSpPr>
+            <a:spLocks noGrp="1"/>
+          </p:cNvSpPr>
+          <p:nvPr>
+            <p:ph type="hdr" sz="quarter"/>
+          </p:nvPr>
+        </p:nvSpPr>
+        <p:spPr>
+          <a:xfrm>
+            <a:off x="0" y="0"/>
+            <a:ext cx="2971800" cy="458788"/>
+          </a:xfrm>
+          <a:prstGeom prst="rect">
+            <a:avLst/>
+          </a:prstGeom>
+        </p:spPr>
+        <p:txBody>
+          <a:bodyPr vert="horz" lIns="91440" tIns="45720" rIns="91440" bIns="45720" rtlCol="0"/>
+          <a:lstStyle>
+            <a:lvl1pPr algn="l">
+              <a:defRPr sz="1200"/>
+            </a:lvl1pPr>
+          </a:lstStyle>
+          <a:p>
+            <a:endParaRPr lang="zh-CN" altLang="en-US"/>
+          </a:p>
+        </p:txBody>
+      </p:sp>
+      <p:sp>
+        <p:nvSpPr>
+          <p:cNvPr id="3" name="日期占位符 2"/>
+          <p:cNvSpPr>
+            <a:spLocks noGrp="1"/>
+          </p:cNvSpPr>
+          <p:nvPr>
+            <p:ph type="dt" sz="quarter" idx="1"/>
+          </p:nvPr>
+        </p:nvSpPr>
+        <p:spPr>
+          <a:xfrm>
+            <a:off x="3884613" y="0"/>
+            <a:ext cx="2971800" cy="458788"/>
+          </a:xfrm>
+          <a:prstGeom prst="rect">
+            <a:avLst/>
+          </a:prstGeom>
+        </p:spPr>
+        <p:txBody>
+          <a:bodyPr vert="horz" lIns="91440" tIns="45720" rIns="91440" bIns="45720" rtlCol="0"/>
+          <a:lstStyle>
+            <a:lvl1pPr algn="r">
+              <a:defRPr sz="1200"/>
+            </a:lvl1pPr>
+          </a:lstStyle>
+          <a:p>
+            <a:fld id="{0F9B84EA-7D68-4D60-9CB1-D50884785D1C}" type="datetimeFigureOut">
+              <a:rPr lang="zh-CN" altLang="en-US" smtClean="0"/>
+            </a:fld>
+            <a:endParaRPr lang="zh-CN" altLang="en-US"/>
+          </a:p>
+        </p:txBody>
+      </p:sp>
+      <p:sp>
+        <p:nvSpPr>
+          <p:cNvPr id="4" name="页脚占位符 3"/>
+          <p:cNvSpPr>
+            <a:spLocks noGrp="1"/>
+          </p:cNvSpPr>
+          <p:nvPr>
+            <p:ph type="ftr" sz="quarter" idx="2"/>
+          </p:nvPr>
+        </p:nvSpPr>
+        <p:spPr>
+          <a:xfrm>
+            <a:off x="0" y="8685213"/>
+            <a:ext cx="2971800" cy="458787"/>
+          </a:xfrm>
+          <a:prstGeom prst="rect">
+            <a:avLst/>
+          </a:prstGeom>
+        </p:spPr>
+        <p:txBody>
+          <a:bodyPr vert="horz" lIns="91440" tIns="45720" rIns="91440" bIns="45720" rtlCol="0" anchor="b"/>
+          <a:lstStyle>
+            <a:lvl1pPr algn="l">
+              <a:defRPr sz="1200"/>
+            </a:lvl1pPr>
+          </a:lstStyle>
+          <a:p>
+            <a:endParaRPr lang="zh-CN" altLang="en-US"/>
+          </a:p>
+        </p:txBody>
+      </p:sp>
+      <p:sp>
+        <p:nvSpPr>
+          <p:cNvPr id="5" name="灯片编号占位符 4"/>
+          <p:cNvSpPr>
+            <a:spLocks noGrp="1"/>
+          </p:cNvSpPr>
+          <p:nvPr>
+            <p:ph type="sldNum" sz="quarter" idx="3"/>
+          </p:nvPr>
+        </p:nvSpPr>
+        <p:spPr>
+          <a:xfrm>
+            <a:off x="3884613" y="8685213"/>
+            <a:ext cx="2971800" cy="458787"/>
+          </a:xfrm>
+          <a:prstGeom prst="rect">
+            <a:avLst/>
+          </a:prstGeom>
+        </p:spPr>
+        <p:txBody>
+          <a:bodyPr vert="horz" lIns="91440" tIns="45720" rIns="91440" bIns="45720" rtlCol="0" anchor="b"/>
+          <a:lstStyle>
+            <a:lvl1pPr algn="r">
+              <a:defRPr sz="1200"/>
+            </a:lvl1pPr>
+          </a:lstStyle>
+          <a:p>
+            <a:fld id="{8D4E0FC9-F1F8-4FAE-9988-3BA365CFD46F}" type="slidenum">
+              <a:rPr lang="zh-CN" altLang="en-US" smtClean="0"/>
+            </a:fld>
+            <a:endParaRPr lang="zh-CN" altLang="en-US"/>
+          </a:p>
+        </p:txBody>
+      </p:sp>
+    </p:spTree>
+  </p:cSld>
+  <p:clrMap bg1="lt1" tx1="dk1" bg2="lt2" tx2="dk2" accent1="accent1" accent2="accent2" accent3="accent3" accent4="accent4" accent5="accent5" accent6="accent6" hlink="hlink" folHlink="folHlink"/>
+</p:handoutMaster>
 </file>
 
 <file path=ppt/notesMasters/notesMaster1.xml><?xml version="1.0" encoding="utf-8"?>
@@ -3431,7 +3598,830 @@
 </p:sld>
 </file>
 
+<file path=ppt/slides/slide10.xml><?xml version="1.0" encoding="utf-8"?>
+<p:sld xmlns:a="http://schemas.openxmlformats.org/drawingml/2006/main" xmlns:r="http://schemas.openxmlformats.org/officeDocument/2006/relationships" xmlns:p="http://schemas.openxmlformats.org/presentationml/2006/main">
+  <p:cSld>
+    <p:spTree>
+      <p:nvGrpSpPr>
+        <p:cNvPr id="1" name=""/>
+        <p:cNvGrpSpPr/>
+        <p:nvPr/>
+      </p:nvGrpSpPr>
+      <p:grpSpPr/>
+      <p:sp>
+        <p:nvSpPr>
+          <p:cNvPr id="2" name="Title 1"/>
+          <p:cNvSpPr>
+            <a:spLocks noGrp="1"/>
+          </p:cNvSpPr>
+          <p:nvPr>
+            <p:ph type="title"/>
+          </p:nvPr>
+        </p:nvSpPr>
+        <p:spPr/>
+        <p:txBody>
+          <a:bodyPr/>
+          <a:p>
+            <a:r>
+              <a:rPr lang="en-US">
+                <a:sym typeface="+mn-ea"/>
+              </a:rPr>
+              <a:t>Step 3 -- Configure setting</a:t>
+            </a:r>
+            <a:endParaRPr lang="en-US"/>
+          </a:p>
+        </p:txBody>
+      </p:sp>
+      <p:sp>
+        <p:nvSpPr>
+          <p:cNvPr id="3" name="Content Placeholder 2"/>
+          <p:cNvSpPr>
+            <a:spLocks noGrp="1"/>
+          </p:cNvSpPr>
+          <p:nvPr>
+            <p:ph idx="1"/>
+          </p:nvPr>
+        </p:nvSpPr>
+        <p:spPr>
+          <a:xfrm>
+            <a:off x="521970" y="1825625"/>
+            <a:ext cx="11012805" cy="4351655"/>
+          </a:xfrm>
+        </p:spPr>
+        <p:txBody>
+          <a:bodyPr>
+            <a:noAutofit/>
+          </a:bodyPr>
+          <a:p>
+            <a:r>
+              <a:rPr lang="en-US" b="1"/>
+              <a:t>Global Optimum</a:t>
+            </a:r>
+            <a:r>
+              <a:rPr lang="en-US"/>
+              <a:t>: Select between Maximum, Minimum, Maximum absolute value and </a:t>
+            </a:r>
+            <a:r>
+              <a:rPr lang="en-US">
+                <a:sym typeface="+mn-ea"/>
+              </a:rPr>
+              <a:t>Minimum absolute value </a:t>
+            </a:r>
+            <a:endParaRPr lang="en-US">
+              <a:sym typeface="+mn-ea"/>
+            </a:endParaRPr>
+          </a:p>
+          <a:p>
+            <a:r>
+              <a:rPr lang="en-US" b="1">
+                <a:sym typeface="+mn-ea"/>
+              </a:rPr>
+              <a:t>Normalization</a:t>
+            </a:r>
+            <a:r>
+              <a:rPr lang="en-US">
+                <a:sym typeface="+mn-ea"/>
+              </a:rPr>
+              <a:t>: Select between [-1, 1] and  [0, 1]</a:t>
+            </a:r>
+            <a:endParaRPr lang="en-US">
+              <a:sym typeface="+mn-ea"/>
+            </a:endParaRPr>
+          </a:p>
+          <a:p>
+            <a:r>
+              <a:rPr lang="en-US">
+                <a:sym typeface="+mn-ea"/>
+              </a:rPr>
+              <a:t>In </a:t>
+            </a:r>
+            <a:r>
+              <a:rPr lang="en-US" b="1">
+                <a:sym typeface="+mn-ea"/>
+              </a:rPr>
+              <a:t>Number of control parameters</a:t>
+            </a:r>
+            <a:r>
+              <a:rPr lang="en-US">
+                <a:sym typeface="+mn-ea"/>
+              </a:rPr>
+              <a:t>, select the maximum number of parameters to include</a:t>
+            </a:r>
+            <a:endParaRPr lang="en-US">
+              <a:sym typeface="+mn-ea"/>
+            </a:endParaRPr>
+          </a:p>
+          <a:p>
+            <a:endParaRPr lang="en-US" b="1">
+              <a:sym typeface="+mn-ea"/>
+            </a:endParaRPr>
+          </a:p>
+        </p:txBody>
+      </p:sp>
+    </p:spTree>
+  </p:cSld>
+  <p:clrMapOvr>
+    <a:masterClrMapping/>
+  </p:clrMapOvr>
+</p:sld>
+</file>
+
+<file path=ppt/slides/slide11.xml><?xml version="1.0" encoding="utf-8"?>
+<p:sld xmlns:a="http://schemas.openxmlformats.org/drawingml/2006/main" xmlns:r="http://schemas.openxmlformats.org/officeDocument/2006/relationships" xmlns:p="http://schemas.openxmlformats.org/presentationml/2006/main">
+  <p:cSld>
+    <p:spTree>
+      <p:nvGrpSpPr>
+        <p:cNvPr id="1" name=""/>
+        <p:cNvGrpSpPr/>
+        <p:nvPr/>
+      </p:nvGrpSpPr>
+      <p:grpSpPr/>
+      <p:sp>
+        <p:nvSpPr>
+          <p:cNvPr id="2" name="Title 1"/>
+          <p:cNvSpPr>
+            <a:spLocks noGrp="1"/>
+          </p:cNvSpPr>
+          <p:nvPr>
+            <p:ph type="title"/>
+          </p:nvPr>
+        </p:nvSpPr>
+        <p:spPr/>
+        <p:txBody>
+          <a:bodyPr/>
+          <a:p>
+            <a:r>
+              <a:rPr lang="en-US">
+                <a:sym typeface="+mn-ea"/>
+              </a:rPr>
+              <a:t>Step 3 -- Configure setting</a:t>
+            </a:r>
+            <a:endParaRPr lang="en-US"/>
+          </a:p>
+        </p:txBody>
+      </p:sp>
+      <p:sp>
+        <p:nvSpPr>
+          <p:cNvPr id="3" name="Content Placeholder 2"/>
+          <p:cNvSpPr>
+            <a:spLocks noGrp="1"/>
+          </p:cNvSpPr>
+          <p:nvPr>
+            <p:ph idx="1"/>
+          </p:nvPr>
+        </p:nvSpPr>
+        <p:spPr>
+          <a:xfrm>
+            <a:off x="521970" y="1825625"/>
+            <a:ext cx="11012805" cy="4351655"/>
+          </a:xfrm>
+        </p:spPr>
+        <p:txBody>
+          <a:bodyPr>
+            <a:noAutofit/>
+          </a:bodyPr>
+          <a:p>
+            <a:r>
+              <a:rPr lang="en-US" altLang="zh-CN">
+                <a:sym typeface="+mn-ea"/>
+              </a:rPr>
+              <a:t>Multiple objective optimization: under </a:t>
+            </a:r>
+            <a:r>
+              <a:rPr lang="en-US" altLang="zh-CN" b="1">
+                <a:sym typeface="+mn-ea"/>
+              </a:rPr>
+              <a:t>Parameter Selection and Factor Inclusion</a:t>
+            </a:r>
+            <a:r>
+              <a:rPr lang="en-US" altLang="zh-CN">
+                <a:sym typeface="+mn-ea"/>
+              </a:rPr>
+              <a:t>, select if the parameter belongs to factor, result, or ignore</a:t>
+            </a:r>
+            <a:endParaRPr lang="en-US" altLang="zh-CN">
+              <a:sym typeface="+mn-ea"/>
+            </a:endParaRPr>
+          </a:p>
+          <a:p>
+            <a:r>
+              <a:rPr lang="en-US" altLang="zh-CN">
+                <a:sym typeface="+mn-ea"/>
+              </a:rPr>
+              <a:t>If a factor limitation is to be set, navigate to </a:t>
+            </a:r>
+            <a:r>
+              <a:rPr lang="en-US" altLang="zh-CN" b="1">
+                <a:sym typeface="+mn-ea"/>
+              </a:rPr>
+              <a:t>Factor Limits Section</a:t>
+            </a:r>
+            <a:r>
+              <a:rPr lang="en-US" altLang="zh-CN">
+                <a:sym typeface="+mn-ea"/>
+              </a:rPr>
+              <a:t>, select if the factor should be excluded or included in that limit, then set limit value at </a:t>
+            </a:r>
+            <a:r>
+              <a:rPr lang="en-US" altLang="zh-CN" b="1">
+                <a:sym typeface="+mn-ea"/>
+              </a:rPr>
+              <a:t>CSR Factor Limits</a:t>
+            </a:r>
+            <a:r>
+              <a:rPr lang="en-US" altLang="zh-CN">
+                <a:sym typeface="+mn-ea"/>
+              </a:rPr>
+              <a:t>, click add limit</a:t>
+            </a:r>
+            <a:endParaRPr lang="en-US" altLang="zh-CN">
+              <a:sym typeface="+mn-ea"/>
+            </a:endParaRPr>
+          </a:p>
+          <a:p>
+            <a:r>
+              <a:rPr lang="en-US" altLang="zh-CN">
+                <a:sym typeface="+mn-ea"/>
+              </a:rPr>
+              <a:t>After all is set, click on </a:t>
+            </a:r>
+            <a:r>
+              <a:rPr lang="en-US" altLang="zh-CN" b="1">
+                <a:sym typeface="+mn-ea"/>
+              </a:rPr>
+              <a:t>Run Fitting Process</a:t>
+            </a:r>
+            <a:endParaRPr lang="en-US" altLang="zh-CN">
+              <a:sym typeface="+mn-ea"/>
+            </a:endParaRPr>
+          </a:p>
+          <a:p>
+            <a:endParaRPr lang="en-US" altLang="zh-CN">
+              <a:sym typeface="+mn-ea"/>
+            </a:endParaRPr>
+          </a:p>
+        </p:txBody>
+      </p:sp>
+    </p:spTree>
+  </p:cSld>
+  <p:clrMapOvr>
+    <a:masterClrMapping/>
+  </p:clrMapOvr>
+</p:sld>
+</file>
+
+<file path=ppt/slides/slide12.xml><?xml version="1.0" encoding="utf-8"?>
+<p:sld xmlns:a="http://schemas.openxmlformats.org/drawingml/2006/main" xmlns:r="http://schemas.openxmlformats.org/officeDocument/2006/relationships" xmlns:p="http://schemas.openxmlformats.org/presentationml/2006/main">
+  <p:cSld>
+    <p:spTree>
+      <p:nvGrpSpPr>
+        <p:cNvPr id="1" name=""/>
+        <p:cNvGrpSpPr/>
+        <p:nvPr/>
+      </p:nvGrpSpPr>
+      <p:grpSpPr/>
+      <p:sp>
+        <p:nvSpPr>
+          <p:cNvPr id="2" name="Title 1"/>
+          <p:cNvSpPr>
+            <a:spLocks noGrp="1"/>
+          </p:cNvSpPr>
+          <p:nvPr>
+            <p:ph type="title"/>
+          </p:nvPr>
+        </p:nvSpPr>
+        <p:spPr/>
+        <p:txBody>
+          <a:bodyPr/>
+          <a:p>
+            <a:r>
+              <a:rPr lang="en-US">
+                <a:sym typeface="+mn-ea"/>
+              </a:rPr>
+              <a:t>Step 4 -- Result display</a:t>
+            </a:r>
+            <a:endParaRPr lang="en-US"/>
+          </a:p>
+        </p:txBody>
+      </p:sp>
+      <p:sp>
+        <p:nvSpPr>
+          <p:cNvPr id="3" name="Content Placeholder 2"/>
+          <p:cNvSpPr>
+            <a:spLocks noGrp="1"/>
+          </p:cNvSpPr>
+          <p:nvPr>
+            <p:ph idx="1"/>
+          </p:nvPr>
+        </p:nvSpPr>
+        <p:spPr>
+          <a:xfrm>
+            <a:off x="838200" y="1825625"/>
+            <a:ext cx="10515600" cy="4940935"/>
+          </a:xfrm>
+        </p:spPr>
+        <p:txBody>
+          <a:bodyPr>
+            <a:normAutofit lnSpcReduction="20000"/>
+          </a:bodyPr>
+          <a:p>
+            <a:pPr fontAlgn="auto">
+              <a:lnSpc>
+                <a:spcPct val="90000"/>
+              </a:lnSpc>
+              <a:spcBef>
+                <a:spcPts val="1300"/>
+              </a:spcBef>
+            </a:pPr>
+            <a:r>
+              <a:rPr lang="en-US" altLang="en-US" b="1"/>
+              <a:t>CSR Function</a:t>
+            </a:r>
+            <a:r>
+              <a:rPr lang="en-US" altLang="en-US"/>
+              <a:t> displays the numerical expression of the fitted function.</a:t>
+            </a:r>
+            <a:endParaRPr lang="en-US" altLang="en-US"/>
+          </a:p>
+          <a:p>
+            <a:pPr fontAlgn="auto">
+              <a:lnSpc>
+                <a:spcPct val="90000"/>
+              </a:lnSpc>
+              <a:spcBef>
+                <a:spcPts val="1300"/>
+              </a:spcBef>
+            </a:pPr>
+            <a:r>
+              <a:rPr lang="en-US" altLang="en-US" b="1"/>
+              <a:t>Factor Definitions</a:t>
+            </a:r>
+            <a:r>
+              <a:rPr lang="en-US" altLang="en-US"/>
+              <a:t> list the names of the parameters used in the function.</a:t>
+            </a:r>
+            <a:endParaRPr lang="en-US" altLang="en-US"/>
+          </a:p>
+          <a:p>
+            <a:pPr fontAlgn="auto">
+              <a:lnSpc>
+                <a:spcPct val="90000"/>
+              </a:lnSpc>
+              <a:spcBef>
+                <a:spcPts val="1300"/>
+              </a:spcBef>
+            </a:pPr>
+            <a:r>
+              <a:rPr lang="en-US" altLang="en-US" b="1"/>
+              <a:t>Extremum</a:t>
+            </a:r>
+            <a:r>
+              <a:rPr lang="en-US" altLang="en-US"/>
+              <a:t> indicates the maximum/minimum point of the plot. If multiple result columns are selected, then </a:t>
+            </a:r>
+            <a:r>
+              <a:rPr lang="en-US" altLang="en-US" b="1"/>
+              <a:t>Individual Results at Extremum</a:t>
+            </a:r>
+            <a:r>
+              <a:rPr lang="en-US" altLang="en-US"/>
+              <a:t> will be shown below</a:t>
+            </a:r>
+            <a:endParaRPr lang="en-US" altLang="en-US"/>
+          </a:p>
+          <a:p>
+            <a:pPr fontAlgn="auto">
+              <a:lnSpc>
+                <a:spcPct val="90000"/>
+              </a:lnSpc>
+              <a:spcBef>
+                <a:spcPts val="1300"/>
+              </a:spcBef>
+            </a:pPr>
+            <a:r>
+              <a:rPr lang="en-US" altLang="en-US" b="1"/>
+              <a:t>Model Fit</a:t>
+            </a:r>
+            <a:r>
+              <a:rPr lang="en-US" altLang="en-US"/>
+              <a:t> provides the R-square value of the model</a:t>
+            </a:r>
+            <a:endParaRPr lang="en-US" altLang="en-US"/>
+          </a:p>
+          <a:p>
+            <a:pPr fontAlgn="auto">
+              <a:lnSpc>
+                <a:spcPct val="90000"/>
+              </a:lnSpc>
+              <a:spcBef>
+                <a:spcPts val="1300"/>
+              </a:spcBef>
+            </a:pPr>
+            <a:r>
+              <a:rPr lang="en-US" altLang="en-US" b="1"/>
+              <a:t>Actual vs. Predicted Values</a:t>
+            </a:r>
+            <a:r>
+              <a:rPr lang="en-US" altLang="en-US"/>
+              <a:t> presents the deviations between predicted outcomes and observed data.</a:t>
+            </a:r>
+            <a:endParaRPr lang="en-US" altLang="en-US"/>
+          </a:p>
+          <a:p>
+            <a:pPr fontAlgn="auto">
+              <a:lnSpc>
+                <a:spcPct val="90000"/>
+              </a:lnSpc>
+              <a:spcBef>
+                <a:spcPts val="1300"/>
+              </a:spcBef>
+            </a:pPr>
+            <a:r>
+              <a:rPr lang="en-US" altLang="en-US" b="1"/>
+              <a:t>CSR Function Surface Plot</a:t>
+            </a:r>
+            <a:r>
+              <a:rPr lang="en-US" altLang="en-US"/>
+              <a:t> provides a graphical representation of the fitted CSR function.</a:t>
+            </a:r>
+            <a:endParaRPr lang="en-US" altLang="en-US"/>
+          </a:p>
+        </p:txBody>
+      </p:sp>
+    </p:spTree>
+  </p:cSld>
+  <p:clrMapOvr>
+    <a:masterClrMapping/>
+  </p:clrMapOvr>
+</p:sld>
+</file>
+
+<file path=ppt/slides/slide13.xml><?xml version="1.0" encoding="utf-8"?>
+<p:sld xmlns:a="http://schemas.openxmlformats.org/drawingml/2006/main" xmlns:r="http://schemas.openxmlformats.org/officeDocument/2006/relationships" xmlns:p="http://schemas.openxmlformats.org/presentationml/2006/main">
+  <p:cSld>
+    <p:spTree>
+      <p:nvGrpSpPr>
+        <p:cNvPr id="1" name=""/>
+        <p:cNvGrpSpPr/>
+        <p:nvPr/>
+      </p:nvGrpSpPr>
+      <p:grpSpPr/>
+      <p:sp>
+        <p:nvSpPr>
+          <p:cNvPr id="2" name="Title 1"/>
+          <p:cNvSpPr>
+            <a:spLocks noGrp="1"/>
+          </p:cNvSpPr>
+          <p:nvPr>
+            <p:ph type="title"/>
+          </p:nvPr>
+        </p:nvSpPr>
+        <p:spPr/>
+        <p:txBody>
+          <a:bodyPr/>
+          <a:p>
+            <a:r>
+              <a:rPr lang="en-US">
+                <a:sym typeface="+mn-ea"/>
+              </a:rPr>
+              <a:t>Step 5 -- Coefficient analysis</a:t>
+            </a:r>
+            <a:endParaRPr lang="en-US"/>
+          </a:p>
+        </p:txBody>
+      </p:sp>
+      <mc:AlternateContent xmlns:mc="http://schemas.openxmlformats.org/markup-compatibility/2006">
+        <mc:Choice xmlns:a14="http://schemas.microsoft.com/office/drawing/2010/main" Requires="a14">
+          <p:sp>
+            <p:nvSpPr>
+              <p:cNvPr id="3" name="Content Placeholder 2"/>
+              <p:cNvSpPr>
+                <a:spLocks noGrp="1"/>
+              </p:cNvSpPr>
+              <p:nvPr>
+                <p:ph idx="1"/>
+              </p:nvPr>
+            </p:nvSpPr>
+            <p:spPr/>
+            <p:txBody>
+              <a:bodyPr/>
+              <a:p>
+                <a:r>
+                  <a:rPr lang="en-US" altLang="en-US">
+                    <a:sym typeface="+mn-ea"/>
+                  </a:rPr>
+                  <a:t>Navigate to the</a:t>
+                </a:r>
+                <a:r>
+                  <a:rPr lang="en-US">
+                    <a:sym typeface="+mn-ea"/>
+                  </a:rPr>
+                  <a:t> </a:t>
+                </a:r>
+                <a:r>
+                  <a:rPr lang="en-US" b="1">
+                    <a:sym typeface="+mn-ea"/>
+                  </a:rPr>
+                  <a:t>Coefficient analysis</a:t>
+                </a:r>
+                <a:r>
+                  <a:rPr lang="en-US">
+                    <a:sym typeface="+mn-ea"/>
+                  </a:rPr>
+                  <a:t> tab after fitting is complete</a:t>
+                </a:r>
+                <a:endParaRPr lang="en-US">
+                  <a:sym typeface="+mn-ea"/>
+                </a:endParaRPr>
+              </a:p>
+              <a:p>
+                <a:r>
+                  <a:rPr lang="en-US">
+                    <a:sym typeface="+mn-ea"/>
+                  </a:rPr>
+                  <a:t>In </a:t>
+                </a:r>
+                <a:r>
+                  <a:rPr lang="en-US" b="1">
+                    <a:sym typeface="+mn-ea"/>
+                  </a:rPr>
+                  <a:t>Analysis Controls </a:t>
+                </a:r>
+                <a:r>
+                  <a:rPr lang="en-US">
+                    <a:sym typeface="+mn-ea"/>
+                  </a:rPr>
+                  <a:t>select whether the coefficient shall be determined when the factors are at minimum, maximum or extremum</a:t>
+                </a:r>
+                <a:endParaRPr lang="en-US">
+                  <a:sym typeface="+mn-ea"/>
+                </a:endParaRPr>
+              </a:p>
+              <a:p>
+                <a:r>
+                  <a:rPr lang="en-US"/>
+                  <a:t>The pie charts demonstrate the distribution of the coefficient absolute values in terms of linear (</a:t>
+                </a:r>
+                <a14:m>
+                  <m:oMath xmlns:m="http://schemas.openxmlformats.org/officeDocument/2006/math">
+                    <m:r>
+                      <a:rPr lang="en-US" i="1">
+                        <a:latin typeface="Cambria Math" panose="02040503050406030204" charset="0"/>
+                        <a:cs typeface="Cambria Math" panose="02040503050406030204" charset="0"/>
+                      </a:rPr>
+                      <m:t>𝑓</m:t>
+                    </m:r>
+                  </m:oMath>
+                </a14:m>
+                <a:r>
+                  <a:rPr lang="en-US"/>
+                  <a:t>), quadratic (</a:t>
+                </a:r>
+                <a14:m>
+                  <m:oMath xmlns:m="http://schemas.openxmlformats.org/officeDocument/2006/math">
+                    <m:sSup>
+                      <m:sSupPr>
+                        <m:ctrlPr>
+                          <a:rPr lang="en-US" i="1">
+                            <a:latin typeface="Cambria Math" panose="02040503050406030204" charset="0"/>
+                            <a:cs typeface="Cambria Math" panose="02040503050406030204" charset="0"/>
+                          </a:rPr>
+                        </m:ctrlPr>
+                      </m:sSupPr>
+                      <m:e>
+                        <m:r>
+                          <a:rPr lang="en-US" i="1">
+                            <a:latin typeface="Cambria Math" panose="02040503050406030204" charset="0"/>
+                            <a:cs typeface="Cambria Math" panose="02040503050406030204" charset="0"/>
+                          </a:rPr>
+                          <m:t>𝑓</m:t>
+                        </m:r>
+                      </m:e>
+                      <m:sup>
+                        <m:r>
+                          <a:rPr lang="en-US" i="1">
+                            <a:latin typeface="Cambria Math" panose="02040503050406030204" charset="0"/>
+                            <a:cs typeface="Cambria Math" panose="02040503050406030204" charset="0"/>
+                          </a:rPr>
+                          <m:t>2</m:t>
+                        </m:r>
+                      </m:sup>
+                    </m:sSup>
+                  </m:oMath>
+                </a14:m>
+                <a:r>
+                  <a:rPr lang="en-US"/>
+                  <a:t>) and interactions (</a:t>
+                </a:r>
+                <a14:m>
+                  <m:oMath xmlns:m="http://schemas.openxmlformats.org/officeDocument/2006/math">
+                    <m:sSub>
+                      <m:sSubPr>
+                        <m:ctrlPr>
+                          <a:rPr lang="en-US" i="1">
+                            <a:latin typeface="Cambria Math" panose="02040503050406030204" charset="0"/>
+                            <a:cs typeface="Cambria Math" panose="02040503050406030204" charset="0"/>
+                          </a:rPr>
+                        </m:ctrlPr>
+                      </m:sSubPr>
+                      <m:e>
+                        <m:r>
+                          <a:rPr lang="en-US" i="1">
+                            <a:latin typeface="Cambria Math" panose="02040503050406030204" charset="0"/>
+                            <a:cs typeface="Cambria Math" panose="02040503050406030204" charset="0"/>
+                          </a:rPr>
+                          <m:t>𝑓</m:t>
+                        </m:r>
+                      </m:e>
+                      <m:sub>
+                        <m:r>
+                          <a:rPr lang="en-US" i="1">
+                            <a:latin typeface="Cambria Math" panose="02040503050406030204" charset="0"/>
+                            <a:cs typeface="Cambria Math" panose="02040503050406030204" charset="0"/>
+                          </a:rPr>
+                          <m:t>1</m:t>
+                        </m:r>
+                      </m:sub>
+                    </m:sSub>
+                    <m:sSub>
+                      <m:sSubPr>
+                        <m:ctrlPr>
+                          <a:rPr lang="en-US" i="1">
+                            <a:latin typeface="Cambria Math" panose="02040503050406030204" charset="0"/>
+                            <a:cs typeface="Cambria Math" panose="02040503050406030204" charset="0"/>
+                          </a:rPr>
+                        </m:ctrlPr>
+                      </m:sSubPr>
+                      <m:e>
+                        <m:r>
+                          <a:rPr lang="en-US" i="1">
+                            <a:latin typeface="Cambria Math" panose="02040503050406030204" charset="0"/>
+                            <a:cs typeface="Cambria Math" panose="02040503050406030204" charset="0"/>
+                          </a:rPr>
+                          <m:t>𝑓</m:t>
+                        </m:r>
+                      </m:e>
+                      <m:sub>
+                        <m:r>
+                          <a:rPr lang="en-US" i="1">
+                            <a:latin typeface="Cambria Math" panose="02040503050406030204" charset="0"/>
+                            <a:cs typeface="Cambria Math" panose="02040503050406030204" charset="0"/>
+                          </a:rPr>
+                          <m:t>2</m:t>
+                        </m:r>
+                      </m:sub>
+                    </m:sSub>
+                  </m:oMath>
+                </a14:m>
+                <a:r>
+                  <a:rPr lang="en-US"/>
+                  <a:t>)</a:t>
+                </a:r>
+                <a:endParaRPr lang="en-US"/>
+              </a:p>
+            </p:txBody>
+          </p:sp>
+        </mc:Choice>
+        <mc:Fallback>
+          <p:sp>
+            <p:nvSpPr>
+              <p:cNvPr id="3" name="Content Placeholder 2"/>
+              <p:cNvSpPr>
+                <a:spLocks noRot="1" noChangeAspect="1" noMove="1" noResize="1" noEditPoints="1" noAdjustHandles="1" noChangeArrowheads="1" noChangeShapeType="1" noTextEdit="1"/>
+              </p:cNvSpPr>
+              <p:nvPr>
+                <p:ph idx="1"/>
+              </p:nvPr>
+            </p:nvSpPr>
+            <p:spPr>
+              <a:blipFill rotWithShape="1">
+                <a:blip r:embed="rId1"/>
+                <a:stretch>
+                  <a:fillRect b="7"/>
+                </a:stretch>
+              </a:blipFill>
+            </p:spPr>
+            <p:txBody>
+              <a:bodyPr/>
+              <a:lstStyle/>
+              <a:p>
+                <a:r>
+                  <a:rPr lang="zh-CN" altLang="en-US">
+                    <a:noFill/>
+                  </a:rPr>
+                  <a:t> </a:t>
+                </a:r>
+              </a:p>
+            </p:txBody>
+          </p:sp>
+        </mc:Fallback>
+      </mc:AlternateContent>
+    </p:spTree>
+  </p:cSld>
+  <p:clrMapOvr>
+    <a:masterClrMapping/>
+  </p:clrMapOvr>
+</p:sld>
+</file>
+
 <file path=ppt/slides/slide2.xml><?xml version="1.0" encoding="utf-8"?>
+<p:sld xmlns:a="http://schemas.openxmlformats.org/drawingml/2006/main" xmlns:r="http://schemas.openxmlformats.org/officeDocument/2006/relationships" xmlns:p="http://schemas.openxmlformats.org/presentationml/2006/main">
+  <p:cSld>
+    <p:spTree>
+      <p:nvGrpSpPr>
+        <p:cNvPr id="1" name=""/>
+        <p:cNvGrpSpPr/>
+        <p:nvPr/>
+      </p:nvGrpSpPr>
+      <p:grpSpPr/>
+      <p:sp>
+        <p:nvSpPr>
+          <p:cNvPr id="2" name="Title 1"/>
+          <p:cNvSpPr>
+            <a:spLocks noGrp="1"/>
+          </p:cNvSpPr>
+          <p:nvPr>
+            <p:ph type="title"/>
+          </p:nvPr>
+        </p:nvSpPr>
+        <p:spPr/>
+        <p:txBody>
+          <a:bodyPr/>
+          <a:p>
+            <a:r>
+              <a:rPr lang="en-US"/>
+              <a:t>Disclaimer</a:t>
+            </a:r>
+            <a:endParaRPr lang="en-US"/>
+          </a:p>
+        </p:txBody>
+      </p:sp>
+      <p:sp>
+        <p:nvSpPr>
+          <p:cNvPr id="3" name="Content Placeholder 2"/>
+          <p:cNvSpPr>
+            <a:spLocks noGrp="1"/>
+          </p:cNvSpPr>
+          <p:nvPr>
+            <p:ph idx="1"/>
+          </p:nvPr>
+        </p:nvSpPr>
+        <p:spPr/>
+        <p:txBody>
+          <a:bodyPr>
+            <a:normAutofit fontScale="90000"/>
+          </a:bodyPr>
+          <a:p>
+            <a:pPr marL="0" indent="0">
+              <a:buNone/>
+            </a:pPr>
+            <a:r>
+              <a:rPr lang="en-US" altLang="zh-CN"/>
+              <a:t>This software is provided free of charge for anyone to download and use. While every effort has been made to ensure its functionality and stability, the developers make no warranties or guarantees regarding the accuracy, reliability, or suitability of the results produced.</a:t>
+            </a:r>
+            <a:endParaRPr lang="en-US" altLang="zh-CN"/>
+          </a:p>
+          <a:p>
+            <a:pPr marL="0" indent="0">
+              <a:buNone/>
+            </a:pPr>
+            <a:r>
+              <a:rPr lang="en-US" altLang="zh-CN"/>
+              <a:t>Users are solely responsible for how they interpret, apply, or rely upon any outputs generated by the software. The developers shall not be held liable for any errors, misinterpretations, losses, or consequences arising from its use.</a:t>
+            </a:r>
+            <a:endParaRPr lang="en-US" altLang="zh-CN"/>
+          </a:p>
+          <a:p>
+            <a:pPr marL="0" indent="0">
+              <a:buNone/>
+            </a:pPr>
+            <a:r>
+              <a:rPr lang="en-US" altLang="zh-CN"/>
+              <a:t>Furthermore, the developers do not collect, store, or retain any user data. All computations and outputs remain entirely under the user’s control.</a:t>
+            </a:r>
+            <a:endParaRPr lang="en-US" altLang="zh-CN"/>
+          </a:p>
+          <a:p>
+            <a:pPr marL="0" indent="0">
+              <a:buNone/>
+            </a:pPr>
+            <a:r>
+              <a:rPr lang="en-US" altLang="zh-CN"/>
+              <a:t>By downloading or using this software, the user acknowledges and agrees to these terms.</a:t>
+            </a:r>
+            <a:endParaRPr lang="en-US" altLang="zh-CN"/>
+          </a:p>
+        </p:txBody>
+      </p:sp>
+    </p:spTree>
+  </p:cSld>
+  <p:clrMapOvr>
+    <a:masterClrMapping/>
+  </p:clrMapOvr>
+</p:sld>
+</file>
+
+<file path=ppt/slides/slide3.xml><?xml version="1.0" encoding="utf-8"?>
 <p:sld xmlns:a="http://schemas.openxmlformats.org/drawingml/2006/main" xmlns:r="http://schemas.openxmlformats.org/officeDocument/2006/relationships" xmlns:p="http://schemas.openxmlformats.org/presentationml/2006/main">
   <p:cSld>
     <p:spTree>
@@ -3457,7 +4447,7 @@
         <p:spPr>
           <a:xfrm>
             <a:off x="114275" y="1517839"/>
-            <a:ext cx="11753106" cy="3271520"/>
+            <a:ext cx="11753106" cy="3917950"/>
           </a:xfrm>
           <a:prstGeom prst="rect">
             <a:avLst/>
@@ -3472,14 +4462,10 @@
           <a:p>
             <a:pPr algn="ctr"/>
             <a:r>
-              <a:rPr lang="en-US" sz="2000" b="1" dirty="0"/>
-              <a:t>CSR Function</a:t>
-            </a:r>
-            <a:endParaRPr lang="en-US" sz="2000" b="1" dirty="0"/>
-          </a:p>
-          <a:p>
-            <a:pPr algn="ctr"/>
-            <a:endParaRPr lang="en-US" sz="600" b="1" dirty="0"/>
+              <a:rPr lang="en-US" sz="2400" b="1" dirty="0"/>
+              <a:t>CSR Equation</a:t>
+            </a:r>
+            <a:endParaRPr lang="en-US" sz="2400" b="1" dirty="0"/>
           </a:p>
           <a:p>
             <a:pPr algn="just">
@@ -3489,29 +4475,25 @@
             </a:pPr>
             <a:r>
               <a:rPr lang="en-US" sz="1600" dirty="0"/>
-              <a:t>	</a:t>
-            </a:r>
-            <a:r>
-              <a:rPr lang="en-US" sz="1400" dirty="0"/>
               <a:t>Optimization in multi-parameter space is challenging. The key roadblock is that N parameters with M levels for each parameter  form  a huge M</a:t>
             </a:r>
             <a:r>
-              <a:rPr lang="en-US" sz="1400" baseline="30000" dirty="0"/>
+              <a:rPr lang="en-US" sz="1600" baseline="30000" dirty="0"/>
               <a:t>N</a:t>
             </a:r>
             <a:r>
-              <a:rPr lang="en-US" sz="1400" dirty="0"/>
+              <a:rPr lang="en-US" sz="1600" dirty="0"/>
               <a:t> search space. If trial-and-error approach is adapted,  it is a daunting task to search through the entire M</a:t>
             </a:r>
             <a:r>
-              <a:rPr lang="en-US" sz="1400" baseline="30000" dirty="0"/>
+              <a:rPr lang="en-US" sz="1600" baseline="30000" dirty="0"/>
               <a:t>N</a:t>
             </a:r>
             <a:r>
-              <a:rPr lang="en-US" sz="1400" dirty="0"/>
+              <a:rPr lang="en-US" sz="1600" dirty="0"/>
               <a:t> space for the optimal parameter-level  combination. </a:t>
             </a:r>
-            <a:endParaRPr lang="en-US" sz="1400" dirty="0"/>
+            <a:endParaRPr lang="en-US" sz="1600" dirty="0"/>
           </a:p>
           <a:p>
             <a:pPr algn="just">
@@ -3523,10 +4505,10 @@
               </a:tabLst>
             </a:pPr>
             <a:r>
-              <a:rPr lang="en-US" sz="1400" dirty="0"/>
-              <a:t>	With an artificial neural networks analysis of a set of test data, the input-output response was found to be a smooth surface. The complex system response (CSR) surface can be represented by the CSR function. </a:t>
-            </a:r>
-            <a:endParaRPr lang="en-US" sz="1400" dirty="0"/>
+              <a:rPr lang="en-US" sz="1600" dirty="0"/>
+              <a:t>With an artificial neural networks analysis of a set of test data, the input-output response was found to be a smooth surface. The complex system response (CSR) surface can be represented by the CSR equation. </a:t>
+            </a:r>
+            <a:endParaRPr lang="en-US" sz="1600" dirty="0"/>
           </a:p>
           <a:p>
             <a:pPr algn="just">
@@ -3552,7 +4534,7 @@
             </a:pPr>
             <a:r>
               <a:rPr lang="en-US" sz="1600" dirty="0"/>
-              <a:t>                                                                                                                                                                                                                  ………………Function (1)</a:t>
+              <a:t>                                                                                                                                                                                                                  ……………… Equation (1)</a:t>
             </a:r>
             <a:endParaRPr lang="en-US" sz="1600" dirty="0"/>
           </a:p>
@@ -3574,172 +4556,210 @@
               </a:tabLst>
             </a:pPr>
             <a:r>
-              <a:rPr lang="en-US" sz="1400" dirty="0"/>
-              <a:t>           C</a:t>
-            </a:r>
-            <a:r>
-              <a:rPr lang="en-US" sz="1400" baseline="-25000" dirty="0"/>
-              <a:t>i</a:t>
-            </a:r>
-            <a:r>
-              <a:rPr lang="en-US" sz="1400" dirty="0"/>
-              <a:t> are the levels,  E(C, t) is the output performance.  x</a:t>
-            </a:r>
-            <a:r>
-              <a:rPr lang="en-US" sz="1400" baseline="-25000" dirty="0"/>
-              <a:t>i</a:t>
-            </a:r>
-            <a:r>
-              <a:rPr lang="en-US" sz="1400" dirty="0"/>
-              <a:t>, </a:t>
-            </a:r>
-            <a:r>
-              <a:rPr lang="en-US" sz="1400" dirty="0" err="1"/>
-              <a:t>y</a:t>
-            </a:r>
-            <a:r>
-              <a:rPr lang="en-US" sz="1400" baseline="-25000" dirty="0" err="1"/>
-              <a:t>ij</a:t>
-            </a:r>
-            <a:r>
-              <a:rPr lang="en-US" sz="1400" dirty="0"/>
-              <a:t>, </a:t>
-            </a:r>
-            <a:r>
-              <a:rPr lang="en-US" sz="1400" dirty="0" err="1"/>
-              <a:t>z</a:t>
-            </a:r>
-            <a:r>
-              <a:rPr lang="en-US" sz="1400" baseline="-25000" dirty="0" err="1"/>
-              <a:t>ij</a:t>
-            </a:r>
-            <a:r>
-              <a:rPr lang="en-US" sz="1400" dirty="0"/>
-              <a:t>, are coefficients to be determined by experiments. These coefficients are functions of the independent variables, i.e. time and C</a:t>
-            </a:r>
-            <a:r>
-              <a:rPr lang="en-US" sz="1400" baseline="-25000" dirty="0"/>
-              <a:t>i</a:t>
-            </a:r>
-            <a:r>
-              <a:rPr lang="en-US" sz="1400" dirty="0"/>
-              <a:t>, and hence are not constants. The number of coefficients is [</a:t>
-            </a:r>
-            <a:r>
-              <a:rPr lang="en-US" sz="1400" kern="100" dirty="0">
+              <a:rPr lang="en-US" altLang="zh-CN" sz="1600" kern="100" dirty="0">
                 <a:ea typeface="宋体" panose="02010600030101010101" pitchFamily="2" charset="-122"/>
                 <a:cs typeface="Calibri" panose="020F0502020204030204" charset="0"/>
               </a:rPr>
-              <a:t>1+</a:t>
-            </a:r>
-            <a:r>
-              <a:rPr lang="en-US" sz="1400" i="1" kern="100" dirty="0">
+              <a:t>C</a:t>
+            </a:r>
+            <a:r>
+              <a:rPr lang="en-US" altLang="zh-CN" sz="1600" kern="100" baseline="-25000" dirty="0">
                 <a:ea typeface="宋体" panose="02010600030101010101" pitchFamily="2" charset="-122"/>
                 <a:cs typeface="Calibri" panose="020F0502020204030204" charset="0"/>
               </a:rPr>
-              <a:t>N</a:t>
-            </a:r>
-            <a:r>
-              <a:rPr lang="en-US" sz="1400" kern="100" dirty="0">
+              <a:t>i</a:t>
+            </a:r>
+            <a:r>
+              <a:rPr lang="en-US" altLang="zh-CN" sz="1600" kern="100" dirty="0">
                 <a:ea typeface="宋体" panose="02010600030101010101" pitchFamily="2" charset="-122"/>
                 <a:cs typeface="Calibri" panose="020F0502020204030204" charset="0"/>
               </a:rPr>
-              <a:t>+</a:t>
-            </a:r>
-            <a:r>
-              <a:rPr lang="en-US" sz="1400" i="1" kern="100" dirty="0">
+              <a:t> are the levels,  E(c</a:t>
+            </a:r>
+            <a:r>
+              <a:rPr lang="en-US" altLang="zh-CN" sz="1600" kern="100" baseline="-25000" dirty="0">
                 <a:ea typeface="宋体" panose="02010600030101010101" pitchFamily="2" charset="-122"/>
                 <a:cs typeface="Calibri" panose="020F0502020204030204" charset="0"/>
               </a:rPr>
-              <a:t>N</a:t>
-            </a:r>
-            <a:r>
-              <a:rPr lang="en-US" sz="1400" kern="100" dirty="0">
+              <a:t>i</a:t>
+            </a:r>
+            <a:r>
+              <a:rPr lang="en-US" altLang="zh-CN" sz="1600" kern="100" dirty="0">
                 <a:ea typeface="宋体" panose="02010600030101010101" pitchFamily="2" charset="-122"/>
                 <a:cs typeface="Calibri" panose="020F0502020204030204" charset="0"/>
               </a:rPr>
-              <a:t>+</a:t>
-            </a:r>
-            <a:r>
-              <a:rPr lang="en-US" sz="1400" i="1" kern="100" dirty="0">
+              <a:t>, u</a:t>
+            </a:r>
+            <a:r>
+              <a:rPr lang="en-US" altLang="zh-CN" sz="1600" kern="100" baseline="-25000" dirty="0">
                 <a:ea typeface="宋体" panose="02010600030101010101" pitchFamily="2" charset="-122"/>
                 <a:cs typeface="Calibri" panose="020F0502020204030204" charset="0"/>
               </a:rPr>
-              <a:t>N</a:t>
-            </a:r>
-            <a:r>
-              <a:rPr lang="en-US" sz="1400" kern="100" dirty="0">
+              <a:t>x</a:t>
+            </a:r>
+            <a:r>
+              <a:rPr lang="en-US" altLang="zh-CN" sz="1600" kern="100" dirty="0">
                 <a:ea typeface="宋体" panose="02010600030101010101" pitchFamily="2" charset="-122"/>
                 <a:cs typeface="Calibri" panose="020F0502020204030204" charset="0"/>
               </a:rPr>
-              <a:t>(</a:t>
-            </a:r>
-            <a:r>
-              <a:rPr lang="en-US" sz="1400" i="1" kern="100" dirty="0">
+              <a:t>, t) is the outcome.  x</a:t>
+            </a:r>
+            <a:r>
+              <a:rPr lang="en-US" altLang="zh-CN" sz="1600" kern="100" baseline="-25000" dirty="0">
                 <a:ea typeface="宋体" panose="02010600030101010101" pitchFamily="2" charset="-122"/>
                 <a:cs typeface="Calibri" panose="020F0502020204030204" charset="0"/>
               </a:rPr>
-              <a:t>N</a:t>
-            </a:r>
-            <a:r>
-              <a:rPr lang="en-US" sz="1400" kern="100" dirty="0">
+              <a:t>i</a:t>
+            </a:r>
+            <a:r>
+              <a:rPr lang="en-US" altLang="zh-CN" sz="1600" kern="100" dirty="0">
                 <a:ea typeface="宋体" panose="02010600030101010101" pitchFamily="2" charset="-122"/>
                 <a:cs typeface="Calibri" panose="020F0502020204030204" charset="0"/>
               </a:rPr>
-              <a:t>−1)/2 = [(N</a:t>
-            </a:r>
-            <a:r>
-              <a:rPr lang="en-US" sz="1400" kern="100" baseline="30000" dirty="0">
+              <a:t>, x</a:t>
+            </a:r>
+            <a:r>
+              <a:rPr lang="en-US" altLang="zh-CN" sz="1600" kern="100" baseline="-25000" dirty="0">
                 <a:ea typeface="宋体" panose="02010600030101010101" pitchFamily="2" charset="-122"/>
                 <a:cs typeface="Calibri" panose="020F0502020204030204" charset="0"/>
               </a:rPr>
-              <a:t>2</a:t>
-            </a:r>
-            <a:r>
-              <a:rPr lang="en-US" sz="1400" kern="100" dirty="0">
+              <a:t>ii</a:t>
+            </a:r>
+            <a:r>
+              <a:rPr lang="en-US" altLang="zh-CN" sz="1600" kern="100" dirty="0">
                 <a:ea typeface="宋体" panose="02010600030101010101" pitchFamily="2" charset="-122"/>
                 <a:cs typeface="Calibri" panose="020F0502020204030204" charset="0"/>
               </a:rPr>
-              <a:t>+3N+2)/2]. Hence, only  small number of calibration tests , [(N</a:t>
-            </a:r>
-            <a:r>
-              <a:rPr lang="en-US" sz="1400" kern="100" baseline="30000" dirty="0">
+              <a:t>, x</a:t>
+            </a:r>
+            <a:r>
+              <a:rPr lang="en-US" altLang="zh-CN" sz="1600" kern="100" baseline="-25000" dirty="0">
                 <a:ea typeface="宋体" panose="02010600030101010101" pitchFamily="2" charset="-122"/>
                 <a:cs typeface="Calibri" panose="020F0502020204030204" charset="0"/>
               </a:rPr>
-              <a:t>2</a:t>
-            </a:r>
-            <a:r>
-              <a:rPr lang="en-US" sz="1400" kern="100" dirty="0">
+              <a:t>ij</a:t>
+            </a:r>
+            <a:r>
+              <a:rPr lang="en-US" altLang="zh-CN" sz="1600" kern="100" dirty="0">
                 <a:ea typeface="宋体" panose="02010600030101010101" pitchFamily="2" charset="-122"/>
                 <a:cs typeface="Calibri" panose="020F0502020204030204" charset="0"/>
               </a:rPr>
-              <a:t>+3N+2)/2], can find the optimal output instead of searching  in  a large M</a:t>
-            </a:r>
-            <a:r>
-              <a:rPr lang="en-US" sz="1400" kern="100" baseline="30000" dirty="0">
+              <a:t>, are coefficients to be determined by experiments. These coefficients are functions of the independent variables, i.e. time and C</a:t>
+            </a:r>
+            <a:r>
+              <a:rPr lang="en-US" altLang="zh-CN" sz="1600" kern="100" baseline="-25000" dirty="0">
                 <a:ea typeface="宋体" panose="02010600030101010101" pitchFamily="2" charset="-122"/>
                 <a:cs typeface="Calibri" panose="020F0502020204030204" charset="0"/>
               </a:rPr>
-              <a:t>N</a:t>
-            </a:r>
-            <a:r>
-              <a:rPr lang="en-US" sz="1400" kern="100" dirty="0">
+              <a:t>i</a:t>
+            </a:r>
+            <a:r>
+              <a:rPr lang="en-US" altLang="zh-CN" sz="1600" kern="100" dirty="0">
                 <a:ea typeface="宋体" panose="02010600030101010101" pitchFamily="2" charset="-122"/>
                 <a:cs typeface="Calibri" panose="020F0502020204030204" charset="0"/>
               </a:rPr>
+              <a:t>, and hence are not constants. u</a:t>
+            </a:r>
+            <a:r>
+              <a:rPr lang="en-US" altLang="zh-CN" sz="1600" kern="100" baseline="-25000" dirty="0">
+                <a:ea typeface="宋体" panose="02010600030101010101" pitchFamily="2" charset="-122"/>
+                <a:cs typeface="Calibri" panose="020F0502020204030204" charset="0"/>
+              </a:rPr>
+              <a:t>x</a:t>
+            </a:r>
+            <a:r>
+              <a:rPr lang="en-US" altLang="zh-CN" sz="1600" kern="100" dirty="0">
+                <a:ea typeface="宋体" panose="02010600030101010101" pitchFamily="2" charset="-122"/>
+                <a:cs typeface="Calibri" panose="020F0502020204030204" charset="0"/>
+              </a:rPr>
+              <a:t> are the undefined or unknown parameters. By definition, Function-1 is not a mathematical equation. The number of coefficients is [1+P+P+P(P−1)/2 = [(P2+3P+2)/2]. Hence, only  small number of calibration tests , [(P</a:t>
+            </a:r>
+            <a:r>
+              <a:rPr lang="en-US" altLang="zh-CN" sz="1600" kern="100" baseline="30000" dirty="0">
+                <a:ea typeface="宋体" panose="02010600030101010101" pitchFamily="2" charset="-122"/>
+                <a:cs typeface="Calibri" panose="020F0502020204030204" charset="0"/>
+              </a:rPr>
+              <a:t>2</a:t>
+            </a:r>
+            <a:r>
+              <a:rPr lang="en-US" altLang="zh-CN" sz="1600" kern="100" dirty="0">
+                <a:ea typeface="宋体" panose="02010600030101010101" pitchFamily="2" charset="-122"/>
+                <a:cs typeface="Calibri" panose="020F0502020204030204" charset="0"/>
+              </a:rPr>
+              <a:t>+3P+2)/2], can find the optimal output instead of searching in a large L</a:t>
+            </a:r>
+            <a:r>
+              <a:rPr lang="en-US" altLang="zh-CN" sz="1600" kern="100" baseline="30000" dirty="0">
+                <a:ea typeface="宋体" panose="02010600030101010101" pitchFamily="2" charset="-122"/>
+                <a:cs typeface="Calibri" panose="020F0502020204030204" charset="0"/>
+              </a:rPr>
+              <a:t>P</a:t>
+            </a:r>
+            <a:r>
+              <a:rPr lang="en-US" altLang="zh-CN" sz="1600" kern="100" dirty="0">
+                <a:ea typeface="宋体" panose="02010600030101010101" pitchFamily="2" charset="-122"/>
+                <a:cs typeface="Calibri" panose="020F0502020204030204" charset="0"/>
+              </a:rPr>
               <a:t> space. </a:t>
             </a:r>
-            <a:endParaRPr lang="en-US" sz="1400" kern="100" dirty="0">
+            <a:endParaRPr lang="en-US" altLang="zh-CN" sz="1600" kern="100" dirty="0">
               <a:ea typeface="宋体" panose="02010600030101010101" pitchFamily="2" charset="-122"/>
               <a:cs typeface="Calibri" panose="020F0502020204030204" charset="0"/>
             </a:endParaRPr>
           </a:p>
         </p:txBody>
       </p:sp>
+      <p:sp>
+        <p:nvSpPr>
+          <p:cNvPr id="18" name="TextBox 17"/>
+          <p:cNvSpPr txBox="1"/>
+          <p:nvPr/>
+        </p:nvSpPr>
+        <p:spPr>
+          <a:xfrm>
+            <a:off x="8025918" y="2110488"/>
+            <a:ext cx="184731" cy="369332"/>
+          </a:xfrm>
+          <a:prstGeom prst="rect">
+            <a:avLst/>
+          </a:prstGeom>
+          <a:noFill/>
+        </p:spPr>
+        <p:txBody>
+          <a:bodyPr wrap="none" rtlCol="0">
+            <a:spAutoFit/>
+          </a:bodyPr>
+          <a:lstStyle/>
+          <a:p>
+            <a:endParaRPr lang="en-US" dirty="0"/>
+          </a:p>
+        </p:txBody>
+      </p:sp>
+      <p:sp>
+        <p:nvSpPr>
+          <p:cNvPr id="3" name="Title 2"/>
+          <p:cNvSpPr>
+            <a:spLocks noGrp="1"/>
+          </p:cNvSpPr>
+          <p:nvPr>
+            <p:ph type="title"/>
+          </p:nvPr>
+        </p:nvSpPr>
+        <p:spPr/>
+        <p:txBody>
+          <a:bodyPr/>
+          <a:p>
+            <a:r>
+              <a:rPr lang="en-US"/>
+              <a:t>Introduction to CSR Equation</a:t>
+            </a:r>
+            <a:endParaRPr lang="en-US"/>
+          </a:p>
+        </p:txBody>
+      </p:sp>
       <p:pic>
         <p:nvPicPr>
-          <p:cNvPr id="17" name="Picture 16"/>
+          <p:cNvPr id="5" name="图片 4"/>
           <p:cNvPicPr>
             <a:picLocks noChangeAspect="1"/>
           </p:cNvPicPr>
@@ -3753,50 +4773,133 @@
         </p:blipFill>
         <p:spPr>
           <a:xfrm>
-            <a:off x="1360527" y="2946200"/>
-            <a:ext cx="8470756" cy="1308281"/>
+            <a:off x="549910" y="3300730"/>
+            <a:ext cx="9133205" cy="966470"/>
           </a:xfrm>
           <a:prstGeom prst="rect">
             <a:avLst/>
           </a:prstGeom>
         </p:spPr>
       </p:pic>
-      <p:sp>
-        <p:nvSpPr>
-          <p:cNvPr id="18" name="TextBox 17"/>
-          <p:cNvSpPr txBox="1"/>
-          <p:nvPr/>
-        </p:nvSpPr>
-        <p:spPr>
-          <a:xfrm>
-            <a:off x="8025918" y="2110488"/>
-            <a:ext cx="184731" cy="369332"/>
-          </a:xfrm>
-          <a:prstGeom prst="rect">
-            <a:avLst/>
-          </a:prstGeom>
-          <a:noFill/>
-        </p:spPr>
-        <p:txBody>
-          <a:bodyPr wrap="none" rtlCol="0">
-            <a:spAutoFit/>
-          </a:bodyPr>
-          <a:lstStyle/>
-          <a:p>
-            <a:endParaRPr lang="en-US" dirty="0"/>
+    </p:spTree>
+  </p:cSld>
+  <p:clrMapOvr>
+    <a:masterClrMapping/>
+  </p:clrMapOvr>
+</p:sld>
+</file>
+
+<file path=ppt/slides/slide4.xml><?xml version="1.0" encoding="utf-8"?>
+<p:sld xmlns:a="http://schemas.openxmlformats.org/drawingml/2006/main" xmlns:r="http://schemas.openxmlformats.org/officeDocument/2006/relationships" xmlns:p="http://schemas.openxmlformats.org/presentationml/2006/main">
+  <p:cSld>
+    <p:spTree>
+      <p:nvGrpSpPr>
+        <p:cNvPr id="1" name=""/>
+        <p:cNvGrpSpPr/>
+        <p:nvPr/>
+      </p:nvGrpSpPr>
+      <p:grpSpPr/>
+      <p:sp>
+        <p:nvSpPr>
+          <p:cNvPr id="2" name="标题 1"/>
+          <p:cNvSpPr>
+            <a:spLocks noGrp="1"/>
+          </p:cNvSpPr>
+          <p:nvPr>
+            <p:ph type="title"/>
+          </p:nvPr>
+        </p:nvSpPr>
+        <p:spPr/>
+        <p:txBody>
+          <a:bodyPr/>
+          <a:p>
+            <a:r>
+              <a:rPr lang="en-US">
+                <a:sym typeface="+mn-ea"/>
+              </a:rPr>
+              <a:t>Introduction to CSR Equation</a:t>
+            </a:r>
+            <a:endParaRPr lang="zh-CN" altLang="en-US"/>
+          </a:p>
+        </p:txBody>
+      </p:sp>
+      <p:sp>
+        <p:nvSpPr>
+          <p:cNvPr id="3" name="内容占位符 2"/>
+          <p:cNvSpPr>
+            <a:spLocks noGrp="1"/>
+          </p:cNvSpPr>
+          <p:nvPr>
+            <p:ph idx="1"/>
+          </p:nvPr>
+        </p:nvSpPr>
+        <p:spPr/>
+        <p:txBody>
+          <a:bodyPr/>
+          <a:p>
+            <a:pPr marL="0" indent="0">
+              <a:buNone/>
+            </a:pPr>
+            <a:r>
+              <a:rPr lang="en-US" altLang="zh-CN" sz="2000"/>
+              <a:t>The CSR function is the transfer function between input and output. C</a:t>
+            </a:r>
+            <a:r>
+              <a:rPr lang="en-US" altLang="zh-CN" sz="2000" baseline="-25000"/>
+              <a:t>i</a:t>
+            </a:r>
+            <a:r>
+              <a:rPr lang="en-US" altLang="zh-CN" sz="2000"/>
+              <a:t> is the level of a parameter and is an independent variable.  Coefficients of the CSR function contain the information of the system response to the parameters and the levels. The coefficients are unknowns. For P parameters, there are [(P</a:t>
+            </a:r>
+            <a:r>
+              <a:rPr lang="en-US" altLang="zh-CN" sz="2000" baseline="30000"/>
+              <a:t>2</a:t>
+            </a:r>
+            <a:r>
+              <a:rPr lang="en-US" altLang="zh-CN" sz="2000"/>
+              <a:t>+3P+2)/2] coefficients (Table 1).  	</a:t>
+            </a:r>
+            <a:endParaRPr lang="en-US" altLang="zh-CN" sz="2000"/>
+          </a:p>
+          <a:p>
+            <a:pPr marL="0" indent="0">
+              <a:buNone/>
+            </a:pPr>
+            <a:r>
+              <a:rPr lang="en-US" altLang="zh-CN" sz="2000"/>
+              <a:t>The (P</a:t>
+            </a:r>
+            <a:r>
+              <a:rPr lang="en-US" altLang="zh-CN" sz="2000" baseline="30000"/>
+              <a:t>2</a:t>
+            </a:r>
+            <a:r>
+              <a:rPr lang="en-US" altLang="zh-CN" sz="2000"/>
+              <a:t>+3P+2)/2 tests can save order of magnitude orders of efforts, time and cost than searching through the entire N</a:t>
+            </a:r>
+            <a:r>
+              <a:rPr lang="en-US" altLang="zh-CN" sz="2000" baseline="30000"/>
+              <a:t>M</a:t>
+            </a:r>
+            <a:r>
+              <a:rPr lang="en-US" altLang="zh-CN" sz="2000"/>
+              <a:t> space.  </a:t>
+            </a:r>
+            <a:endParaRPr lang="en-US" altLang="zh-CN" sz="2000"/>
           </a:p>
         </p:txBody>
       </p:sp>
       <p:graphicFrame>
         <p:nvGraphicFramePr>
-          <p:cNvPr id="2" name="Table 1"/>
+          <p:cNvPr id="4" name="Table 1"/>
           <p:cNvGraphicFramePr>
             <a:graphicFrameLocks noGrp="1"/>
           </p:cNvGraphicFramePr>
           <p:nvPr/>
         </p:nvGraphicFramePr>
         <p:xfrm>
-          <a:off x="1375884" y="4798031"/>
+          <a:off x="3221829" y="4614516"/>
           <a:ext cx="5411052" cy="2011680"/>
         </p:xfrm>
         <a:graphic>
@@ -4247,7 +5350,7 @@
         </p:nvSpPr>
         <p:spPr>
           <a:xfrm>
-            <a:off x="7252448" y="5472778"/>
+            <a:off x="4273028" y="4117688"/>
             <a:ext cx="3308466" cy="369332"/>
           </a:xfrm>
           <a:prstGeom prst="rect">
@@ -4266,28 +5369,6 @@
               <a:t>Table 1:   The number of tests  </a:t>
             </a:r>
             <a:endParaRPr lang="en-US" dirty="0"/>
-          </a:p>
-        </p:txBody>
-      </p:sp>
-      <p:sp>
-        <p:nvSpPr>
-          <p:cNvPr id="3" name="Title 2"/>
-          <p:cNvSpPr>
-            <a:spLocks noGrp="1"/>
-          </p:cNvSpPr>
-          <p:nvPr>
-            <p:ph type="title"/>
-          </p:nvPr>
-        </p:nvSpPr>
-        <p:spPr/>
-        <p:txBody>
-          <a:bodyPr/>
-          <a:p>
-            <a:r>
-              <a:rPr lang="en-US"/>
-              <a:t>Introduction to CSR</a:t>
-            </a:r>
-            <a:endParaRPr lang="en-US"/>
           </a:p>
         </p:txBody>
       </p:sp>
@@ -4299,7 +5380,7 @@
 </p:sld>
 </file>
 
-<file path=ppt/slides/slide3.xml><?xml version="1.0" encoding="utf-8"?>
+<file path=ppt/slides/slide5.xml><?xml version="1.0" encoding="utf-8"?>
 <p:sld xmlns:a="http://schemas.openxmlformats.org/drawingml/2006/main" xmlns:r="http://schemas.openxmlformats.org/officeDocument/2006/relationships" xmlns:p="http://schemas.openxmlformats.org/presentationml/2006/main">
   <p:cSld>
     <p:spTree>
@@ -4311,6 +5392,628 @@
       <p:grpSpPr/>
       <p:sp>
         <p:nvSpPr>
+          <p:cNvPr id="2" name="标题 1"/>
+          <p:cNvSpPr>
+            <a:spLocks noGrp="1"/>
+          </p:cNvSpPr>
+          <p:nvPr>
+            <p:ph type="title"/>
+          </p:nvPr>
+        </p:nvSpPr>
+        <p:spPr/>
+        <p:txBody>
+          <a:bodyPr/>
+          <a:p>
+            <a:r>
+              <a:rPr lang="en-US" altLang="zh-CN"/>
+              <a:t>Terminology</a:t>
+            </a:r>
+            <a:endParaRPr lang="en-US" altLang="zh-CN"/>
+          </a:p>
+        </p:txBody>
+      </p:sp>
+      <p:sp>
+        <p:nvSpPr>
+          <p:cNvPr id="3" name="内容占位符 2"/>
+          <p:cNvSpPr>
+            <a:spLocks noGrp="1"/>
+          </p:cNvSpPr>
+          <p:nvPr>
+            <p:ph idx="1"/>
+          </p:nvPr>
+        </p:nvSpPr>
+        <p:spPr>
+          <a:xfrm>
+            <a:off x="888365" y="1611630"/>
+            <a:ext cx="11492230" cy="4351655"/>
+          </a:xfrm>
+        </p:spPr>
+        <p:txBody>
+          <a:bodyPr>
+            <a:normAutofit fontScale="25000"/>
+          </a:bodyPr>
+          <a:p>
+            <a:pPr marL="0" indent="0">
+              <a:buNone/>
+            </a:pPr>
+            <a:r>
+              <a:rPr lang="en-US" altLang="zh-CN" sz="6400" b="1"/>
+              <a:t>1. CSR Equation (Complex Systems Response Equation)</a:t>
+            </a:r>
+            <a:endParaRPr lang="en-US" altLang="zh-CN" sz="6400" b="1"/>
+          </a:p>
+          <a:p>
+            <a:pPr marL="0" indent="0">
+              <a:buNone/>
+            </a:pPr>
+            <a:r>
+              <a:rPr lang="en-US" altLang="zh-CN" sz="6400"/>
+              <a:t>A deterministic, second-order nonlinear equation that quantitatively maps how multiple interacting parameters lead to an emergent system property. It expresses the relationship between controllable parameters </a:t>
+            </a:r>
+            <a:endParaRPr lang="en-US" altLang="zh-CN" sz="6400"/>
+          </a:p>
+          <a:p>
+            <a:pPr marL="0" indent="0">
+              <a:buNone/>
+            </a:pPr>
+            <a:r>
+              <a:rPr lang="en-US" altLang="zh-CN" sz="6400" b="1"/>
+              <a:t>2. CSR Response Surface</a:t>
+            </a:r>
+            <a:endParaRPr lang="en-US" altLang="zh-CN" sz="6400" b="1"/>
+          </a:p>
+          <a:p>
+            <a:pPr marL="0" indent="0">
+              <a:buNone/>
+            </a:pPr>
+            <a:r>
+              <a:rPr lang="en-US" altLang="zh-CN" sz="6400"/>
+              <a:t>A multidimensional surface defined by the CSR equation that visualizes how the emergent property changes with varying parameters. It can take the form of an elliptic or hyperbolic paraboloid, typically featuring a single global optimum.</a:t>
+            </a:r>
+            <a:endParaRPr lang="en-US" altLang="zh-CN" sz="6400"/>
+          </a:p>
+          <a:p>
+            <a:pPr marL="0" indent="0">
+              <a:buNone/>
+            </a:pPr>
+            <a:r>
+              <a:rPr lang="en-US" altLang="zh-CN" sz="6400" b="1"/>
+              <a:t>3. Emergent Property</a:t>
+            </a:r>
+            <a:endParaRPr lang="en-US" altLang="zh-CN" sz="6400" b="1"/>
+          </a:p>
+          <a:p>
+            <a:pPr marL="0" indent="0">
+              <a:buNone/>
+            </a:pPr>
+            <a:r>
+              <a:rPr lang="en-US" altLang="zh-CN" sz="6400"/>
+              <a:t>The measurable output or system-level behavior that arises from the interaction among all controllable and uncontrollable variables within a complex system.</a:t>
+            </a:r>
+            <a:endParaRPr lang="en-US" altLang="zh-CN" sz="6400"/>
+          </a:p>
+          <a:p>
+            <a:pPr marL="0" indent="0">
+              <a:buNone/>
+            </a:pPr>
+            <a:r>
+              <a:rPr lang="en-US" altLang="zh-CN" sz="6400" b="1"/>
+              <a:t>4. Coefficients (x</a:t>
+            </a:r>
+            <a:r>
+              <a:rPr lang="en-US" altLang="en-US" sz="6400" b="1"/>
+              <a:t>₀</a:t>
+            </a:r>
+            <a:r>
+              <a:rPr lang="en-US" altLang="zh-CN" sz="6400" b="1"/>
+              <a:t>, x</a:t>
+            </a:r>
+            <a:r>
+              <a:rPr lang="" altLang="en-US" sz="6400" b="1"/>
+              <a:t>ᵢ</a:t>
+            </a:r>
+            <a:r>
+              <a:rPr lang="en-US" altLang="zh-CN" sz="6400" b="1"/>
+              <a:t>, x</a:t>
+            </a:r>
+            <a:r>
+              <a:rPr lang="" altLang="en-US" sz="6400" b="1"/>
+              <a:t>ᵢᵢ</a:t>
+            </a:r>
+            <a:r>
+              <a:rPr lang="en-US" altLang="zh-CN" sz="6400" b="1"/>
+              <a:t>, x</a:t>
+            </a:r>
+            <a:r>
+              <a:rPr lang="" altLang="en-US" sz="6400" b="1"/>
+              <a:t>ᵢ</a:t>
+            </a:r>
+            <a:r>
+              <a:rPr lang="en-US" altLang="en-US" sz="6400" b="1"/>
+              <a:t>ⱼ</a:t>
+            </a:r>
+            <a:r>
+              <a:rPr lang="en-US" altLang="zh-CN" sz="6400" b="1"/>
+              <a:t>)</a:t>
+            </a:r>
+            <a:endParaRPr lang="en-US" altLang="zh-CN" sz="6400" b="1"/>
+          </a:p>
+          <a:p>
+            <a:pPr marL="0" indent="0">
+              <a:buNone/>
+            </a:pPr>
+            <a:r>
+              <a:rPr lang="en-US" altLang="zh-CN" sz="6400"/>
+              <a:t>Adaptive parameters in the CSR equation that represent system response characteristics. Unlike fixed regression coefficients, CSR coefficients depend on time and hidden variables, making them dynamic descriptors of system behavior.</a:t>
+            </a:r>
+            <a:endParaRPr lang="en-US" altLang="zh-CN" sz="6400"/>
+          </a:p>
+          <a:p>
+            <a:pPr marL="0" indent="0">
+              <a:buNone/>
+            </a:pPr>
+            <a:r>
+              <a:rPr lang="en-US" altLang="zh-CN" sz="6400">
+                <a:sym typeface="+mn-ea"/>
+              </a:rPr>
+              <a:t>x</a:t>
+            </a:r>
+            <a:r>
+              <a:rPr lang="en-US" altLang="en-US" sz="6400">
+                <a:sym typeface="+mn-ea"/>
+              </a:rPr>
+              <a:t>₀: </a:t>
+            </a:r>
+            <a:r>
+              <a:rPr lang="en-US" altLang="zh-CN" sz="6400">
+                <a:sym typeface="+mn-ea"/>
+              </a:rPr>
+              <a:t>Baseline response or intercept term, representing the system’s intrinsic state when all controllable parameters are zero</a:t>
+            </a:r>
+            <a:endParaRPr lang="en-US" altLang="zh-CN" sz="6400">
+              <a:sym typeface="+mn-ea"/>
+            </a:endParaRPr>
+          </a:p>
+          <a:p>
+            <a:pPr marL="0" indent="0">
+              <a:buNone/>
+            </a:pPr>
+            <a:r>
+              <a:rPr lang="en-US" altLang="zh-CN" sz="6400">
+                <a:sym typeface="+mn-ea"/>
+              </a:rPr>
+              <a:t>x</a:t>
+            </a:r>
+            <a:r>
+              <a:rPr lang="en-US" altLang="en-US" sz="6400">
+                <a:sym typeface="+mn-ea"/>
+              </a:rPr>
+              <a:t>ᵢ: </a:t>
+            </a:r>
+            <a:r>
+              <a:rPr lang="en-US" altLang="zh-CN" sz="6400">
+                <a:sym typeface="+mn-ea"/>
+              </a:rPr>
+              <a:t>First-order response coefficient showing the direct influence of parameter c</a:t>
+            </a:r>
+            <a:r>
+              <a:rPr lang="en-US" altLang="en-US" sz="6400">
+                <a:sym typeface="+mn-ea"/>
+              </a:rPr>
+              <a:t>ᵢ </a:t>
+            </a:r>
+            <a:r>
+              <a:rPr lang="en-US" altLang="zh-CN" sz="6400">
+                <a:sym typeface="+mn-ea"/>
+              </a:rPr>
+              <a:t>on the emergent property.</a:t>
+            </a:r>
+            <a:endParaRPr lang="en-US" altLang="zh-CN" sz="6400">
+              <a:sym typeface="+mn-ea"/>
+            </a:endParaRPr>
+          </a:p>
+          <a:p>
+            <a:pPr marL="0" indent="0">
+              <a:buNone/>
+            </a:pPr>
+            <a:r>
+              <a:rPr lang="en-US" altLang="zh-CN" sz="6400">
+                <a:sym typeface="+mn-ea"/>
+              </a:rPr>
+              <a:t>x</a:t>
+            </a:r>
+            <a:r>
+              <a:rPr lang="en-US" altLang="en-US" sz="6400">
+                <a:sym typeface="+mn-ea"/>
+              </a:rPr>
+              <a:t>ᵢᵢ: </a:t>
+            </a:r>
+            <a:r>
+              <a:rPr lang="en-US" altLang="zh-CN" sz="6400">
+                <a:sym typeface="+mn-ea"/>
+              </a:rPr>
+              <a:t>Second-order self-interaction term that captures nonlinearity of parameter </a:t>
+            </a:r>
+            <a:r>
+              <a:rPr lang="en-US" altLang="zh-CN" sz="6400">
+                <a:sym typeface="+mn-ea"/>
+              </a:rPr>
+              <a:t>c</a:t>
+            </a:r>
+            <a:r>
+              <a:rPr lang="en-US" altLang="en-US" sz="6400">
+                <a:sym typeface="+mn-ea"/>
+              </a:rPr>
+              <a:t>ᵢ</a:t>
+            </a:r>
+            <a:r>
+              <a:rPr lang="en-US" altLang="zh-CN" sz="6400">
+                <a:sym typeface="+mn-ea"/>
+              </a:rPr>
+              <a:t>’s individual effect</a:t>
+            </a:r>
+            <a:endParaRPr lang="en-US" altLang="zh-CN" sz="6400">
+              <a:sym typeface="+mn-ea"/>
+            </a:endParaRPr>
+          </a:p>
+          <a:p>
+            <a:pPr marL="0" indent="0">
+              <a:buNone/>
+            </a:pPr>
+            <a:r>
+              <a:rPr lang="en-US" altLang="zh-CN" sz="6400">
+                <a:sym typeface="+mn-ea"/>
+              </a:rPr>
+              <a:t>x</a:t>
+            </a:r>
+            <a:r>
+              <a:rPr lang="en-US" altLang="en-US" sz="6400">
+                <a:sym typeface="+mn-ea"/>
+              </a:rPr>
+              <a:t>ᵢⱼ: </a:t>
+            </a:r>
+            <a:r>
+              <a:rPr lang="en-US" altLang="zh-CN" sz="6400">
+                <a:sym typeface="+mn-ea"/>
+              </a:rPr>
+              <a:t>Cross-interaction coefficient quantifying the coupling effect between parameters c</a:t>
+            </a:r>
+            <a:r>
+              <a:rPr lang="en-US" altLang="en-US" sz="6400">
+                <a:sym typeface="+mn-ea"/>
+              </a:rPr>
+              <a:t>ᵢ</a:t>
+            </a:r>
+            <a:r>
+              <a:rPr lang="en-US" altLang="zh-CN" sz="6400">
+                <a:sym typeface="+mn-ea"/>
+              </a:rPr>
+              <a:t> and c</a:t>
+            </a:r>
+            <a:r>
+              <a:rPr lang="en-US" altLang="en-US" sz="6400">
+                <a:sym typeface="+mn-ea"/>
+              </a:rPr>
+              <a:t>ⱼ</a:t>
+            </a:r>
+            <a:endParaRPr lang="en-US" altLang="zh-CN" sz="6400"/>
+          </a:p>
+        </p:txBody>
+      </p:sp>
+    </p:spTree>
+  </p:cSld>
+  <p:clrMapOvr>
+    <a:masterClrMapping/>
+  </p:clrMapOvr>
+</p:sld>
+</file>
+
+<file path=ppt/slides/slide6.xml><?xml version="1.0" encoding="utf-8"?>
+<p:sld xmlns:a="http://schemas.openxmlformats.org/drawingml/2006/main" xmlns:r="http://schemas.openxmlformats.org/officeDocument/2006/relationships" xmlns:p="http://schemas.openxmlformats.org/presentationml/2006/main">
+  <p:cSld>
+    <p:spTree>
+      <p:nvGrpSpPr>
+        <p:cNvPr id="1" name=""/>
+        <p:cNvGrpSpPr/>
+        <p:nvPr/>
+      </p:nvGrpSpPr>
+      <p:grpSpPr/>
+      <p:sp>
+        <p:nvSpPr>
+          <p:cNvPr id="2" name="标题 1"/>
+          <p:cNvSpPr>
+            <a:spLocks noGrp="1"/>
+          </p:cNvSpPr>
+          <p:nvPr>
+            <p:ph type="title"/>
+          </p:nvPr>
+        </p:nvSpPr>
+        <p:spPr/>
+        <p:txBody>
+          <a:bodyPr/>
+          <a:p>
+            <a:r>
+              <a:rPr lang="en-US" altLang="zh-CN">
+                <a:sym typeface="+mn-ea"/>
+              </a:rPr>
+              <a:t>Terminology</a:t>
+            </a:r>
+            <a:endParaRPr lang="zh-CN" altLang="en-US"/>
+          </a:p>
+        </p:txBody>
+      </p:sp>
+      <p:sp>
+        <p:nvSpPr>
+          <p:cNvPr id="3" name="内容占位符 2"/>
+          <p:cNvSpPr>
+            <a:spLocks noGrp="1"/>
+          </p:cNvSpPr>
+          <p:nvPr>
+            <p:ph idx="1"/>
+          </p:nvPr>
+        </p:nvSpPr>
+        <p:spPr>
+          <a:xfrm>
+            <a:off x="838200" y="1691005"/>
+            <a:ext cx="10515600" cy="4351338"/>
+          </a:xfrm>
+        </p:spPr>
+        <p:txBody>
+          <a:bodyPr>
+            <a:normAutofit fontScale="25000"/>
+          </a:bodyPr>
+          <a:p>
+            <a:pPr marL="0" indent="0">
+              <a:buNone/>
+            </a:pPr>
+            <a:r>
+              <a:rPr lang="en-US" altLang="zh-CN" sz="5600" b="1">
+                <a:sym typeface="+mn-ea"/>
+              </a:rPr>
+              <a:t>5. </a:t>
+            </a:r>
+            <a:r>
+              <a:rPr lang="en-US" altLang="zh-CN" sz="5600" b="1">
+                <a:sym typeface="+mn-ea"/>
+              </a:rPr>
+              <a:t>Orthogonal Array Composite Design (OACD)</a:t>
+            </a:r>
+            <a:endParaRPr lang="en-US" altLang="zh-CN" sz="5600" b="1"/>
+          </a:p>
+          <a:p>
+            <a:pPr marL="0" indent="0">
+              <a:buNone/>
+            </a:pPr>
+            <a:r>
+              <a:rPr lang="en-US" altLang="zh-CN" sz="5600">
+                <a:sym typeface="+mn-ea"/>
+              </a:rPr>
+              <a:t>A design-of-experiments (DOE) method that determines the minimal number of calibration tests needed to estimate CSR coefficients.</a:t>
+            </a:r>
+            <a:endParaRPr lang="en-US" altLang="zh-CN" sz="5600"/>
+          </a:p>
+          <a:p>
+            <a:pPr marL="0" indent="0">
+              <a:buNone/>
+            </a:pPr>
+            <a:r>
+              <a:rPr lang="en-US" altLang="zh-CN" sz="5600">
+                <a:sym typeface="+mn-ea"/>
+              </a:rPr>
+              <a:t>For P parameters, only (P</a:t>
+            </a:r>
+            <a:r>
+              <a:rPr lang="en-US" altLang="en-US" sz="5600">
+                <a:sym typeface="+mn-ea"/>
+              </a:rPr>
+              <a:t>²</a:t>
+            </a:r>
+            <a:r>
+              <a:rPr lang="en-US" altLang="zh-CN" sz="5600">
+                <a:sym typeface="+mn-ea"/>
+              </a:rPr>
+              <a:t> + 3P + 2)/2 tests are required instead of exploring all possible combinations.</a:t>
+            </a:r>
+            <a:endParaRPr lang="en-US" altLang="zh-CN" sz="5600"/>
+          </a:p>
+          <a:p>
+            <a:pPr marL="0" indent="0">
+              <a:buNone/>
+            </a:pPr>
+            <a:r>
+              <a:rPr lang="en-US" altLang="zh-CN" sz="5600" b="1">
+                <a:sym typeface="+mn-ea"/>
+              </a:rPr>
+              <a:t>6. Calibration (Fitting) Process</a:t>
+            </a:r>
+            <a:endParaRPr lang="en-US" altLang="zh-CN" sz="5600" b="1"/>
+          </a:p>
+          <a:p>
+            <a:pPr marL="0" indent="0">
+              <a:buNone/>
+            </a:pPr>
+            <a:r>
+              <a:rPr lang="en-US" altLang="zh-CN" sz="5600">
+                <a:sym typeface="+mn-ea"/>
+              </a:rPr>
+              <a:t>The procedure of determining CSR coefficients by fitting experimental or simulated data according to the OACD-designed test matrix.</a:t>
+            </a:r>
+            <a:endParaRPr lang="en-US" altLang="zh-CN" sz="5600"/>
+          </a:p>
+          <a:p>
+            <a:pPr marL="0" indent="0">
+              <a:buNone/>
+            </a:pPr>
+            <a:r>
+              <a:rPr lang="en-US" altLang="zh-CN" sz="5600" b="1">
+                <a:sym typeface="+mn-ea"/>
+              </a:rPr>
+              <a:t>7. Extremum (Global Optimum)</a:t>
+            </a:r>
+            <a:endParaRPr lang="en-US" altLang="zh-CN" sz="5600" b="1"/>
+          </a:p>
+          <a:p>
+            <a:pPr marL="0" indent="0">
+              <a:buNone/>
+            </a:pPr>
+            <a:r>
+              <a:rPr lang="en-US" altLang="zh-CN" sz="5600">
+                <a:sym typeface="+mn-ea"/>
+              </a:rPr>
+              <a:t>The maximum or minimum point on the CSR surface representing the best achievable system performance under given constraints.</a:t>
+            </a:r>
+            <a:endParaRPr lang="en-US" altLang="zh-CN" sz="5600"/>
+          </a:p>
+          <a:p>
+            <a:pPr marL="0" indent="0">
+              <a:buNone/>
+            </a:pPr>
+            <a:r>
+              <a:rPr lang="en-US" altLang="zh-CN" sz="5600" b="1">
+                <a:sym typeface="+mn-ea"/>
+              </a:rPr>
+              <a:t>8. Normalization</a:t>
+            </a:r>
+            <a:endParaRPr lang="en-US" altLang="zh-CN" sz="5600" b="1"/>
+          </a:p>
+          <a:p>
+            <a:pPr marL="0" indent="0">
+              <a:buNone/>
+            </a:pPr>
+            <a:r>
+              <a:rPr lang="en-US" altLang="zh-CN" sz="5600">
+                <a:sym typeface="+mn-ea"/>
+              </a:rPr>
+              <a:t>Normalization scales input magnitudes to a user-defined range.</a:t>
+            </a:r>
+            <a:endParaRPr lang="en-US" altLang="zh-CN" sz="5600"/>
+          </a:p>
+          <a:p>
+            <a:pPr marL="0" indent="0">
+              <a:buNone/>
+            </a:pPr>
+            <a:r>
+              <a:rPr lang="en-US" altLang="zh-CN" sz="5600" b="1">
+                <a:sym typeface="+mn-ea"/>
+              </a:rPr>
+              <a:t>9. Model Fit Metrics (R</a:t>
+            </a:r>
+            <a:r>
+              <a:rPr lang="en-US" altLang="en-US" sz="5600" b="1">
+                <a:sym typeface="+mn-ea"/>
+              </a:rPr>
+              <a:t>²</a:t>
+            </a:r>
+            <a:r>
+              <a:rPr lang="en-US" altLang="zh-CN" sz="5600" b="1">
+                <a:sym typeface="+mn-ea"/>
+              </a:rPr>
+              <a:t>, MSE)</a:t>
+            </a:r>
+            <a:endParaRPr lang="en-US" altLang="zh-CN" sz="5600" b="1"/>
+          </a:p>
+          <a:p>
+            <a:pPr marL="0" indent="0">
+              <a:buNone/>
+            </a:pPr>
+            <a:r>
+              <a:rPr lang="en-US" altLang="zh-CN" sz="5600">
+                <a:sym typeface="+mn-ea"/>
+              </a:rPr>
+              <a:t>Quantitative measures used to evaluate the CSR model:</a:t>
+            </a:r>
+            <a:endParaRPr lang="en-US" altLang="zh-CN" sz="5600"/>
+          </a:p>
+          <a:p>
+            <a:pPr marL="0" indent="0">
+              <a:buNone/>
+            </a:pPr>
+            <a:r>
+              <a:rPr lang="en-US" altLang="zh-CN" sz="5600">
+                <a:sym typeface="+mn-ea"/>
+              </a:rPr>
+              <a:t>R</a:t>
+            </a:r>
+            <a:r>
+              <a:rPr lang="en-US" altLang="en-US" sz="5600">
+                <a:sym typeface="+mn-ea"/>
+              </a:rPr>
+              <a:t>²</a:t>
+            </a:r>
+            <a:r>
+              <a:rPr lang="en-US" altLang="zh-CN" sz="5600">
+                <a:sym typeface="+mn-ea"/>
+              </a:rPr>
+              <a:t> (Coefficient of Determination): Indicates how well the CSR equation explains observed data.</a:t>
+            </a:r>
+            <a:endParaRPr lang="en-US" altLang="zh-CN" sz="5600"/>
+          </a:p>
+          <a:p>
+            <a:pPr marL="0" indent="0">
+              <a:buNone/>
+            </a:pPr>
+            <a:r>
+              <a:rPr lang="en-US" altLang="zh-CN" sz="5600">
+                <a:sym typeface="+mn-ea"/>
+              </a:rPr>
+              <a:t>MSE (Mean Squared Error): Measures prediction error between actual and modeled results.</a:t>
+            </a:r>
+            <a:endParaRPr lang="en-US" altLang="zh-CN" sz="5600">
+              <a:sym typeface="+mn-ea"/>
+            </a:endParaRPr>
+          </a:p>
+          <a:p>
+            <a:pPr marL="0" indent="0">
+              <a:buNone/>
+            </a:pPr>
+            <a:r>
+              <a:rPr lang="en-US" altLang="zh-CN" sz="5600" b="1">
+                <a:sym typeface="+mn-ea"/>
+              </a:rPr>
+              <a:t>10. CSR Surface Plot</a:t>
+            </a:r>
+            <a:endParaRPr lang="en-US" altLang="zh-CN" sz="5600" b="1"/>
+          </a:p>
+          <a:p>
+            <a:pPr marL="0" indent="0">
+              <a:buNone/>
+            </a:pPr>
+            <a:r>
+              <a:rPr lang="en-US" altLang="zh-CN" sz="5600">
+                <a:sym typeface="+mn-ea"/>
+              </a:rPr>
+              <a:t>Visual representations of the CSR response surface, showing parameter interactions and system trends. The extremum point corresponds to the optimal condition predicted by the CSR model</a:t>
+            </a:r>
+            <a:endParaRPr lang="en-US" altLang="zh-CN" sz="5600"/>
+          </a:p>
+          <a:p>
+            <a:endParaRPr lang="en-US" altLang="zh-CN" sz="5600"/>
+          </a:p>
+          <a:p>
+            <a:endParaRPr lang="zh-CN" altLang="en-US" sz="5600"/>
+          </a:p>
+        </p:txBody>
+      </p:sp>
+    </p:spTree>
+  </p:cSld>
+  <p:clrMapOvr>
+    <a:masterClrMapping/>
+  </p:clrMapOvr>
+</p:sld>
+</file>
+
+<file path=ppt/slides/slide7.xml><?xml version="1.0" encoding="utf-8"?>
+<p:sld xmlns:a="http://schemas.openxmlformats.org/drawingml/2006/main" xmlns:r="http://schemas.openxmlformats.org/officeDocument/2006/relationships" xmlns:p="http://schemas.openxmlformats.org/presentationml/2006/main">
+  <p:cSld>
+    <p:spTree>
+      <p:nvGrpSpPr>
+        <p:cNvPr id="1" name=""/>
+        <p:cNvGrpSpPr/>
+        <p:nvPr/>
+      </p:nvGrpSpPr>
+      <p:grpSpPr/>
+      <p:sp>
+        <p:nvSpPr>
           <p:cNvPr id="2" name="Title 1"/>
           <p:cNvSpPr>
             <a:spLocks noGrp="1"/>
@@ -4325,7 +6028,801 @@
           <a:p>
             <a:r>
               <a:rPr lang="en-US"/>
-              <a:t>Step 1 -- Load data</a:t>
+              <a:t>Flow chart</a:t>
+            </a:r>
+            <a:endParaRPr lang="en-US"/>
+          </a:p>
+        </p:txBody>
+      </p:sp>
+      <p:sp>
+        <p:nvSpPr>
+          <p:cNvPr id="4" name="Rectangles 3"/>
+          <p:cNvSpPr/>
+          <p:nvPr/>
+        </p:nvSpPr>
+        <p:spPr>
+          <a:xfrm>
+            <a:off x="344170" y="3101975"/>
+            <a:ext cx="1751965" cy="654050"/>
+          </a:xfrm>
+          <a:prstGeom prst="rect">
+            <a:avLst/>
+          </a:prstGeom>
+        </p:spPr>
+        <p:style>
+          <a:lnRef idx="2">
+            <a:schemeClr val="accent1">
+              <a:lumMod val="75000"/>
+            </a:schemeClr>
+          </a:lnRef>
+          <a:fillRef idx="1">
+            <a:schemeClr val="accent1"/>
+          </a:fillRef>
+          <a:effectRef idx="0">
+            <a:srgbClr val="FFFFFF"/>
+          </a:effectRef>
+          <a:fontRef idx="minor">
+            <a:schemeClr val="lt1"/>
+          </a:fontRef>
+        </p:style>
+        <p:txBody>
+          <a:bodyPr rtlCol="0" anchor="ctr"/>
+          <a:p>
+            <a:pPr algn="ctr"/>
+            <a:r>
+              <a:rPr lang="en-US" b="1"/>
+              <a:t>Load data</a:t>
+            </a:r>
+            <a:endParaRPr lang="en-US" b="1"/>
+          </a:p>
+        </p:txBody>
+      </p:sp>
+      <p:sp>
+        <p:nvSpPr>
+          <p:cNvPr id="5" name="Rectangles 4"/>
+          <p:cNvSpPr/>
+          <p:nvPr>
+            <p:custDataLst>
+              <p:tags r:id="rId1"/>
+            </p:custDataLst>
+          </p:nvPr>
+        </p:nvSpPr>
+        <p:spPr>
+          <a:xfrm>
+            <a:off x="2713355" y="3101975"/>
+            <a:ext cx="1751965" cy="654050"/>
+          </a:xfrm>
+          <a:prstGeom prst="rect">
+            <a:avLst/>
+          </a:prstGeom>
+        </p:spPr>
+        <p:style>
+          <a:lnRef idx="2">
+            <a:schemeClr val="accent1">
+              <a:lumMod val="75000"/>
+            </a:schemeClr>
+          </a:lnRef>
+          <a:fillRef idx="1">
+            <a:schemeClr val="accent1"/>
+          </a:fillRef>
+          <a:effectRef idx="0">
+            <a:srgbClr val="FFFFFF"/>
+          </a:effectRef>
+          <a:fontRef idx="minor">
+            <a:schemeClr val="lt1"/>
+          </a:fontRef>
+        </p:style>
+        <p:txBody>
+          <a:bodyPr rtlCol="0" anchor="ctr"/>
+          <a:p>
+            <a:pPr algn="ctr"/>
+            <a:r>
+              <a:rPr lang="en-US" b="1">
+                <a:sym typeface="+mn-ea"/>
+              </a:rPr>
+              <a:t>Configure settings</a:t>
+            </a:r>
+            <a:endParaRPr lang="en-US" b="1"/>
+          </a:p>
+        </p:txBody>
+      </p:sp>
+      <p:sp>
+        <p:nvSpPr>
+          <p:cNvPr id="6" name="Rectangles 5"/>
+          <p:cNvSpPr/>
+          <p:nvPr>
+            <p:custDataLst>
+              <p:tags r:id="rId2"/>
+            </p:custDataLst>
+          </p:nvPr>
+        </p:nvSpPr>
+        <p:spPr>
+          <a:xfrm>
+            <a:off x="7451725" y="3101975"/>
+            <a:ext cx="1751965" cy="654050"/>
+          </a:xfrm>
+          <a:prstGeom prst="rect">
+            <a:avLst/>
+          </a:prstGeom>
+        </p:spPr>
+        <p:style>
+          <a:lnRef idx="2">
+            <a:schemeClr val="accent1">
+              <a:lumMod val="75000"/>
+            </a:schemeClr>
+          </a:lnRef>
+          <a:fillRef idx="1">
+            <a:schemeClr val="accent1"/>
+          </a:fillRef>
+          <a:effectRef idx="0">
+            <a:srgbClr val="FFFFFF"/>
+          </a:effectRef>
+          <a:fontRef idx="minor">
+            <a:schemeClr val="lt1"/>
+          </a:fontRef>
+        </p:style>
+        <p:txBody>
+          <a:bodyPr rtlCol="0" anchor="ctr"/>
+          <a:p>
+            <a:pPr algn="ctr"/>
+            <a:r>
+              <a:rPr lang="en-US" altLang="en-US" b="1"/>
+              <a:t>Result display</a:t>
+            </a:r>
+            <a:endParaRPr lang="en-US" altLang="en-US" b="1"/>
+          </a:p>
+        </p:txBody>
+      </p:sp>
+      <p:sp>
+        <p:nvSpPr>
+          <p:cNvPr id="7" name="Rectangles 6"/>
+          <p:cNvSpPr/>
+          <p:nvPr>
+            <p:custDataLst>
+              <p:tags r:id="rId3"/>
+            </p:custDataLst>
+          </p:nvPr>
+        </p:nvSpPr>
+        <p:spPr>
+          <a:xfrm>
+            <a:off x="9820910" y="3101975"/>
+            <a:ext cx="1751965" cy="654050"/>
+          </a:xfrm>
+          <a:prstGeom prst="rect">
+            <a:avLst/>
+          </a:prstGeom>
+        </p:spPr>
+        <p:style>
+          <a:lnRef idx="2">
+            <a:schemeClr val="accent1">
+              <a:lumMod val="75000"/>
+            </a:schemeClr>
+          </a:lnRef>
+          <a:fillRef idx="1">
+            <a:schemeClr val="accent1"/>
+          </a:fillRef>
+          <a:effectRef idx="0">
+            <a:srgbClr val="FFFFFF"/>
+          </a:effectRef>
+          <a:fontRef idx="minor">
+            <a:schemeClr val="lt1"/>
+          </a:fontRef>
+        </p:style>
+        <p:txBody>
+          <a:bodyPr rtlCol="0" anchor="ctr"/>
+          <a:p>
+            <a:pPr algn="ctr"/>
+            <a:r>
+              <a:rPr lang="en-US" altLang="en-US" b="1"/>
+              <a:t>Coefficeint analysis</a:t>
+            </a:r>
+            <a:endParaRPr lang="en-US" altLang="en-US" b="1"/>
+          </a:p>
+        </p:txBody>
+      </p:sp>
+      <p:cxnSp>
+        <p:nvCxnSpPr>
+          <p:cNvPr id="8" name="Straight Arrow Connector 7"/>
+          <p:cNvCxnSpPr>
+            <a:stCxn id="4" idx="3"/>
+            <a:endCxn id="5" idx="1"/>
+          </p:cNvCxnSpPr>
+          <p:nvPr>
+            <p:custDataLst>
+              <p:tags r:id="rId4"/>
+            </p:custDataLst>
+          </p:nvPr>
+        </p:nvCxnSpPr>
+        <p:spPr>
+          <a:xfrm>
+            <a:off x="2096135" y="3429000"/>
+            <a:ext cx="617220" cy="0"/>
+          </a:xfrm>
+          <a:prstGeom prst="straightConnector1">
+            <a:avLst/>
+          </a:prstGeom>
+          <a:ln>
+            <a:tailEnd type="arrow"/>
+          </a:ln>
+        </p:spPr>
+        <p:style>
+          <a:lnRef idx="2">
+            <a:schemeClr val="accent1"/>
+          </a:lnRef>
+          <a:fillRef idx="0">
+            <a:srgbClr val="FFFFFF"/>
+          </a:fillRef>
+          <a:effectRef idx="0">
+            <a:srgbClr val="FFFFFF"/>
+          </a:effectRef>
+          <a:fontRef idx="minor">
+            <a:schemeClr val="tx1"/>
+          </a:fontRef>
+        </p:style>
+      </p:cxnSp>
+      <p:cxnSp>
+        <p:nvCxnSpPr>
+          <p:cNvPr id="10" name="Straight Arrow Connector 9"/>
+          <p:cNvCxnSpPr>
+            <a:stCxn id="6" idx="3"/>
+            <a:endCxn id="7" idx="1"/>
+          </p:cNvCxnSpPr>
+          <p:nvPr>
+            <p:custDataLst>
+              <p:tags r:id="rId5"/>
+            </p:custDataLst>
+          </p:nvPr>
+        </p:nvCxnSpPr>
+        <p:spPr>
+          <a:xfrm>
+            <a:off x="9203690" y="3429000"/>
+            <a:ext cx="617220" cy="0"/>
+          </a:xfrm>
+          <a:prstGeom prst="straightConnector1">
+            <a:avLst/>
+          </a:prstGeom>
+          <a:ln>
+            <a:tailEnd type="arrow"/>
+          </a:ln>
+        </p:spPr>
+        <p:style>
+          <a:lnRef idx="2">
+            <a:schemeClr val="accent1"/>
+          </a:lnRef>
+          <a:fillRef idx="0">
+            <a:srgbClr val="FFFFFF"/>
+          </a:fillRef>
+          <a:effectRef idx="0">
+            <a:srgbClr val="FFFFFF"/>
+          </a:effectRef>
+          <a:fontRef idx="minor">
+            <a:schemeClr val="tx1"/>
+          </a:fontRef>
+        </p:style>
+      </p:cxnSp>
+      <p:sp>
+        <p:nvSpPr>
+          <p:cNvPr id="11" name="Text Box 10"/>
+          <p:cNvSpPr txBox="1"/>
+          <p:nvPr>
+            <p:custDataLst>
+              <p:tags r:id="rId6"/>
+            </p:custDataLst>
+          </p:nvPr>
+        </p:nvSpPr>
+        <p:spPr>
+          <a:xfrm>
+            <a:off x="2407285" y="3956050"/>
+            <a:ext cx="3035300" cy="1076325"/>
+          </a:xfrm>
+          <a:prstGeom prst="rect">
+            <a:avLst/>
+          </a:prstGeom>
+          <a:noFill/>
+        </p:spPr>
+        <p:txBody>
+          <a:bodyPr wrap="square" rtlCol="0" anchor="t">
+            <a:spAutoFit/>
+          </a:bodyPr>
+          <a:p>
+            <a:pPr marL="285750" indent="-285750">
+              <a:buFont typeface="Arial" panose="020B0604020202020204" pitchFamily="34" charset="0"/>
+              <a:buChar char="•"/>
+            </a:pPr>
+            <a:r>
+              <a:rPr lang="en-US" sz="1600" b="1">
+                <a:sym typeface="+mn-ea"/>
+              </a:rPr>
+              <a:t>Extremum Objective</a:t>
+            </a:r>
+            <a:endParaRPr lang="en-US" sz="1600" b="1">
+              <a:sym typeface="+mn-ea"/>
+            </a:endParaRPr>
+          </a:p>
+          <a:p>
+            <a:pPr marL="285750" indent="-285750">
+              <a:buFont typeface="Arial" panose="020B0604020202020204" pitchFamily="34" charset="0"/>
+              <a:buChar char="•"/>
+            </a:pPr>
+            <a:r>
+              <a:rPr lang="en-US" sz="1600" b="1">
+                <a:sym typeface="+mn-ea"/>
+              </a:rPr>
+              <a:t>Normalization Standard</a:t>
+            </a:r>
+            <a:endParaRPr lang="en-US" sz="1600">
+              <a:sym typeface="+mn-ea"/>
+            </a:endParaRPr>
+          </a:p>
+          <a:p>
+            <a:pPr marL="285750" indent="-285750">
+              <a:buFont typeface="Arial" panose="020B0604020202020204" pitchFamily="34" charset="0"/>
+              <a:buChar char="•"/>
+            </a:pPr>
+            <a:r>
+              <a:rPr lang="en-US" sz="1600" b="1">
+                <a:sym typeface="+mn-ea"/>
+              </a:rPr>
+              <a:t>Regularization Parameter</a:t>
+            </a:r>
+            <a:endParaRPr lang="en-US" sz="1600" b="1">
+              <a:sym typeface="+mn-ea"/>
+            </a:endParaRPr>
+          </a:p>
+          <a:p>
+            <a:pPr marL="285750" indent="-285750">
+              <a:buFont typeface="Arial" panose="020B0604020202020204" pitchFamily="34" charset="0"/>
+              <a:buChar char="•"/>
+            </a:pPr>
+            <a:r>
+              <a:rPr lang="en-US" sz="1600" b="1">
+                <a:sym typeface="+mn-ea"/>
+              </a:rPr>
+              <a:t>Select Factors to Include</a:t>
+            </a:r>
+            <a:endParaRPr lang="en-US" sz="1600" b="1">
+              <a:sym typeface="+mn-ea"/>
+            </a:endParaRPr>
+          </a:p>
+        </p:txBody>
+      </p:sp>
+      <p:sp>
+        <p:nvSpPr>
+          <p:cNvPr id="12" name="Rectangles 11"/>
+          <p:cNvSpPr/>
+          <p:nvPr>
+            <p:custDataLst>
+              <p:tags r:id="rId7"/>
+            </p:custDataLst>
+          </p:nvPr>
+        </p:nvSpPr>
+        <p:spPr>
+          <a:xfrm>
+            <a:off x="5082540" y="3101975"/>
+            <a:ext cx="1751965" cy="654050"/>
+          </a:xfrm>
+          <a:prstGeom prst="rect">
+            <a:avLst/>
+          </a:prstGeom>
+        </p:spPr>
+        <p:style>
+          <a:lnRef idx="2">
+            <a:schemeClr val="accent1">
+              <a:lumMod val="75000"/>
+            </a:schemeClr>
+          </a:lnRef>
+          <a:fillRef idx="1">
+            <a:schemeClr val="accent1"/>
+          </a:fillRef>
+          <a:effectRef idx="0">
+            <a:srgbClr val="FFFFFF"/>
+          </a:effectRef>
+          <a:fontRef idx="minor">
+            <a:schemeClr val="lt1"/>
+          </a:fontRef>
+        </p:style>
+        <p:txBody>
+          <a:bodyPr rtlCol="0" anchor="ctr"/>
+          <a:p>
+            <a:pPr algn="ctr"/>
+            <a:r>
+              <a:rPr lang="en-US" sz="1400" b="1">
+                <a:sym typeface="+mn-ea"/>
+              </a:rPr>
+              <a:t>Data processing</a:t>
+            </a:r>
+            <a:endParaRPr lang="en-US" sz="1400" b="1">
+              <a:sym typeface="+mn-ea"/>
+            </a:endParaRPr>
+          </a:p>
+          <a:p>
+            <a:pPr algn="ctr"/>
+            <a:r>
+              <a:rPr lang="en-US" sz="1400" b="1"/>
+              <a:t>based on CSR equation</a:t>
+            </a:r>
+            <a:endParaRPr lang="en-US" sz="1400" b="1"/>
+          </a:p>
+        </p:txBody>
+      </p:sp>
+      <p:cxnSp>
+        <p:nvCxnSpPr>
+          <p:cNvPr id="13" name="Straight Arrow Connector 12"/>
+          <p:cNvCxnSpPr>
+            <a:endCxn id="12" idx="1"/>
+          </p:cNvCxnSpPr>
+          <p:nvPr>
+            <p:custDataLst>
+              <p:tags r:id="rId8"/>
+            </p:custDataLst>
+          </p:nvPr>
+        </p:nvCxnSpPr>
+        <p:spPr>
+          <a:xfrm>
+            <a:off x="4465320" y="3429000"/>
+            <a:ext cx="617220" cy="0"/>
+          </a:xfrm>
+          <a:prstGeom prst="straightConnector1">
+            <a:avLst/>
+          </a:prstGeom>
+          <a:ln>
+            <a:tailEnd type="arrow"/>
+          </a:ln>
+        </p:spPr>
+        <p:style>
+          <a:lnRef idx="2">
+            <a:schemeClr val="accent1"/>
+          </a:lnRef>
+          <a:fillRef idx="0">
+            <a:srgbClr val="FFFFFF"/>
+          </a:fillRef>
+          <a:effectRef idx="0">
+            <a:srgbClr val="FFFFFF"/>
+          </a:effectRef>
+          <a:fontRef idx="minor">
+            <a:schemeClr val="tx1"/>
+          </a:fontRef>
+        </p:style>
+      </p:cxnSp>
+      <p:cxnSp>
+        <p:nvCxnSpPr>
+          <p:cNvPr id="14" name="Straight Arrow Connector 13"/>
+          <p:cNvCxnSpPr/>
+          <p:nvPr>
+            <p:custDataLst>
+              <p:tags r:id="rId9"/>
+            </p:custDataLst>
+          </p:nvPr>
+        </p:nvCxnSpPr>
+        <p:spPr>
+          <a:xfrm>
+            <a:off x="6834505" y="3429000"/>
+            <a:ext cx="617220" cy="0"/>
+          </a:xfrm>
+          <a:prstGeom prst="straightConnector1">
+            <a:avLst/>
+          </a:prstGeom>
+          <a:ln>
+            <a:tailEnd type="arrow"/>
+          </a:ln>
+        </p:spPr>
+        <p:style>
+          <a:lnRef idx="2">
+            <a:schemeClr val="accent1"/>
+          </a:lnRef>
+          <a:fillRef idx="0">
+            <a:srgbClr val="FFFFFF"/>
+          </a:fillRef>
+          <a:effectRef idx="0">
+            <a:srgbClr val="FFFFFF"/>
+          </a:effectRef>
+          <a:fontRef idx="minor">
+            <a:schemeClr val="tx1"/>
+          </a:fontRef>
+        </p:style>
+      </p:cxnSp>
+      <p:sp>
+        <p:nvSpPr>
+          <p:cNvPr id="15" name="Text Box 14"/>
+          <p:cNvSpPr txBox="1"/>
+          <p:nvPr>
+            <p:custDataLst>
+              <p:tags r:id="rId10"/>
+            </p:custDataLst>
+          </p:nvPr>
+        </p:nvSpPr>
+        <p:spPr>
+          <a:xfrm>
+            <a:off x="6785610" y="3956050"/>
+            <a:ext cx="3035300" cy="1322070"/>
+          </a:xfrm>
+          <a:prstGeom prst="rect">
+            <a:avLst/>
+          </a:prstGeom>
+          <a:noFill/>
+        </p:spPr>
+        <p:txBody>
+          <a:bodyPr wrap="square" rtlCol="0" anchor="t">
+            <a:spAutoFit/>
+          </a:bodyPr>
+          <a:p>
+            <a:pPr marL="285750" indent="-285750">
+              <a:buFont typeface="Arial" panose="020B0604020202020204" pitchFamily="34" charset="0"/>
+              <a:buChar char="•"/>
+            </a:pPr>
+            <a:r>
+              <a:rPr lang="en-US" altLang="en-US" sz="1600" b="1">
+                <a:sym typeface="+mn-ea"/>
+              </a:rPr>
+              <a:t>CSR Equation</a:t>
+            </a:r>
+            <a:endParaRPr lang="en-US" sz="1600" b="1">
+              <a:sym typeface="+mn-ea"/>
+            </a:endParaRPr>
+          </a:p>
+          <a:p>
+            <a:pPr marL="285750" indent="-285750">
+              <a:buFont typeface="Arial" panose="020B0604020202020204" pitchFamily="34" charset="0"/>
+              <a:buChar char="•"/>
+            </a:pPr>
+            <a:r>
+              <a:rPr lang="en-US" altLang="en-US" sz="1600" b="1">
+                <a:sym typeface="+mn-ea"/>
+              </a:rPr>
+              <a:t>CSR Response Surface Plot</a:t>
+            </a:r>
+            <a:endParaRPr lang="en-US" altLang="en-US" sz="1600" b="1">
+              <a:sym typeface="+mn-ea"/>
+            </a:endParaRPr>
+          </a:p>
+          <a:p>
+            <a:pPr marL="285750" indent="-285750">
+              <a:buFont typeface="Arial" panose="020B0604020202020204" pitchFamily="34" charset="0"/>
+              <a:buChar char="•"/>
+            </a:pPr>
+            <a:r>
+              <a:rPr lang="en-US" altLang="en-US" sz="1600" b="1">
+                <a:sym typeface="+mn-ea"/>
+              </a:rPr>
+              <a:t>Extremum</a:t>
+            </a:r>
+            <a:endParaRPr lang="en-US" altLang="en-US" sz="1600" b="1">
+              <a:sym typeface="+mn-ea"/>
+            </a:endParaRPr>
+          </a:p>
+          <a:p>
+            <a:pPr marL="285750" indent="-285750">
+              <a:buFont typeface="Arial" panose="020B0604020202020204" pitchFamily="34" charset="0"/>
+              <a:buChar char="•"/>
+            </a:pPr>
+            <a:r>
+              <a:rPr lang="en-US" altLang="en-US" sz="1600" b="1">
+                <a:sym typeface="+mn-ea"/>
+              </a:rPr>
+              <a:t>Actual vs. Predicted Values</a:t>
+            </a:r>
+            <a:endParaRPr lang="en-US" altLang="en-US" sz="1600" b="1">
+              <a:sym typeface="+mn-ea"/>
+            </a:endParaRPr>
+          </a:p>
+          <a:p>
+            <a:pPr marL="285750" indent="-285750">
+              <a:buFont typeface="Arial" panose="020B0604020202020204" pitchFamily="34" charset="0"/>
+              <a:buChar char="•"/>
+            </a:pPr>
+            <a:r>
+              <a:rPr lang="en-US" sz="1600" b="1">
+                <a:sym typeface="+mn-ea"/>
+              </a:rPr>
+              <a:t>R-square, mean squared error</a:t>
+            </a:r>
+            <a:endParaRPr lang="en-US" sz="1600" b="1">
+              <a:sym typeface="+mn-ea"/>
+            </a:endParaRPr>
+          </a:p>
+        </p:txBody>
+      </p:sp>
+      <p:sp>
+        <p:nvSpPr>
+          <p:cNvPr id="9" name="Text Box 14"/>
+          <p:cNvSpPr txBox="1"/>
+          <p:nvPr>
+            <p:custDataLst>
+              <p:tags r:id="rId11"/>
+            </p:custDataLst>
+          </p:nvPr>
+        </p:nvSpPr>
+        <p:spPr>
+          <a:xfrm>
+            <a:off x="9605010" y="3956050"/>
+            <a:ext cx="2586355" cy="1322070"/>
+          </a:xfrm>
+          <a:prstGeom prst="rect">
+            <a:avLst/>
+          </a:prstGeom>
+          <a:noFill/>
+        </p:spPr>
+        <p:txBody>
+          <a:bodyPr wrap="square" rtlCol="0" anchor="t">
+            <a:spAutoFit/>
+          </a:bodyPr>
+          <a:p>
+            <a:pPr marL="285750" indent="-285750">
+              <a:buFont typeface="Arial" panose="020B0604020202020204" pitchFamily="34" charset="0"/>
+              <a:buChar char="•"/>
+            </a:pPr>
+            <a:r>
+              <a:rPr lang="en-US" altLang="en-US" sz="1600" b="1">
+                <a:sym typeface="+mn-ea"/>
+              </a:rPr>
+              <a:t>Pie chart analysis of </a:t>
+            </a:r>
+            <a:r>
+              <a:rPr lang="en-US" sz="1600">
+                <a:sym typeface="+mn-ea"/>
+              </a:rPr>
+              <a:t>distribution of the CSR equation coefficients </a:t>
+            </a:r>
+            <a:r>
+              <a:rPr lang="en-US" altLang="zh-CN" sz="1600">
+                <a:sym typeface="+mn-ea"/>
+              </a:rPr>
+              <a:t>x</a:t>
+            </a:r>
+            <a:r>
+              <a:rPr lang="en-US" altLang="en-US" sz="1600">
+                <a:sym typeface="+mn-ea"/>
+              </a:rPr>
+              <a:t>₀</a:t>
+            </a:r>
+            <a:r>
+              <a:rPr lang="en-US" altLang="zh-CN" sz="1600">
+                <a:sym typeface="+mn-ea"/>
+              </a:rPr>
+              <a:t>, x</a:t>
+            </a:r>
+            <a:r>
+              <a:rPr lang="en-US" altLang="en-US" sz="1600">
+                <a:sym typeface="+mn-ea"/>
+              </a:rPr>
+              <a:t>ᵢ</a:t>
+            </a:r>
+            <a:r>
+              <a:rPr lang="en-US" altLang="zh-CN" sz="1600">
+                <a:sym typeface="+mn-ea"/>
+              </a:rPr>
+              <a:t>, x</a:t>
+            </a:r>
+            <a:r>
+              <a:rPr lang="en-US" altLang="en-US" sz="1600">
+                <a:sym typeface="+mn-ea"/>
+              </a:rPr>
+              <a:t>ᵢᵢ and </a:t>
+            </a:r>
+            <a:r>
+              <a:rPr lang="en-US" altLang="zh-CN" sz="1600">
+                <a:sym typeface="+mn-ea"/>
+              </a:rPr>
+              <a:t>x</a:t>
+            </a:r>
+            <a:r>
+              <a:rPr lang="en-US" altLang="en-US" sz="1600">
+                <a:sym typeface="+mn-ea"/>
+              </a:rPr>
+              <a:t>ᵢⱼ</a:t>
+            </a:r>
+            <a:endParaRPr lang="en-US" sz="1600"/>
+          </a:p>
+          <a:p>
+            <a:pPr marL="285750" indent="-285750">
+              <a:buFont typeface="Arial" panose="020B0604020202020204" pitchFamily="34" charset="0"/>
+              <a:buChar char="•"/>
+            </a:pPr>
+            <a:endParaRPr lang="en-US" sz="1600" b="1">
+              <a:sym typeface="+mn-ea"/>
+            </a:endParaRPr>
+          </a:p>
+        </p:txBody>
+      </p:sp>
+    </p:spTree>
+  </p:cSld>
+  <p:clrMapOvr>
+    <a:masterClrMapping/>
+  </p:clrMapOvr>
+</p:sld>
+</file>
+
+<file path=ppt/slides/slide8.xml><?xml version="1.0" encoding="utf-8"?>
+<p:sld xmlns:a="http://schemas.openxmlformats.org/drawingml/2006/main" xmlns:r="http://schemas.openxmlformats.org/officeDocument/2006/relationships" xmlns:p="http://schemas.openxmlformats.org/presentationml/2006/main">
+  <p:cSld>
+    <p:spTree>
+      <p:nvGrpSpPr>
+        <p:cNvPr id="1" name=""/>
+        <p:cNvGrpSpPr/>
+        <p:nvPr/>
+      </p:nvGrpSpPr>
+      <p:grpSpPr/>
+      <p:sp>
+        <p:nvSpPr>
+          <p:cNvPr id="2" name="标题 1"/>
+          <p:cNvSpPr>
+            <a:spLocks noGrp="1"/>
+          </p:cNvSpPr>
+          <p:nvPr>
+            <p:ph type="title"/>
+          </p:nvPr>
+        </p:nvSpPr>
+        <p:spPr/>
+        <p:txBody>
+          <a:bodyPr/>
+          <a:p>
+            <a:r>
+              <a:rPr lang="en-US">
+                <a:sym typeface="+mn-ea"/>
+              </a:rPr>
+              <a:t>Step 1 -- </a:t>
+            </a:r>
+            <a:r>
+              <a:rPr lang="en-US" altLang="zh-CN"/>
+              <a:t>OACD table generation</a:t>
+            </a:r>
+            <a:endParaRPr lang="en-US" altLang="zh-CN"/>
+          </a:p>
+        </p:txBody>
+      </p:sp>
+      <p:sp>
+        <p:nvSpPr>
+          <p:cNvPr id="3" name="内容占位符 2"/>
+          <p:cNvSpPr>
+            <a:spLocks noGrp="1"/>
+          </p:cNvSpPr>
+          <p:nvPr>
+            <p:ph idx="1"/>
+          </p:nvPr>
+        </p:nvSpPr>
+        <p:spPr/>
+        <p:txBody>
+          <a:bodyPr/>
+          <a:p>
+            <a:endParaRPr lang="zh-CN" altLang="en-US"/>
+          </a:p>
+        </p:txBody>
+      </p:sp>
+    </p:spTree>
+  </p:cSld>
+  <p:clrMapOvr>
+    <a:masterClrMapping/>
+  </p:clrMapOvr>
+</p:sld>
+</file>
+
+<file path=ppt/slides/slide9.xml><?xml version="1.0" encoding="utf-8"?>
+<p:sld xmlns:a="http://schemas.openxmlformats.org/drawingml/2006/main" xmlns:r="http://schemas.openxmlformats.org/officeDocument/2006/relationships" xmlns:p="http://schemas.openxmlformats.org/presentationml/2006/main">
+  <p:cSld>
+    <p:spTree>
+      <p:nvGrpSpPr>
+        <p:cNvPr id="1" name=""/>
+        <p:cNvGrpSpPr/>
+        <p:nvPr/>
+      </p:nvGrpSpPr>
+      <p:grpSpPr/>
+      <p:sp>
+        <p:nvSpPr>
+          <p:cNvPr id="2" name="Title 1"/>
+          <p:cNvSpPr>
+            <a:spLocks noGrp="1"/>
+          </p:cNvSpPr>
+          <p:nvPr>
+            <p:ph type="title"/>
+          </p:nvPr>
+        </p:nvSpPr>
+        <p:spPr/>
+        <p:txBody>
+          <a:bodyPr/>
+          <a:p>
+            <a:r>
+              <a:rPr lang="en-US"/>
+              <a:t>Step 2 -- Load data</a:t>
             </a:r>
             <a:endParaRPr lang="en-US"/>
           </a:p>
@@ -4451,874 +6948,70 @@
 </p:sld>
 </file>
 
-<file path=ppt/slides/slide4.xml><?xml version="1.0" encoding="utf-8"?>
-<p:sld xmlns:a="http://schemas.openxmlformats.org/drawingml/2006/main" xmlns:r="http://schemas.openxmlformats.org/officeDocument/2006/relationships" xmlns:p="http://schemas.openxmlformats.org/presentationml/2006/main">
-  <p:cSld>
-    <p:spTree>
-      <p:nvGrpSpPr>
-        <p:cNvPr id="1" name=""/>
-        <p:cNvGrpSpPr/>
-        <p:nvPr/>
-      </p:nvGrpSpPr>
-      <p:grpSpPr/>
-      <p:sp>
-        <p:nvSpPr>
-          <p:cNvPr id="2" name="Title 1"/>
-          <p:cNvSpPr>
-            <a:spLocks noGrp="1"/>
-          </p:cNvSpPr>
-          <p:nvPr>
-            <p:ph type="title"/>
-          </p:nvPr>
-        </p:nvSpPr>
-        <p:spPr/>
-        <p:txBody>
-          <a:bodyPr/>
-          <a:p>
-            <a:r>
-              <a:rPr lang="en-US">
-                <a:sym typeface="+mn-ea"/>
-              </a:rPr>
-              <a:t>Step 2 -- Configure setting</a:t>
-            </a:r>
-            <a:endParaRPr lang="en-US"/>
-          </a:p>
-        </p:txBody>
-      </p:sp>
-      <mc:AlternateContent xmlns:mc="http://schemas.openxmlformats.org/markup-compatibility/2006">
-        <mc:Choice xmlns:a14="http://schemas.microsoft.com/office/drawing/2010/main" Requires="a14">
-          <p:sp>
-            <p:nvSpPr>
-              <p:cNvPr id="3" name="Content Placeholder 2"/>
-              <p:cNvSpPr>
-                <a:spLocks noGrp="1"/>
-              </p:cNvSpPr>
-              <p:nvPr>
-                <p:ph idx="1"/>
-              </p:nvPr>
-            </p:nvSpPr>
-            <p:spPr>
-              <a:xfrm>
-                <a:off x="521970" y="1825625"/>
-                <a:ext cx="11012805" cy="4351655"/>
-              </a:xfrm>
-            </p:spPr>
-            <p:txBody>
-              <a:bodyPr>
-                <a:noAutofit/>
-              </a:bodyPr>
-              <a:p>
-                <a:r>
-                  <a:rPr lang="en-US" b="1"/>
-                  <a:t>Extremum Objective</a:t>
-                </a:r>
-                <a:r>
-                  <a:rPr lang="en-US"/>
-                  <a:t>: Select between Maximum, Minimum, Maximum absolute value and </a:t>
-                </a:r>
-                <a:r>
-                  <a:rPr lang="en-US">
-                    <a:sym typeface="+mn-ea"/>
-                  </a:rPr>
-                  <a:t>Minimum absolute value </a:t>
-                </a:r>
-                <a:endParaRPr lang="en-US">
-                  <a:sym typeface="+mn-ea"/>
-                </a:endParaRPr>
-              </a:p>
-              <a:p>
-                <a:r>
-                  <a:rPr lang="en-US" b="1">
-                    <a:sym typeface="+mn-ea"/>
-                  </a:rPr>
-                  <a:t>Normalization Standard</a:t>
-                </a:r>
-                <a:r>
-                  <a:rPr lang="en-US">
-                    <a:sym typeface="+mn-ea"/>
-                  </a:rPr>
-                  <a:t>: Select between [-1, 1] and  [0, 1]</a:t>
-                </a:r>
-                <a:endParaRPr lang="en-US">
-                  <a:sym typeface="+mn-ea"/>
-                </a:endParaRPr>
-              </a:p>
-              <a:p>
-                <a:r>
-                  <a:rPr lang="en-US" b="1">
-                    <a:sym typeface="+mn-ea"/>
-                  </a:rPr>
-                  <a:t>Regularization Parameter</a:t>
-                </a:r>
-                <a:r>
-                  <a:rPr lang="en-US">
-                    <a:sym typeface="+mn-ea"/>
-                  </a:rPr>
-                  <a:t>: the parameter stands for the penalty term </a:t>
-                </a:r>
-                <a14:m>
-                  <m:oMath xmlns:m="http://schemas.openxmlformats.org/officeDocument/2006/math">
-                    <m:r>
-                      <a:rPr lang="en-US" i="1">
-                        <a:latin typeface="Cambria Math" panose="02040503050406030204" charset="0"/>
-                        <a:cs typeface="Cambria Math" panose="02040503050406030204" charset="0"/>
-                        <a:sym typeface="+mn-ea"/>
-                      </a:rPr>
-                      <m:t>𝛼</m:t>
-                    </m:r>
-                  </m:oMath>
-                </a14:m>
-                <a:r>
-                  <a:rPr lang="en-US">
-                    <a:sym typeface="+mn-ea"/>
-                  </a:rPr>
-                  <a:t> in ridge regression. Higher </a:t>
-                </a:r>
-                <a14:m>
-                  <m:oMath xmlns:m="http://schemas.openxmlformats.org/officeDocument/2006/math">
-                    <m:r>
-                      <a:rPr lang="en-US" i="1">
-                        <a:latin typeface="Cambria Math" panose="02040503050406030204" charset="0"/>
-                        <a:cs typeface="Cambria Math" panose="02040503050406030204" charset="0"/>
-                        <a:sym typeface="+mn-ea"/>
-                      </a:rPr>
-                      <m:t>𝛼</m:t>
-                    </m:r>
-                  </m:oMath>
-                </a14:m>
-                <a:r>
-                  <a:rPr lang="en-US">
-                    <a:sym typeface="+mn-ea"/>
-                  </a:rPr>
-                  <a:t> strongly penalizes higher function coefficients while lower </a:t>
-                </a:r>
-                <a14:m>
-                  <m:oMath xmlns:m="http://schemas.openxmlformats.org/officeDocument/2006/math">
-                    <m:r>
-                      <a:rPr lang="en-US" i="1">
-                        <a:latin typeface="Cambria Math" panose="02040503050406030204" charset="0"/>
-                        <a:cs typeface="Cambria Math" panose="02040503050406030204" charset="0"/>
-                        <a:sym typeface="+mn-ea"/>
-                      </a:rPr>
-                      <m:t>𝛼</m:t>
-                    </m:r>
-                  </m:oMath>
-                </a14:m>
-                <a:r>
-                  <a:rPr lang="en-US">
-                    <a:sym typeface="+mn-ea"/>
-                  </a:rPr>
-                  <a:t> encorages higher function coefficients. As a rule of thumb, if experimental data has small variation, use a small </a:t>
-                </a:r>
-                <a14:m>
-                  <m:oMath xmlns:m="http://schemas.openxmlformats.org/officeDocument/2006/math">
-                    <m:r>
-                      <a:rPr lang="en-US" i="1">
-                        <a:latin typeface="Cambria Math" panose="02040503050406030204" charset="0"/>
-                        <a:cs typeface="Cambria Math" panose="02040503050406030204" charset="0"/>
-                        <a:sym typeface="+mn-ea"/>
-                      </a:rPr>
-                      <m:t>𝛼</m:t>
-                    </m:r>
-                  </m:oMath>
-                </a14:m>
-                <a:r>
-                  <a:rPr lang="en-US">
-                    <a:sym typeface="+mn-ea"/>
-                  </a:rPr>
-                  <a:t>; if variation is high, use high </a:t>
-                </a:r>
-                <a14:m>
-                  <m:oMath xmlns:m="http://schemas.openxmlformats.org/officeDocument/2006/math">
-                    <m:r>
-                      <a:rPr lang="en-US" i="1">
-                        <a:latin typeface="Cambria Math" panose="02040503050406030204" charset="0"/>
-                        <a:cs typeface="Cambria Math" panose="02040503050406030204" charset="0"/>
-                        <a:sym typeface="+mn-ea"/>
-                      </a:rPr>
-                      <m:t>𝛼</m:t>
-                    </m:r>
-                  </m:oMath>
-                </a14:m>
-                <a:endParaRPr lang="en-US" i="1">
-                  <a:latin typeface="Cambria Math" panose="02040503050406030204" charset="0"/>
-                  <a:cs typeface="Cambria Math" panose="02040503050406030204" charset="0"/>
-                  <a:sym typeface="+mn-ea"/>
-                </a:endParaRPr>
-              </a:p>
-              <a:p>
-                <a:r>
-                  <a:rPr lang="en-US">
-                    <a:sym typeface="+mn-ea"/>
-                  </a:rPr>
-                  <a:t>In </a:t>
-                </a:r>
-                <a:r>
-                  <a:rPr lang="en-US" b="1">
-                    <a:sym typeface="+mn-ea"/>
-                  </a:rPr>
-                  <a:t>Active Factors in Optimization</a:t>
-                </a:r>
-                <a:r>
-                  <a:rPr lang="en-US">
-                    <a:sym typeface="+mn-ea"/>
-                  </a:rPr>
-                  <a:t>, select the maximum number of factors to include</a:t>
-                </a:r>
-                <a:endParaRPr lang="en-US">
-                  <a:sym typeface="+mn-ea"/>
-                </a:endParaRPr>
-              </a:p>
-              <a:p>
-                <a:endParaRPr lang="en-US" b="1">
-                  <a:sym typeface="+mn-ea"/>
-                </a:endParaRPr>
-              </a:p>
-            </p:txBody>
-          </p:sp>
-        </mc:Choice>
-        <mc:Fallback>
-          <p:sp>
-            <p:nvSpPr>
-              <p:cNvPr id="3" name="Content Placeholder 2"/>
-              <p:cNvSpPr>
-                <a:spLocks noRot="1" noChangeAspect="1" noMove="1" noResize="1" noEditPoints="1" noAdjustHandles="1" noChangeArrowheads="1" noChangeShapeType="1" noTextEdit="1"/>
-              </p:cNvSpPr>
-              <p:nvPr>
-                <p:ph idx="1"/>
-              </p:nvPr>
-            </p:nvSpPr>
-            <p:spPr>
-              <a:xfrm>
-                <a:off x="521970" y="1825625"/>
-                <a:ext cx="11012805" cy="4351655"/>
-              </a:xfrm>
-              <a:blipFill rotWithShape="1">
-                <a:blip r:embed="rId1"/>
-                <a:stretch>
-                  <a:fillRect b="-9675"/>
-                </a:stretch>
-              </a:blipFill>
-            </p:spPr>
-            <p:txBody>
-              <a:bodyPr/>
-              <a:lstStyle/>
-              <a:p>
-                <a:r>
-                  <a:rPr lang="zh-CN" altLang="en-US">
-                    <a:noFill/>
-                  </a:rPr>
-                  <a:t> </a:t>
-                </a:r>
-              </a:p>
-            </p:txBody>
-          </p:sp>
-        </mc:Fallback>
-      </mc:AlternateContent>
-    </p:spTree>
-  </p:cSld>
-  <p:clrMapOvr>
-    <a:masterClrMapping/>
-  </p:clrMapOvr>
-</p:sld>
+<file path=ppt/tags/tag1.xml><?xml version="1.0" encoding="utf-8"?>
+<p:tagLst xmlns:p="http://schemas.openxmlformats.org/presentationml/2006/main">
+  <p:tag name="KSO_WM_DIAGRAM_VIRTUALLY_FRAME" val="{&quot;height&quot;:171.35,&quot;left&quot;:165.05,&quot;top&quot;:244.25,&quot;width&quot;:746.2}"/>
+</p:tagLst>
 </file>
 
-<file path=ppt/slides/slide5.xml><?xml version="1.0" encoding="utf-8"?>
-<p:sld xmlns:a="http://schemas.openxmlformats.org/drawingml/2006/main" xmlns:r="http://schemas.openxmlformats.org/officeDocument/2006/relationships" xmlns:p="http://schemas.openxmlformats.org/presentationml/2006/main">
-  <p:cSld>
-    <p:spTree>
-      <p:nvGrpSpPr>
-        <p:cNvPr id="1" name=""/>
-        <p:cNvGrpSpPr/>
-        <p:nvPr/>
-      </p:nvGrpSpPr>
-      <p:grpSpPr/>
-      <p:sp>
-        <p:nvSpPr>
-          <p:cNvPr id="2" name="Title 1"/>
-          <p:cNvSpPr>
-            <a:spLocks noGrp="1"/>
-          </p:cNvSpPr>
-          <p:nvPr>
-            <p:ph type="title"/>
-          </p:nvPr>
-        </p:nvSpPr>
-        <p:spPr/>
-        <p:txBody>
-          <a:bodyPr/>
-          <a:p>
-            <a:r>
-              <a:rPr lang="en-US">
-                <a:sym typeface="+mn-ea"/>
-              </a:rPr>
-              <a:t>Step 2 -- Configure setting</a:t>
-            </a:r>
-            <a:endParaRPr lang="en-US"/>
-          </a:p>
-        </p:txBody>
-      </p:sp>
-      <p:sp>
-        <p:nvSpPr>
-          <p:cNvPr id="3" name="Content Placeholder 2"/>
-          <p:cNvSpPr>
-            <a:spLocks noGrp="1"/>
-          </p:cNvSpPr>
-          <p:nvPr>
-            <p:ph idx="1"/>
-          </p:nvPr>
-        </p:nvSpPr>
-        <p:spPr>
-          <a:xfrm>
-            <a:off x="521970" y="1825625"/>
-            <a:ext cx="11012805" cy="4351655"/>
-          </a:xfrm>
-        </p:spPr>
-        <p:txBody>
-          <a:bodyPr>
-            <a:noAutofit/>
-          </a:bodyPr>
-          <a:p>
-            <a:r>
-              <a:rPr lang="en-US" altLang="zh-CN">
-                <a:sym typeface="+mn-ea"/>
-              </a:rPr>
-              <a:t>Under </a:t>
-            </a:r>
-            <a:r>
-              <a:rPr lang="en-US" altLang="zh-CN" b="1">
-                <a:sym typeface="+mn-ea"/>
-              </a:rPr>
-              <a:t>Select Factors to Include</a:t>
-            </a:r>
-            <a:r>
-              <a:rPr lang="en-US" altLang="zh-CN">
-                <a:sym typeface="+mn-ea"/>
-              </a:rPr>
-              <a:t>, select if the parameter belongs to factor, result, or ignore</a:t>
-            </a:r>
-            <a:endParaRPr lang="en-US" altLang="zh-CN">
-              <a:sym typeface="+mn-ea"/>
-            </a:endParaRPr>
-          </a:p>
-          <a:p>
-            <a:r>
-              <a:rPr lang="en-US" altLang="zh-CN">
-                <a:sym typeface="+mn-ea"/>
-              </a:rPr>
-              <a:t>If a factor limitation is to be set, navigate to </a:t>
-            </a:r>
-            <a:r>
-              <a:rPr lang="en-US" altLang="zh-CN" b="1">
-                <a:sym typeface="+mn-ea"/>
-              </a:rPr>
-              <a:t>Factor Limits Section</a:t>
-            </a:r>
-            <a:r>
-              <a:rPr lang="en-US" altLang="zh-CN">
-                <a:sym typeface="+mn-ea"/>
-              </a:rPr>
-              <a:t>, select if the factor should be excluded or included in that limit, then set limit value at </a:t>
-            </a:r>
-            <a:r>
-              <a:rPr lang="en-US" altLang="zh-CN" b="1">
-                <a:sym typeface="+mn-ea"/>
-              </a:rPr>
-              <a:t>CSR Factor Limits</a:t>
-            </a:r>
-            <a:r>
-              <a:rPr lang="en-US" altLang="zh-CN">
-                <a:sym typeface="+mn-ea"/>
-              </a:rPr>
-              <a:t>, click add limit</a:t>
-            </a:r>
-            <a:endParaRPr lang="en-US" altLang="zh-CN">
-              <a:sym typeface="+mn-ea"/>
-            </a:endParaRPr>
-          </a:p>
-          <a:p>
-            <a:r>
-              <a:rPr lang="en-US" altLang="zh-CN">
-                <a:sym typeface="+mn-ea"/>
-              </a:rPr>
-              <a:t>After all is set, click on </a:t>
-            </a:r>
-            <a:r>
-              <a:rPr lang="en-US" altLang="zh-CN" b="1">
-                <a:sym typeface="+mn-ea"/>
-              </a:rPr>
-              <a:t>Run Fitting Process</a:t>
-            </a:r>
-            <a:endParaRPr lang="en-US" altLang="zh-CN">
-              <a:sym typeface="+mn-ea"/>
-            </a:endParaRPr>
-          </a:p>
-          <a:p>
-            <a:endParaRPr lang="en-US" altLang="zh-CN">
-              <a:sym typeface="+mn-ea"/>
-            </a:endParaRPr>
-          </a:p>
-        </p:txBody>
-      </p:sp>
-    </p:spTree>
-  </p:cSld>
-  <p:clrMapOvr>
-    <a:masterClrMapping/>
-  </p:clrMapOvr>
-</p:sld>
+<file path=ppt/tags/tag10.xml><?xml version="1.0" encoding="utf-8"?>
+<p:tagLst xmlns:p="http://schemas.openxmlformats.org/presentationml/2006/main">
+  <p:tag name="KSO_WM_DIAGRAM_VIRTUALLY_FRAME" val="{&quot;height&quot;:171.35,&quot;left&quot;:165.05,&quot;top&quot;:244.25,&quot;width&quot;:746.2}"/>
+</p:tagLst>
 </file>
 
-<file path=ppt/slides/slide6.xml><?xml version="1.0" encoding="utf-8"?>
-<p:sld xmlns:a="http://schemas.openxmlformats.org/drawingml/2006/main" xmlns:r="http://schemas.openxmlformats.org/officeDocument/2006/relationships" xmlns:p="http://schemas.openxmlformats.org/presentationml/2006/main">
-  <p:cSld>
-    <p:spTree>
-      <p:nvGrpSpPr>
-        <p:cNvPr id="1" name=""/>
-        <p:cNvGrpSpPr/>
-        <p:nvPr/>
-      </p:nvGrpSpPr>
-      <p:grpSpPr/>
-      <p:sp>
-        <p:nvSpPr>
-          <p:cNvPr id="2" name="Title 1"/>
-          <p:cNvSpPr>
-            <a:spLocks noGrp="1"/>
-          </p:cNvSpPr>
-          <p:nvPr>
-            <p:ph type="title"/>
-          </p:nvPr>
-        </p:nvSpPr>
-        <p:spPr/>
-        <p:txBody>
-          <a:bodyPr/>
-          <a:p>
-            <a:r>
-              <a:rPr lang="en-US">
-                <a:sym typeface="+mn-ea"/>
-              </a:rPr>
-              <a:t>Step 3 -- Result display</a:t>
-            </a:r>
-            <a:endParaRPr lang="en-US"/>
-          </a:p>
-        </p:txBody>
-      </p:sp>
-      <p:sp>
-        <p:nvSpPr>
-          <p:cNvPr id="3" name="Content Placeholder 2"/>
-          <p:cNvSpPr>
-            <a:spLocks noGrp="1"/>
-          </p:cNvSpPr>
-          <p:nvPr>
-            <p:ph idx="1"/>
-          </p:nvPr>
-        </p:nvSpPr>
-        <p:spPr>
-          <a:xfrm>
-            <a:off x="838200" y="1825625"/>
-            <a:ext cx="10515600" cy="4940935"/>
-          </a:xfrm>
-        </p:spPr>
-        <p:txBody>
-          <a:bodyPr>
-            <a:normAutofit lnSpcReduction="20000"/>
-          </a:bodyPr>
-          <a:p>
-            <a:pPr fontAlgn="auto">
-              <a:lnSpc>
-                <a:spcPct val="90000"/>
-              </a:lnSpc>
-              <a:spcBef>
-                <a:spcPts val="1300"/>
-              </a:spcBef>
-            </a:pPr>
-            <a:r>
-              <a:rPr lang="en-US" altLang="en-US" b="1"/>
-              <a:t>CSR Function</a:t>
-            </a:r>
-            <a:r>
-              <a:rPr lang="en-US" altLang="en-US"/>
-              <a:t> displays the numerical expression of the fitted function.</a:t>
-            </a:r>
-            <a:endParaRPr lang="en-US" altLang="en-US"/>
-          </a:p>
-          <a:p>
-            <a:pPr fontAlgn="auto">
-              <a:lnSpc>
-                <a:spcPct val="90000"/>
-              </a:lnSpc>
-              <a:spcBef>
-                <a:spcPts val="1300"/>
-              </a:spcBef>
-            </a:pPr>
-            <a:r>
-              <a:rPr lang="en-US" altLang="en-US" b="1"/>
-              <a:t>Factor Definitions</a:t>
-            </a:r>
-            <a:r>
-              <a:rPr lang="en-US" altLang="en-US"/>
-              <a:t> list the names of the parameters used in the function.</a:t>
-            </a:r>
-            <a:endParaRPr lang="en-US" altLang="en-US"/>
-          </a:p>
-          <a:p>
-            <a:pPr fontAlgn="auto">
-              <a:lnSpc>
-                <a:spcPct val="90000"/>
-              </a:lnSpc>
-              <a:spcBef>
-                <a:spcPts val="1300"/>
-              </a:spcBef>
-            </a:pPr>
-            <a:r>
-              <a:rPr lang="en-US" altLang="en-US" b="1"/>
-              <a:t>Extremum</a:t>
-            </a:r>
-            <a:r>
-              <a:rPr lang="en-US" altLang="en-US"/>
-              <a:t> indicates the maximum/minimum point of the plot. If multiple result columns are selected, then </a:t>
-            </a:r>
-            <a:r>
-              <a:rPr lang="en-US" altLang="en-US" b="1"/>
-              <a:t>Individual Results at Extremum</a:t>
-            </a:r>
-            <a:r>
-              <a:rPr lang="en-US" altLang="en-US"/>
-              <a:t> will be shown below</a:t>
-            </a:r>
-            <a:endParaRPr lang="en-US" altLang="en-US"/>
-          </a:p>
-          <a:p>
-            <a:pPr fontAlgn="auto">
-              <a:lnSpc>
-                <a:spcPct val="90000"/>
-              </a:lnSpc>
-              <a:spcBef>
-                <a:spcPts val="1300"/>
-              </a:spcBef>
-            </a:pPr>
-            <a:r>
-              <a:rPr lang="en-US" altLang="en-US" b="1"/>
-              <a:t>Model Fit</a:t>
-            </a:r>
-            <a:r>
-              <a:rPr lang="en-US" altLang="en-US"/>
-              <a:t> provides the R-square value of the model</a:t>
-            </a:r>
-            <a:endParaRPr lang="en-US" altLang="en-US"/>
-          </a:p>
-          <a:p>
-            <a:pPr fontAlgn="auto">
-              <a:lnSpc>
-                <a:spcPct val="90000"/>
-              </a:lnSpc>
-              <a:spcBef>
-                <a:spcPts val="1300"/>
-              </a:spcBef>
-            </a:pPr>
-            <a:r>
-              <a:rPr lang="en-US" altLang="en-US" b="1"/>
-              <a:t>Actual vs. Predicted Values</a:t>
-            </a:r>
-            <a:r>
-              <a:rPr lang="en-US" altLang="en-US"/>
-              <a:t> presents the deviations between predicted outcomes and observed data.</a:t>
-            </a:r>
-            <a:endParaRPr lang="en-US" altLang="en-US"/>
-          </a:p>
-          <a:p>
-            <a:pPr fontAlgn="auto">
-              <a:lnSpc>
-                <a:spcPct val="90000"/>
-              </a:lnSpc>
-              <a:spcBef>
-                <a:spcPts val="1300"/>
-              </a:spcBef>
-            </a:pPr>
-            <a:r>
-              <a:rPr lang="en-US" altLang="en-US" b="1"/>
-              <a:t>CSR Response Surface Plot</a:t>
-            </a:r>
-            <a:r>
-              <a:rPr lang="en-US" altLang="en-US"/>
-              <a:t> provides a graphical representation of the fitted CSR function.</a:t>
-            </a:r>
-            <a:endParaRPr lang="en-US" altLang="en-US"/>
-          </a:p>
-        </p:txBody>
-      </p:sp>
-    </p:spTree>
-  </p:cSld>
-  <p:clrMapOvr>
-    <a:masterClrMapping/>
-  </p:clrMapOvr>
-</p:sld>
+<file path=ppt/tags/tag11.xml><?xml version="1.0" encoding="utf-8"?>
+<p:tagLst xmlns:p="http://schemas.openxmlformats.org/presentationml/2006/main">
+  <p:tag name="KSO_WM_DIAGRAM_VIRTUALLY_FRAME" val="{&quot;height&quot;:152,&quot;left&quot;:165.05,&quot;top&quot;:244.25,&quot;width&quot;:746.2}"/>
+</p:tagLst>
 </file>
 
-<file path=ppt/slides/slide7.xml><?xml version="1.0" encoding="utf-8"?>
-<p:sld xmlns:a="http://schemas.openxmlformats.org/drawingml/2006/main" xmlns:r="http://schemas.openxmlformats.org/officeDocument/2006/relationships" xmlns:p="http://schemas.openxmlformats.org/presentationml/2006/main">
-  <p:cSld>
-    <p:spTree>
-      <p:nvGrpSpPr>
-        <p:cNvPr id="1" name=""/>
-        <p:cNvGrpSpPr/>
-        <p:nvPr/>
-      </p:nvGrpSpPr>
-      <p:grpSpPr/>
-      <p:sp>
-        <p:nvSpPr>
-          <p:cNvPr id="2" name="Title 1"/>
-          <p:cNvSpPr>
-            <a:spLocks noGrp="1"/>
-          </p:cNvSpPr>
-          <p:nvPr>
-            <p:ph type="title"/>
-          </p:nvPr>
-        </p:nvSpPr>
-        <p:spPr/>
-        <p:txBody>
-          <a:bodyPr/>
-          <a:p>
-            <a:r>
-              <a:rPr lang="en-US">
-                <a:sym typeface="+mn-ea"/>
-              </a:rPr>
-              <a:t>Step 4 -- Coefficeint analysis</a:t>
-            </a:r>
-            <a:endParaRPr lang="en-US"/>
-          </a:p>
-        </p:txBody>
-      </p:sp>
-      <mc:AlternateContent xmlns:mc="http://schemas.openxmlformats.org/markup-compatibility/2006">
-        <mc:Choice xmlns:a14="http://schemas.microsoft.com/office/drawing/2010/main" Requires="a14">
-          <p:sp>
-            <p:nvSpPr>
-              <p:cNvPr id="3" name="Content Placeholder 2"/>
-              <p:cNvSpPr>
-                <a:spLocks noGrp="1"/>
-              </p:cNvSpPr>
-              <p:nvPr>
-                <p:ph idx="1"/>
-              </p:nvPr>
-            </p:nvSpPr>
-            <p:spPr/>
-            <p:txBody>
-              <a:bodyPr/>
-              <a:p>
-                <a:r>
-                  <a:rPr lang="en-US" altLang="en-US">
-                    <a:sym typeface="+mn-ea"/>
-                  </a:rPr>
-                  <a:t>Navigate to the</a:t>
-                </a:r>
-                <a:r>
-                  <a:rPr lang="en-US">
-                    <a:sym typeface="+mn-ea"/>
-                  </a:rPr>
-                  <a:t> </a:t>
-                </a:r>
-                <a:r>
-                  <a:rPr lang="en-US" b="1">
-                    <a:sym typeface="+mn-ea"/>
-                  </a:rPr>
-                  <a:t>Coefficienct analysis</a:t>
-                </a:r>
-                <a:r>
-                  <a:rPr lang="en-US">
-                    <a:sym typeface="+mn-ea"/>
-                  </a:rPr>
-                  <a:t> tab after fitting is complete</a:t>
-                </a:r>
-                <a:endParaRPr lang="en-US">
-                  <a:sym typeface="+mn-ea"/>
-                </a:endParaRPr>
-              </a:p>
-              <a:p>
-                <a:r>
-                  <a:rPr lang="en-US">
-                    <a:sym typeface="+mn-ea"/>
-                  </a:rPr>
-                  <a:t>In </a:t>
-                </a:r>
-                <a:r>
-                  <a:rPr lang="en-US" b="1">
-                    <a:sym typeface="+mn-ea"/>
-                  </a:rPr>
-                  <a:t>Analysis Controls </a:t>
-                </a:r>
-                <a:r>
-                  <a:rPr lang="en-US">
-                    <a:sym typeface="+mn-ea"/>
-                  </a:rPr>
-                  <a:t>select whether the coefficient shall be determined when the factors are at minimum, maximum or extremum</a:t>
-                </a:r>
-                <a:endParaRPr lang="en-US">
-                  <a:sym typeface="+mn-ea"/>
-                </a:endParaRPr>
-              </a:p>
-              <a:p>
-                <a:r>
-                  <a:rPr lang="en-US"/>
-                  <a:t>The pie charts demonstrate the distribution of the coefficient absolute values in terms of linear (</a:t>
-                </a:r>
-                <a14:m>
-                  <m:oMath xmlns:m="http://schemas.openxmlformats.org/officeDocument/2006/math">
-                    <m:r>
-                      <a:rPr lang="en-US" i="1">
-                        <a:latin typeface="Cambria Math" panose="02040503050406030204" charset="0"/>
-                        <a:cs typeface="Cambria Math" panose="02040503050406030204" charset="0"/>
-                      </a:rPr>
-                      <m:t>𝑓</m:t>
-                    </m:r>
-                  </m:oMath>
-                </a14:m>
-                <a:r>
-                  <a:rPr lang="en-US"/>
-                  <a:t>), quadratic (</a:t>
-                </a:r>
-                <a14:m>
-                  <m:oMath xmlns:m="http://schemas.openxmlformats.org/officeDocument/2006/math">
-                    <m:sSup>
-                      <m:sSupPr>
-                        <m:ctrlPr>
-                          <a:rPr lang="en-US" i="1">
-                            <a:latin typeface="Cambria Math" panose="02040503050406030204" charset="0"/>
-                            <a:cs typeface="Cambria Math" panose="02040503050406030204" charset="0"/>
-                          </a:rPr>
-                        </m:ctrlPr>
-                      </m:sSupPr>
-                      <m:e>
-                        <m:r>
-                          <a:rPr lang="en-US" i="1">
-                            <a:latin typeface="Cambria Math" panose="02040503050406030204" charset="0"/>
-                            <a:cs typeface="Cambria Math" panose="02040503050406030204" charset="0"/>
-                          </a:rPr>
-                          <m:t>𝑓</m:t>
-                        </m:r>
-                      </m:e>
-                      <m:sup>
-                        <m:r>
-                          <a:rPr lang="en-US" i="1">
-                            <a:latin typeface="Cambria Math" panose="02040503050406030204" charset="0"/>
-                            <a:cs typeface="Cambria Math" panose="02040503050406030204" charset="0"/>
-                          </a:rPr>
-                          <m:t>2</m:t>
-                        </m:r>
-                      </m:sup>
-                    </m:sSup>
-                  </m:oMath>
-                </a14:m>
-                <a:r>
-                  <a:rPr lang="en-US"/>
-                  <a:t>) and interactions (</a:t>
-                </a:r>
-                <a14:m>
-                  <m:oMath xmlns:m="http://schemas.openxmlformats.org/officeDocument/2006/math">
-                    <m:sSub>
-                      <m:sSubPr>
-                        <m:ctrlPr>
-                          <a:rPr lang="en-US" i="1">
-                            <a:latin typeface="Cambria Math" panose="02040503050406030204" charset="0"/>
-                            <a:cs typeface="Cambria Math" panose="02040503050406030204" charset="0"/>
-                          </a:rPr>
-                        </m:ctrlPr>
-                      </m:sSubPr>
-                      <m:e>
-                        <m:r>
-                          <a:rPr lang="en-US" i="1">
-                            <a:latin typeface="Cambria Math" panose="02040503050406030204" charset="0"/>
-                            <a:cs typeface="Cambria Math" panose="02040503050406030204" charset="0"/>
-                          </a:rPr>
-                          <m:t>𝑓</m:t>
-                        </m:r>
-                      </m:e>
-                      <m:sub>
-                        <m:r>
-                          <a:rPr lang="en-US" i="1">
-                            <a:latin typeface="Cambria Math" panose="02040503050406030204" charset="0"/>
-                            <a:cs typeface="Cambria Math" panose="02040503050406030204" charset="0"/>
-                          </a:rPr>
-                          <m:t>1</m:t>
-                        </m:r>
-                      </m:sub>
-                    </m:sSub>
-                    <m:sSub>
-                      <m:sSubPr>
-                        <m:ctrlPr>
-                          <a:rPr lang="en-US" i="1">
-                            <a:latin typeface="Cambria Math" panose="02040503050406030204" charset="0"/>
-                            <a:cs typeface="Cambria Math" panose="02040503050406030204" charset="0"/>
-                          </a:rPr>
-                        </m:ctrlPr>
-                      </m:sSubPr>
-                      <m:e>
-                        <m:r>
-                          <a:rPr lang="en-US" i="1">
-                            <a:latin typeface="Cambria Math" panose="02040503050406030204" charset="0"/>
-                            <a:cs typeface="Cambria Math" panose="02040503050406030204" charset="0"/>
-                          </a:rPr>
-                          <m:t>𝑓</m:t>
-                        </m:r>
-                      </m:e>
-                      <m:sub>
-                        <m:r>
-                          <a:rPr lang="en-US" i="1">
-                            <a:latin typeface="Cambria Math" panose="02040503050406030204" charset="0"/>
-                            <a:cs typeface="Cambria Math" panose="02040503050406030204" charset="0"/>
-                          </a:rPr>
-                          <m:t>2</m:t>
-                        </m:r>
-                      </m:sub>
-                    </m:sSub>
-                  </m:oMath>
-                </a14:m>
-                <a:r>
-                  <a:rPr lang="en-US"/>
-                  <a:t>)</a:t>
-                </a:r>
-                <a:endParaRPr lang="en-US"/>
-              </a:p>
-            </p:txBody>
-          </p:sp>
-        </mc:Choice>
-        <mc:Fallback>
-          <p:sp>
-            <p:nvSpPr>
-              <p:cNvPr id="3" name="Content Placeholder 2"/>
-              <p:cNvSpPr>
-                <a:spLocks noRot="1" noChangeAspect="1" noMove="1" noResize="1" noEditPoints="1" noAdjustHandles="1" noChangeArrowheads="1" noChangeShapeType="1" noTextEdit="1"/>
-              </p:cNvSpPr>
-              <p:nvPr>
-                <p:ph idx="1"/>
-              </p:nvPr>
-            </p:nvSpPr>
-            <p:spPr>
-              <a:blipFill rotWithShape="1">
-                <a:blip r:embed="rId1"/>
-                <a:stretch>
-                  <a:fillRect b="7"/>
-                </a:stretch>
-              </a:blipFill>
-            </p:spPr>
-            <p:txBody>
-              <a:bodyPr/>
-              <a:lstStyle/>
-              <a:p>
-                <a:r>
-                  <a:rPr lang="zh-CN" altLang="en-US">
-                    <a:noFill/>
-                  </a:rPr>
-                  <a:t> </a:t>
-                </a:r>
-              </a:p>
-            </p:txBody>
-          </p:sp>
-        </mc:Fallback>
-      </mc:AlternateContent>
-    </p:spTree>
-  </p:cSld>
-  <p:clrMapOvr>
-    <a:masterClrMapping/>
-  </p:clrMapOvr>
-</p:sld>
+<file path=ppt/tags/tag2.xml><?xml version="1.0" encoding="utf-8"?>
+<p:tagLst xmlns:p="http://schemas.openxmlformats.org/presentationml/2006/main">
+  <p:tag name="KSO_WM_DIAGRAM_VIRTUALLY_FRAME" val="{&quot;height&quot;:171.35,&quot;left&quot;:165.05,&quot;top&quot;:244.25,&quot;width&quot;:746.2}"/>
+</p:tagLst>
+</file>
+
+<file path=ppt/tags/tag3.xml><?xml version="1.0" encoding="utf-8"?>
+<p:tagLst xmlns:p="http://schemas.openxmlformats.org/presentationml/2006/main">
+  <p:tag name="KSO_WM_DIAGRAM_VIRTUALLY_FRAME" val="{&quot;height&quot;:171.35,&quot;left&quot;:165.05,&quot;top&quot;:244.25,&quot;width&quot;:746.2}"/>
+</p:tagLst>
+</file>
+
+<file path=ppt/tags/tag4.xml><?xml version="1.0" encoding="utf-8"?>
+<p:tagLst xmlns:p="http://schemas.openxmlformats.org/presentationml/2006/main">
+  <p:tag name="KSO_WM_DIAGRAM_VIRTUALLY_FRAME" val="{&quot;height&quot;:171.35,&quot;left&quot;:165.05,&quot;top&quot;:244.25,&quot;width&quot;:746.2}"/>
+</p:tagLst>
+</file>
+
+<file path=ppt/tags/tag5.xml><?xml version="1.0" encoding="utf-8"?>
+<p:tagLst xmlns:p="http://schemas.openxmlformats.org/presentationml/2006/main">
+  <p:tag name="KSO_WM_DIAGRAM_VIRTUALLY_FRAME" val="{&quot;height&quot;:171.35,&quot;left&quot;:165.05,&quot;top&quot;:244.25,&quot;width&quot;:746.2}"/>
+</p:tagLst>
+</file>
+
+<file path=ppt/tags/tag6.xml><?xml version="1.0" encoding="utf-8"?>
+<p:tagLst xmlns:p="http://schemas.openxmlformats.org/presentationml/2006/main">
+  <p:tag name="KSO_WM_DIAGRAM_VIRTUALLY_FRAME" val="{&quot;height&quot;:171.35,&quot;left&quot;:165.05,&quot;top&quot;:244.25,&quot;width&quot;:746.2}"/>
+</p:tagLst>
+</file>
+
+<file path=ppt/tags/tag7.xml><?xml version="1.0" encoding="utf-8"?>
+<p:tagLst xmlns:p="http://schemas.openxmlformats.org/presentationml/2006/main">
+  <p:tag name="KSO_WM_DIAGRAM_VIRTUALLY_FRAME" val="{&quot;height&quot;:171.35,&quot;left&quot;:165.05,&quot;top&quot;:244.25,&quot;width&quot;:746.2}"/>
+</p:tagLst>
+</file>
+
+<file path=ppt/tags/tag8.xml><?xml version="1.0" encoding="utf-8"?>
+<p:tagLst xmlns:p="http://schemas.openxmlformats.org/presentationml/2006/main">
+  <p:tag name="KSO_WM_DIAGRAM_VIRTUALLY_FRAME" val="{&quot;height&quot;:171.35,&quot;left&quot;:165.05,&quot;top&quot;:244.25,&quot;width&quot;:746.2}"/>
+</p:tagLst>
+</file>
+
+<file path=ppt/tags/tag9.xml><?xml version="1.0" encoding="utf-8"?>
+<p:tagLst xmlns:p="http://schemas.openxmlformats.org/presentationml/2006/main">
+  <p:tag name="KSO_WM_DIAGRAM_VIRTUALLY_FRAME" val="{&quot;height&quot;:171.35,&quot;left&quot;:165.05,&quot;top&quot;:244.25,&quot;width&quot;:746.2}"/>
+</p:tagLst>
 </file>
 
 <file path=ppt/theme/theme1.xml><?xml version="1.0" encoding="utf-8"?>
@@ -5837,4 +7530,263 @@
     </a:ext>
   </a:extLst>
 </a:theme>
+</file>
+
+<file path=ppt/theme/theme3.xml><?xml version="1.0" encoding="utf-8"?>
+<a:theme xmlns:a="http://schemas.openxmlformats.org/drawingml/2006/main" name="Office 主题">
+  <a:themeElements>
+    <a:clrScheme name="Office">
+      <a:dk1>
+        <a:sysClr val="windowText" lastClr="000000"/>
+      </a:dk1>
+      <a:lt1>
+        <a:sysClr val="window" lastClr="FFFFFF"/>
+      </a:lt1>
+      <a:dk2>
+        <a:srgbClr val="44546A"/>
+      </a:dk2>
+      <a:lt2>
+        <a:srgbClr val="E7E6E6"/>
+      </a:lt2>
+      <a:accent1>
+        <a:srgbClr val="5B9BD5"/>
+      </a:accent1>
+      <a:accent2>
+        <a:srgbClr val="ED7D31"/>
+      </a:accent2>
+      <a:accent3>
+        <a:srgbClr val="A5A5A5"/>
+      </a:accent3>
+      <a:accent4>
+        <a:srgbClr val="FFC000"/>
+      </a:accent4>
+      <a:accent5>
+        <a:srgbClr val="4472C4"/>
+      </a:accent5>
+      <a:accent6>
+        <a:srgbClr val="70AD47"/>
+      </a:accent6>
+      <a:hlink>
+        <a:srgbClr val="0563C1"/>
+      </a:hlink>
+      <a:folHlink>
+        <a:srgbClr val="954F72"/>
+      </a:folHlink>
+    </a:clrScheme>
+    <a:fontScheme name="Office">
+      <a:majorFont>
+        <a:latin typeface="Calibri Light"/>
+        <a:ea typeface=""/>
+        <a:cs typeface=""/>
+        <a:font script="Jpan" typeface="ＭＳ Ｐゴシック"/>
+        <a:font script="Hang" typeface="맑은 고딕"/>
+        <a:font script="Hans" typeface="宋体"/>
+        <a:font script="Hant" typeface="新細明體"/>
+        <a:font script="Arab" typeface="Times New Roman"/>
+        <a:font script="Hebr" typeface="Times New Roman"/>
+        <a:font script="Thai" typeface="Angsana New"/>
+        <a:font script="Ethi" typeface="Nyala"/>
+        <a:font script="Beng" typeface="Vrinda"/>
+        <a:font script="Gujr" typeface="Shruti"/>
+        <a:font script="Khmr" typeface="MoolBoran"/>
+        <a:font script="Knda" typeface="Tunga"/>
+        <a:font script="Guru" typeface="Raavi"/>
+        <a:font script="Cans" typeface="Euphemia"/>
+        <a:font script="Cher" typeface="Plantagenet Cherokee"/>
+        <a:font script="Yiii" typeface="Microsoft Yi Baiti"/>
+        <a:font script="Tibt" typeface="Microsoft Himalaya"/>
+        <a:font script="Thaa" typeface="MV Boli"/>
+        <a:font script="Deva" typeface="Mangal"/>
+        <a:font script="Telu" typeface="Gautami"/>
+        <a:font script="Taml" typeface="Latha"/>
+        <a:font script="Syrc" typeface="Estrangelo Edessa"/>
+        <a:font script="Orya" typeface="Kalinga"/>
+        <a:font script="Mlym" typeface="Kartika"/>
+        <a:font script="Laoo" typeface="DokChampa"/>
+        <a:font script="Sinh" typeface="Iskoola Pota"/>
+        <a:font script="Mong" typeface="Mongolian Baiti"/>
+        <a:font script="Viet" typeface="Times New Roman"/>
+        <a:font script="Uigh" typeface="Microsoft Uighur"/>
+        <a:font script="Geor" typeface="Sylfaen"/>
+      </a:majorFont>
+      <a:minorFont>
+        <a:latin typeface="Calibri"/>
+        <a:ea typeface=""/>
+        <a:cs typeface=""/>
+        <a:font script="Jpan" typeface="ＭＳ Ｐゴシック"/>
+        <a:font script="Hang" typeface="맑은 고딕"/>
+        <a:font script="Hans" typeface="宋体"/>
+        <a:font script="Hant" typeface="新細明體"/>
+        <a:font script="Arab" typeface="Arial"/>
+        <a:font script="Hebr" typeface="Arial"/>
+        <a:font script="Thai" typeface="Cordia New"/>
+        <a:font script="Ethi" typeface="Nyala"/>
+        <a:font script="Beng" typeface="Vrinda"/>
+        <a:font script="Gujr" typeface="Shruti"/>
+        <a:font script="Khmr" typeface="DaunPenh"/>
+        <a:font script="Knda" typeface="Tunga"/>
+        <a:font script="Guru" typeface="Raavi"/>
+        <a:font script="Cans" typeface="Euphemia"/>
+        <a:font script="Cher" typeface="Plantagenet Cherokee"/>
+        <a:font script="Yiii" typeface="Microsoft Yi Baiti"/>
+        <a:font script="Tibt" typeface="Microsoft Himalaya"/>
+        <a:font script="Thaa" typeface="MV Boli"/>
+        <a:font script="Deva" typeface="Mangal"/>
+        <a:font script="Telu" typeface="Gautami"/>
+        <a:font script="Taml" typeface="Latha"/>
+        <a:font script="Syrc" typeface="Estrangelo Edessa"/>
+        <a:font script="Orya" typeface="Kalinga"/>
+        <a:font script="Mlym" typeface="Kartika"/>
+        <a:font script="Laoo" typeface="DokChampa"/>
+        <a:font script="Sinh" typeface="Iskoola Pota"/>
+        <a:font script="Mong" typeface="Mongolian Baiti"/>
+        <a:font script="Viet" typeface="Arial"/>
+        <a:font script="Uigh" typeface="Microsoft Uighur"/>
+        <a:font script="Geor" typeface="Sylfaen"/>
+      </a:minorFont>
+    </a:fontScheme>
+    <a:fmtScheme name="Office">
+      <a:fillStyleLst>
+        <a:solidFill>
+          <a:schemeClr val="phClr"/>
+        </a:solidFill>
+        <a:gradFill rotWithShape="1">
+          <a:gsLst>
+            <a:gs pos="0">
+              <a:schemeClr val="phClr">
+                <a:lumMod val="110000"/>
+                <a:satMod val="105000"/>
+                <a:tint val="67000"/>
+              </a:schemeClr>
+            </a:gs>
+            <a:gs pos="50000">
+              <a:schemeClr val="phClr">
+                <a:lumMod val="105000"/>
+                <a:satMod val="103000"/>
+                <a:tint val="73000"/>
+              </a:schemeClr>
+            </a:gs>
+            <a:gs pos="100000">
+              <a:schemeClr val="phClr">
+                <a:lumMod val="105000"/>
+                <a:satMod val="109000"/>
+                <a:tint val="81000"/>
+              </a:schemeClr>
+            </a:gs>
+          </a:gsLst>
+          <a:lin ang="5400000" scaled="0"/>
+        </a:gradFill>
+        <a:gradFill rotWithShape="1">
+          <a:gsLst>
+            <a:gs pos="0">
+              <a:schemeClr val="phClr">
+                <a:satMod val="103000"/>
+                <a:lumMod val="102000"/>
+                <a:tint val="94000"/>
+              </a:schemeClr>
+            </a:gs>
+            <a:gs pos="50000">
+              <a:schemeClr val="phClr">
+                <a:satMod val="110000"/>
+                <a:lumMod val="100000"/>
+                <a:shade val="100000"/>
+              </a:schemeClr>
+            </a:gs>
+            <a:gs pos="100000">
+              <a:schemeClr val="phClr">
+                <a:lumMod val="99000"/>
+                <a:satMod val="120000"/>
+                <a:shade val="78000"/>
+              </a:schemeClr>
+            </a:gs>
+          </a:gsLst>
+          <a:lin ang="5400000" scaled="0"/>
+        </a:gradFill>
+      </a:fillStyleLst>
+      <a:lnStyleLst>
+        <a:ln w="6350" cap="flat" cmpd="sng" algn="ctr">
+          <a:solidFill>
+            <a:schemeClr val="phClr"/>
+          </a:solidFill>
+          <a:prstDash val="solid"/>
+          <a:miter lim="800000"/>
+        </a:ln>
+        <a:ln w="12700" cap="flat" cmpd="sng" algn="ctr">
+          <a:solidFill>
+            <a:schemeClr val="phClr"/>
+          </a:solidFill>
+          <a:prstDash val="solid"/>
+          <a:miter lim="800000"/>
+        </a:ln>
+        <a:ln w="19050" cap="flat" cmpd="sng" algn="ctr">
+          <a:solidFill>
+            <a:schemeClr val="phClr"/>
+          </a:solidFill>
+          <a:prstDash val="solid"/>
+          <a:miter lim="800000"/>
+        </a:ln>
+      </a:lnStyleLst>
+      <a:effectStyleLst>
+        <a:effectStyle>
+          <a:effectLst/>
+        </a:effectStyle>
+        <a:effectStyle>
+          <a:effectLst/>
+        </a:effectStyle>
+        <a:effectStyle>
+          <a:effectLst>
+            <a:outerShdw blurRad="57150" dist="19050" dir="5400000" algn="ctr" rotWithShape="0">
+              <a:srgbClr val="000000">
+                <a:alpha val="63000"/>
+              </a:srgbClr>
+            </a:outerShdw>
+          </a:effectLst>
+        </a:effectStyle>
+      </a:effectStyleLst>
+      <a:bgFillStyleLst>
+        <a:solidFill>
+          <a:schemeClr val="phClr"/>
+        </a:solidFill>
+        <a:solidFill>
+          <a:schemeClr val="phClr">
+            <a:tint val="95000"/>
+            <a:satMod val="170000"/>
+          </a:schemeClr>
+        </a:solidFill>
+        <a:gradFill rotWithShape="1">
+          <a:gsLst>
+            <a:gs pos="0">
+              <a:schemeClr val="phClr">
+                <a:tint val="93000"/>
+                <a:satMod val="150000"/>
+                <a:shade val="98000"/>
+                <a:lumMod val="102000"/>
+              </a:schemeClr>
+            </a:gs>
+            <a:gs pos="50000">
+              <a:schemeClr val="phClr">
+                <a:tint val="98000"/>
+                <a:satMod val="130000"/>
+                <a:shade val="90000"/>
+                <a:lumMod val="103000"/>
+              </a:schemeClr>
+            </a:gs>
+            <a:gs pos="100000">
+              <a:schemeClr val="phClr">
+                <a:shade val="63000"/>
+                <a:satMod val="120000"/>
+              </a:schemeClr>
+            </a:gs>
+          </a:gsLst>
+          <a:lin ang="5400000" scaled="0"/>
+        </a:gradFill>
+      </a:bgFillStyleLst>
+    </a:fmtScheme>
+  </a:themeElements>
+  <a:extLst>
+    <a:ext uri="{05A4C25C-085E-4340-85A3-A5531E510DB2}">
+      <thm15:themeFamily xmlns:thm15="http://schemas.microsoft.com/office/thememl/2012/main" name="Office Theme" id="{62F939B6-93AF-4DB8-9C6B-D6C7DFDC589F}" vid="{4A3C46E8-61CC-4603-A589-7422A47A8E4A}"/>
+    </a:ext>
+  </a:extLst>
+</a:theme>
 </file>
</xml_diff>

<commit_message>
major update on comprehensive opt and result display
</commit_message>
<xml_diff>
--- a/CSR APP Instruction.pptx
+++ b/CSR APP Instruction.pptx
@@ -5,7 +5,7 @@
     <p:sldMasterId id="2147483648" r:id="rId1"/>
   </p:sldMasterIdLst>
   <p:notesMasterIdLst>
-    <p:notesMasterId r:id="rId6"/>
+    <p:notesMasterId r:id="rId8"/>
   </p:notesMasterIdLst>
   <p:handoutMasterIdLst>
     <p:handoutMasterId r:id="rId17"/>
@@ -13,10 +13,10 @@
   <p:sldIdLst>
     <p:sldId id="256" r:id="rId3"/>
     <p:sldId id="262" r:id="rId4"/>
-    <p:sldId id="258" r:id="rId5"/>
-    <p:sldId id="269" r:id="rId7"/>
-    <p:sldId id="267" r:id="rId8"/>
-    <p:sldId id="268" r:id="rId9"/>
+    <p:sldId id="267" r:id="rId5"/>
+    <p:sldId id="268" r:id="rId6"/>
+    <p:sldId id="258" r:id="rId7"/>
+    <p:sldId id="269" r:id="rId9"/>
     <p:sldId id="263" r:id="rId10"/>
     <p:sldId id="264" r:id="rId11"/>
     <p:sldId id="257" r:id="rId12"/>
@@ -3898,7 +3898,7 @@
               <a:rPr lang="en-US">
                 <a:sym typeface="+mn-ea"/>
               </a:rPr>
-              <a:t>Step 4 -- Result display</a:t>
+              <a:t>Step 4 -- Output</a:t>
             </a:r>
             <a:endParaRPr lang="en-US"/>
           </a:p>
@@ -4004,7 +4004,7 @@
             </a:r>
             <a:r>
               <a:rPr lang="en-US" altLang="en-US"/>
-              <a:t> provides the R-square value of the model</a:t>
+              <a:t> provides the R-square and root mean square error (RMSE) value of the model</a:t>
             </a:r>
             <a:endParaRPr lang="en-US" altLang="en-US"/>
           </a:p>
@@ -4084,7 +4084,7 @@
               <a:rPr lang="en-US">
                 <a:sym typeface="+mn-ea"/>
               </a:rPr>
-              <a:t>Step 5 -- Coefficient analysis</a:t>
+              <a:t>Step 4 -- Output</a:t>
             </a:r>
             <a:endParaRPr lang="en-US"/>
           </a:p>
@@ -4430,6 +4430,630 @@
         <p:cNvGrpSpPr/>
         <p:nvPr/>
       </p:nvGrpSpPr>
+      <p:grpSpPr/>
+      <p:sp>
+        <p:nvSpPr>
+          <p:cNvPr id="2" name="标题 1"/>
+          <p:cNvSpPr>
+            <a:spLocks noGrp="1"/>
+          </p:cNvSpPr>
+          <p:nvPr>
+            <p:ph type="title"/>
+          </p:nvPr>
+        </p:nvSpPr>
+        <p:spPr/>
+        <p:txBody>
+          <a:bodyPr/>
+          <a:p>
+            <a:r>
+              <a:rPr lang="en-US" altLang="zh-CN"/>
+              <a:t>Terminology</a:t>
+            </a:r>
+            <a:endParaRPr lang="en-US" altLang="zh-CN"/>
+          </a:p>
+        </p:txBody>
+      </p:sp>
+      <p:sp>
+        <p:nvSpPr>
+          <p:cNvPr id="3" name="内容占位符 2"/>
+          <p:cNvSpPr>
+            <a:spLocks noGrp="1"/>
+          </p:cNvSpPr>
+          <p:nvPr>
+            <p:ph idx="1"/>
+          </p:nvPr>
+        </p:nvSpPr>
+        <p:spPr>
+          <a:xfrm>
+            <a:off x="888365" y="1611630"/>
+            <a:ext cx="11492230" cy="4351655"/>
+          </a:xfrm>
+        </p:spPr>
+        <p:txBody>
+          <a:bodyPr>
+            <a:normAutofit fontScale="25000"/>
+          </a:bodyPr>
+          <a:p>
+            <a:pPr marL="0" indent="0">
+              <a:buNone/>
+            </a:pPr>
+            <a:r>
+              <a:rPr lang="en-US" altLang="zh-CN" sz="6400" b="1"/>
+              <a:t>1. CSR Equation (Complex Systems Response Equation)</a:t>
+            </a:r>
+            <a:endParaRPr lang="en-US" altLang="zh-CN" sz="6400" b="1"/>
+          </a:p>
+          <a:p>
+            <a:pPr marL="0" indent="0">
+              <a:buNone/>
+            </a:pPr>
+            <a:r>
+              <a:rPr lang="en-US" altLang="zh-CN" sz="6400"/>
+              <a:t>A deterministic, second-order nonlinear equation that quantitatively maps how multiple interacting parameters lead to an emergent system property. It expresses the relationship between controllable parameters </a:t>
+            </a:r>
+            <a:endParaRPr lang="en-US" altLang="zh-CN" sz="6400"/>
+          </a:p>
+          <a:p>
+            <a:pPr marL="0" indent="0">
+              <a:buNone/>
+            </a:pPr>
+            <a:r>
+              <a:rPr lang="en-US" altLang="zh-CN" sz="6400" b="1"/>
+              <a:t>2. CSR Response Surface</a:t>
+            </a:r>
+            <a:endParaRPr lang="en-US" altLang="zh-CN" sz="6400" b="1"/>
+          </a:p>
+          <a:p>
+            <a:pPr marL="0" indent="0">
+              <a:buNone/>
+            </a:pPr>
+            <a:r>
+              <a:rPr lang="en-US" altLang="zh-CN" sz="6400"/>
+              <a:t>A multidimensional surface defined by the CSR equation that visualizes how the emergent property changes with varying parameters. It can take the form of an elliptic or hyperbolic paraboloid, typically featuring a single global optimum.</a:t>
+            </a:r>
+            <a:endParaRPr lang="en-US" altLang="zh-CN" sz="6400"/>
+          </a:p>
+          <a:p>
+            <a:pPr marL="0" indent="0">
+              <a:buNone/>
+            </a:pPr>
+            <a:r>
+              <a:rPr lang="en-US" altLang="zh-CN" sz="6400" b="1"/>
+              <a:t>3. Emergent Property</a:t>
+            </a:r>
+            <a:endParaRPr lang="en-US" altLang="zh-CN" sz="6400" b="1"/>
+          </a:p>
+          <a:p>
+            <a:pPr marL="0" indent="0">
+              <a:buNone/>
+            </a:pPr>
+            <a:r>
+              <a:rPr lang="en-US" altLang="zh-CN" sz="6400"/>
+              <a:t>The measurable output or system-level behavior that arises from the interaction among all controllable and uncontrollable variables within a complex system.</a:t>
+            </a:r>
+            <a:endParaRPr lang="en-US" altLang="zh-CN" sz="6400"/>
+          </a:p>
+          <a:p>
+            <a:pPr marL="0" indent="0">
+              <a:buNone/>
+            </a:pPr>
+            <a:r>
+              <a:rPr lang="en-US" altLang="zh-CN" sz="6400" b="1"/>
+              <a:t>4. Coefficients (x</a:t>
+            </a:r>
+            <a:r>
+              <a:rPr lang="en-US" altLang="en-US" sz="6400" b="1"/>
+              <a:t>₀</a:t>
+            </a:r>
+            <a:r>
+              <a:rPr lang="en-US" altLang="zh-CN" sz="6400" b="1"/>
+              <a:t>, x</a:t>
+            </a:r>
+            <a:r>
+              <a:rPr lang="en-US" altLang="en-US" sz="6400" b="1"/>
+              <a:t>ᵢ</a:t>
+            </a:r>
+            <a:r>
+              <a:rPr lang="en-US" altLang="zh-CN" sz="6400" b="1"/>
+              <a:t>, x</a:t>
+            </a:r>
+            <a:r>
+              <a:rPr lang="en-US" altLang="en-US" sz="6400" b="1"/>
+              <a:t>ᵢᵢ</a:t>
+            </a:r>
+            <a:r>
+              <a:rPr lang="en-US" altLang="zh-CN" sz="6400" b="1"/>
+              <a:t>, x</a:t>
+            </a:r>
+            <a:r>
+              <a:rPr lang="en-US" altLang="en-US" sz="6400" b="1"/>
+              <a:t>ᵢ</a:t>
+            </a:r>
+            <a:r>
+              <a:rPr lang="en-US" altLang="en-US" sz="6400" b="1"/>
+              <a:t>ⱼ</a:t>
+            </a:r>
+            <a:r>
+              <a:rPr lang="en-US" altLang="zh-CN" sz="6400" b="1"/>
+              <a:t>)</a:t>
+            </a:r>
+            <a:endParaRPr lang="en-US" altLang="zh-CN" sz="6400" b="1"/>
+          </a:p>
+          <a:p>
+            <a:pPr marL="0" indent="0">
+              <a:buNone/>
+            </a:pPr>
+            <a:r>
+              <a:rPr lang="en-US" altLang="zh-CN" sz="6400"/>
+              <a:t>Adaptive parameters in the CSR equation that represent system response characteristics. Unlike fixed regression coefficients, CSR coefficients depend on time and hidden variables, making them dynamic descriptors of system behavior.</a:t>
+            </a:r>
+            <a:endParaRPr lang="en-US" altLang="zh-CN" sz="6400"/>
+          </a:p>
+          <a:p>
+            <a:pPr marL="0" indent="0">
+              <a:buNone/>
+            </a:pPr>
+            <a:r>
+              <a:rPr lang="en-US" altLang="zh-CN" sz="6400">
+                <a:sym typeface="+mn-ea"/>
+              </a:rPr>
+              <a:t>x</a:t>
+            </a:r>
+            <a:r>
+              <a:rPr lang="en-US" altLang="en-US" sz="6400">
+                <a:sym typeface="+mn-ea"/>
+              </a:rPr>
+              <a:t>₀: </a:t>
+            </a:r>
+            <a:r>
+              <a:rPr lang="en-US" altLang="zh-CN" sz="6400">
+                <a:sym typeface="+mn-ea"/>
+              </a:rPr>
+              <a:t>Baseline response or intercept term, representing the system’s intrinsic state when all controllable parameters are zero</a:t>
+            </a:r>
+            <a:endParaRPr lang="en-US" altLang="zh-CN" sz="6400">
+              <a:sym typeface="+mn-ea"/>
+            </a:endParaRPr>
+          </a:p>
+          <a:p>
+            <a:pPr marL="0" indent="0">
+              <a:buNone/>
+            </a:pPr>
+            <a:r>
+              <a:rPr lang="en-US" altLang="zh-CN" sz="6400">
+                <a:sym typeface="+mn-ea"/>
+              </a:rPr>
+              <a:t>x</a:t>
+            </a:r>
+            <a:r>
+              <a:rPr lang="en-US" altLang="en-US" sz="6400">
+                <a:sym typeface="+mn-ea"/>
+              </a:rPr>
+              <a:t>ᵢ: </a:t>
+            </a:r>
+            <a:r>
+              <a:rPr lang="en-US" altLang="zh-CN" sz="6400">
+                <a:sym typeface="+mn-ea"/>
+              </a:rPr>
+              <a:t>First-order response coefficient showing the direct influence of parameter c</a:t>
+            </a:r>
+            <a:r>
+              <a:rPr lang="en-US" altLang="en-US" sz="6400">
+                <a:sym typeface="+mn-ea"/>
+              </a:rPr>
+              <a:t>ᵢ </a:t>
+            </a:r>
+            <a:r>
+              <a:rPr lang="en-US" altLang="zh-CN" sz="6400">
+                <a:sym typeface="+mn-ea"/>
+              </a:rPr>
+              <a:t>on the emergent property.</a:t>
+            </a:r>
+            <a:endParaRPr lang="en-US" altLang="zh-CN" sz="6400">
+              <a:sym typeface="+mn-ea"/>
+            </a:endParaRPr>
+          </a:p>
+          <a:p>
+            <a:pPr marL="0" indent="0">
+              <a:buNone/>
+            </a:pPr>
+            <a:r>
+              <a:rPr lang="en-US" altLang="zh-CN" sz="6400">
+                <a:sym typeface="+mn-ea"/>
+              </a:rPr>
+              <a:t>x</a:t>
+            </a:r>
+            <a:r>
+              <a:rPr lang="en-US" altLang="en-US" sz="6400">
+                <a:sym typeface="+mn-ea"/>
+              </a:rPr>
+              <a:t>ᵢᵢ: </a:t>
+            </a:r>
+            <a:r>
+              <a:rPr lang="en-US" altLang="zh-CN" sz="6400">
+                <a:sym typeface="+mn-ea"/>
+              </a:rPr>
+              <a:t>Second-order self-interaction term that captures nonlinearity of parameter </a:t>
+            </a:r>
+            <a:r>
+              <a:rPr lang="en-US" altLang="zh-CN" sz="6400">
+                <a:sym typeface="+mn-ea"/>
+              </a:rPr>
+              <a:t>c</a:t>
+            </a:r>
+            <a:r>
+              <a:rPr lang="en-US" altLang="en-US" sz="6400">
+                <a:sym typeface="+mn-ea"/>
+              </a:rPr>
+              <a:t>ᵢ</a:t>
+            </a:r>
+            <a:r>
+              <a:rPr lang="en-US" altLang="zh-CN" sz="6400">
+                <a:sym typeface="+mn-ea"/>
+              </a:rPr>
+              <a:t>’s individual effect</a:t>
+            </a:r>
+            <a:endParaRPr lang="en-US" altLang="zh-CN" sz="6400">
+              <a:sym typeface="+mn-ea"/>
+            </a:endParaRPr>
+          </a:p>
+          <a:p>
+            <a:pPr marL="0" indent="0">
+              <a:buNone/>
+            </a:pPr>
+            <a:r>
+              <a:rPr lang="en-US" altLang="zh-CN" sz="6400">
+                <a:sym typeface="+mn-ea"/>
+              </a:rPr>
+              <a:t>x</a:t>
+            </a:r>
+            <a:r>
+              <a:rPr lang="en-US" altLang="en-US" sz="6400">
+                <a:sym typeface="+mn-ea"/>
+              </a:rPr>
+              <a:t>ᵢⱼ: </a:t>
+            </a:r>
+            <a:r>
+              <a:rPr lang="en-US" altLang="zh-CN" sz="6400">
+                <a:sym typeface="+mn-ea"/>
+              </a:rPr>
+              <a:t>Cross-interaction coefficient quantifying the coupling effect between parameters c</a:t>
+            </a:r>
+            <a:r>
+              <a:rPr lang="en-US" altLang="en-US" sz="6400">
+                <a:sym typeface="+mn-ea"/>
+              </a:rPr>
+              <a:t>ᵢ</a:t>
+            </a:r>
+            <a:r>
+              <a:rPr lang="en-US" altLang="zh-CN" sz="6400">
+                <a:sym typeface="+mn-ea"/>
+              </a:rPr>
+              <a:t> and c</a:t>
+            </a:r>
+            <a:r>
+              <a:rPr lang="en-US" altLang="en-US" sz="6400">
+                <a:sym typeface="+mn-ea"/>
+              </a:rPr>
+              <a:t>ⱼ</a:t>
+            </a:r>
+            <a:endParaRPr lang="en-US" altLang="zh-CN" sz="6400"/>
+          </a:p>
+        </p:txBody>
+      </p:sp>
+    </p:spTree>
+  </p:cSld>
+  <p:clrMapOvr>
+    <a:masterClrMapping/>
+  </p:clrMapOvr>
+</p:sld>
+</file>
+
+<file path=ppt/slides/slide4.xml><?xml version="1.0" encoding="utf-8"?>
+<p:sld xmlns:a="http://schemas.openxmlformats.org/drawingml/2006/main" xmlns:r="http://schemas.openxmlformats.org/officeDocument/2006/relationships" xmlns:p="http://schemas.openxmlformats.org/presentationml/2006/main">
+  <p:cSld>
+    <p:spTree>
+      <p:nvGrpSpPr>
+        <p:cNvPr id="1" name=""/>
+        <p:cNvGrpSpPr/>
+        <p:nvPr/>
+      </p:nvGrpSpPr>
+      <p:grpSpPr/>
+      <p:sp>
+        <p:nvSpPr>
+          <p:cNvPr id="2" name="标题 1"/>
+          <p:cNvSpPr>
+            <a:spLocks noGrp="1"/>
+          </p:cNvSpPr>
+          <p:nvPr>
+            <p:ph type="title"/>
+          </p:nvPr>
+        </p:nvSpPr>
+        <p:spPr/>
+        <p:txBody>
+          <a:bodyPr/>
+          <a:p>
+            <a:r>
+              <a:rPr lang="en-US" altLang="zh-CN">
+                <a:sym typeface="+mn-ea"/>
+              </a:rPr>
+              <a:t>Terminology</a:t>
+            </a:r>
+            <a:endParaRPr lang="zh-CN" altLang="en-US"/>
+          </a:p>
+        </p:txBody>
+      </p:sp>
+      <p:sp>
+        <p:nvSpPr>
+          <p:cNvPr id="3" name="内容占位符 2"/>
+          <p:cNvSpPr>
+            <a:spLocks noGrp="1"/>
+          </p:cNvSpPr>
+          <p:nvPr>
+            <p:ph idx="1"/>
+          </p:nvPr>
+        </p:nvSpPr>
+        <p:spPr>
+          <a:xfrm>
+            <a:off x="838200" y="1691005"/>
+            <a:ext cx="10515600" cy="4351338"/>
+          </a:xfrm>
+        </p:spPr>
+        <p:txBody>
+          <a:bodyPr>
+            <a:normAutofit fontScale="25000"/>
+          </a:bodyPr>
+          <a:p>
+            <a:pPr marL="0" indent="0">
+              <a:buNone/>
+            </a:pPr>
+            <a:r>
+              <a:rPr lang="en-US" altLang="zh-CN" sz="5600" b="1">
+                <a:sym typeface="+mn-ea"/>
+              </a:rPr>
+              <a:t>5. </a:t>
+            </a:r>
+            <a:r>
+              <a:rPr lang="en-US" altLang="zh-CN" sz="5600" b="1">
+                <a:sym typeface="+mn-ea"/>
+              </a:rPr>
+              <a:t>Orthogonal Array Composite Design (OACD)</a:t>
+            </a:r>
+            <a:endParaRPr lang="en-US" altLang="zh-CN" sz="5600" b="1"/>
+          </a:p>
+          <a:p>
+            <a:pPr marL="0" indent="0">
+              <a:buNone/>
+            </a:pPr>
+            <a:r>
+              <a:rPr lang="en-US" altLang="zh-CN" sz="5600">
+                <a:sym typeface="+mn-ea"/>
+              </a:rPr>
+              <a:t>A design-of-experiments (DOE) method that determines the minimal number of calibration tests needed to estimate CSR coefficients.</a:t>
+            </a:r>
+            <a:endParaRPr lang="en-US" altLang="zh-CN" sz="5600"/>
+          </a:p>
+          <a:p>
+            <a:pPr marL="0" indent="0">
+              <a:buNone/>
+            </a:pPr>
+            <a:r>
+              <a:rPr lang="en-US" altLang="zh-CN" sz="5600">
+                <a:sym typeface="+mn-ea"/>
+              </a:rPr>
+              <a:t>For P parameters, only (P</a:t>
+            </a:r>
+            <a:r>
+              <a:rPr lang="en-US" altLang="en-US" sz="5600">
+                <a:sym typeface="+mn-ea"/>
+              </a:rPr>
+              <a:t>²</a:t>
+            </a:r>
+            <a:r>
+              <a:rPr lang="en-US" altLang="zh-CN" sz="5600">
+                <a:sym typeface="+mn-ea"/>
+              </a:rPr>
+              <a:t> + 3P + 2)/2 tests are required instead of exploring all possible combinations.</a:t>
+            </a:r>
+            <a:endParaRPr lang="en-US" altLang="zh-CN" sz="5600"/>
+          </a:p>
+          <a:p>
+            <a:pPr marL="0" indent="0">
+              <a:buNone/>
+            </a:pPr>
+            <a:r>
+              <a:rPr lang="en-US" altLang="zh-CN" sz="5600" b="1">
+                <a:sym typeface="+mn-ea"/>
+              </a:rPr>
+              <a:t>6. Calibration (Fitting) Process</a:t>
+            </a:r>
+            <a:endParaRPr lang="en-US" altLang="zh-CN" sz="5600" b="1"/>
+          </a:p>
+          <a:p>
+            <a:pPr marL="0" indent="0">
+              <a:buNone/>
+            </a:pPr>
+            <a:r>
+              <a:rPr lang="en-US" altLang="zh-CN" sz="5600">
+                <a:sym typeface="+mn-ea"/>
+              </a:rPr>
+              <a:t>The procedure of determining CSR coefficients by fitting experimental or simulated data according to the OACD-designed test matrix.</a:t>
+            </a:r>
+            <a:endParaRPr lang="en-US" altLang="zh-CN" sz="5600"/>
+          </a:p>
+          <a:p>
+            <a:pPr marL="0" indent="0">
+              <a:buNone/>
+            </a:pPr>
+            <a:r>
+              <a:rPr lang="en-US" altLang="zh-CN" sz="5600" b="1">
+                <a:sym typeface="+mn-ea"/>
+              </a:rPr>
+              <a:t>7. Extremum (Global Optimum)</a:t>
+            </a:r>
+            <a:endParaRPr lang="en-US" altLang="zh-CN" sz="5600" b="1"/>
+          </a:p>
+          <a:p>
+            <a:pPr marL="0" indent="0">
+              <a:buNone/>
+            </a:pPr>
+            <a:r>
+              <a:rPr lang="en-US" altLang="zh-CN" sz="5600">
+                <a:sym typeface="+mn-ea"/>
+              </a:rPr>
+              <a:t>The maximum or minimum point on the CSR surface representing the best achievable system performance under given constraints.</a:t>
+            </a:r>
+            <a:endParaRPr lang="en-US" altLang="zh-CN" sz="5600"/>
+          </a:p>
+          <a:p>
+            <a:pPr marL="0" indent="0">
+              <a:buNone/>
+            </a:pPr>
+            <a:r>
+              <a:rPr lang="en-US" altLang="zh-CN" sz="5600" b="1">
+                <a:sym typeface="+mn-ea"/>
+              </a:rPr>
+              <a:t>8. Normalization</a:t>
+            </a:r>
+            <a:endParaRPr lang="en-US" altLang="zh-CN" sz="5600" b="1"/>
+          </a:p>
+          <a:p>
+            <a:pPr marL="0" indent="0">
+              <a:buNone/>
+            </a:pPr>
+            <a:r>
+              <a:rPr lang="en-US" altLang="zh-CN" sz="5600">
+                <a:sym typeface="+mn-ea"/>
+              </a:rPr>
+              <a:t>Normalize the maximum/minimum of parameter range to [-1, 1] or [0, 1]</a:t>
+            </a:r>
+            <a:endParaRPr lang="en-US" altLang="zh-CN" sz="5600">
+              <a:sym typeface="+mn-ea"/>
+            </a:endParaRPr>
+          </a:p>
+          <a:p>
+            <a:pPr marL="0" indent="0">
+              <a:buNone/>
+            </a:pPr>
+            <a:r>
+              <a:rPr lang="en-US" altLang="zh-CN" sz="5600" b="1">
+                <a:sym typeface="+mn-ea"/>
+              </a:rPr>
+              <a:t>9. Model Fit Metrics (R</a:t>
+            </a:r>
+            <a:r>
+              <a:rPr lang="en-US" altLang="en-US" sz="5600" b="1">
+                <a:sym typeface="+mn-ea"/>
+              </a:rPr>
+              <a:t>²</a:t>
+            </a:r>
+            <a:r>
+              <a:rPr lang="en-US" altLang="zh-CN" sz="5600" b="1">
+                <a:sym typeface="+mn-ea"/>
+              </a:rPr>
+              <a:t>, MSE)</a:t>
+            </a:r>
+            <a:endParaRPr lang="en-US" altLang="zh-CN" sz="5600" b="1"/>
+          </a:p>
+          <a:p>
+            <a:pPr marL="0" indent="0">
+              <a:buNone/>
+            </a:pPr>
+            <a:r>
+              <a:rPr lang="en-US" altLang="zh-CN" sz="5600">
+                <a:sym typeface="+mn-ea"/>
+              </a:rPr>
+              <a:t>Quantitative measures used to evaluate the CSR model:</a:t>
+            </a:r>
+            <a:endParaRPr lang="en-US" altLang="zh-CN" sz="5600"/>
+          </a:p>
+          <a:p>
+            <a:pPr marL="0" indent="0">
+              <a:buNone/>
+            </a:pPr>
+            <a:r>
+              <a:rPr lang="en-US" altLang="zh-CN" sz="5600">
+                <a:sym typeface="+mn-ea"/>
+              </a:rPr>
+              <a:t>R</a:t>
+            </a:r>
+            <a:r>
+              <a:rPr lang="en-US" altLang="en-US" sz="5600">
+                <a:sym typeface="+mn-ea"/>
+              </a:rPr>
+              <a:t>²</a:t>
+            </a:r>
+            <a:r>
+              <a:rPr lang="en-US" altLang="zh-CN" sz="5600">
+                <a:sym typeface="+mn-ea"/>
+              </a:rPr>
+              <a:t> (Coefficient of Determination): Indicates how well the CSR equation explains observed data.</a:t>
+            </a:r>
+            <a:endParaRPr lang="en-US" altLang="zh-CN" sz="5600"/>
+          </a:p>
+          <a:p>
+            <a:pPr marL="0" indent="0">
+              <a:buNone/>
+            </a:pPr>
+            <a:r>
+              <a:rPr lang="en-US" altLang="zh-CN" sz="5600">
+                <a:sym typeface="+mn-ea"/>
+              </a:rPr>
+              <a:t>MSE (Mean Squared Error): Measures prediction error between actual and modeled results.</a:t>
+            </a:r>
+            <a:endParaRPr lang="en-US" altLang="zh-CN" sz="5600">
+              <a:sym typeface="+mn-ea"/>
+            </a:endParaRPr>
+          </a:p>
+          <a:p>
+            <a:pPr marL="0" indent="0">
+              <a:buNone/>
+            </a:pPr>
+            <a:r>
+              <a:rPr lang="en-US" altLang="zh-CN" sz="5600" b="1">
+                <a:sym typeface="+mn-ea"/>
+              </a:rPr>
+              <a:t>10. CSR Surface Plot</a:t>
+            </a:r>
+            <a:endParaRPr lang="en-US" altLang="zh-CN" sz="5600" b="1"/>
+          </a:p>
+          <a:p>
+            <a:pPr marL="0" indent="0">
+              <a:buNone/>
+            </a:pPr>
+            <a:r>
+              <a:rPr lang="en-US" altLang="zh-CN" sz="5600">
+                <a:sym typeface="+mn-ea"/>
+              </a:rPr>
+              <a:t>Visual representations of the CSR response surface, showing parameter interactions and system trends. The extremum point corresponds to the optimal condition predicted by the CSR model</a:t>
+            </a:r>
+            <a:endParaRPr lang="en-US" altLang="zh-CN" sz="5600"/>
+          </a:p>
+          <a:p>
+            <a:endParaRPr lang="en-US" altLang="zh-CN" sz="5600"/>
+          </a:p>
+          <a:p>
+            <a:endParaRPr lang="zh-CN" altLang="en-US" sz="5600"/>
+          </a:p>
+        </p:txBody>
+      </p:sp>
+    </p:spTree>
+  </p:cSld>
+  <p:clrMapOvr>
+    <a:masterClrMapping/>
+  </p:clrMapOvr>
+</p:sld>
+</file>
+
+<file path=ppt/slides/slide5.xml><?xml version="1.0" encoding="utf-8"?>
+<p:sld xmlns:a="http://schemas.openxmlformats.org/drawingml/2006/main" xmlns:r="http://schemas.openxmlformats.org/officeDocument/2006/relationships" xmlns:p="http://schemas.openxmlformats.org/presentationml/2006/main">
+  <p:cSld>
+    <p:spTree>
+      <p:nvGrpSpPr>
+        <p:cNvPr id="1" name=""/>
+        <p:cNvGrpSpPr/>
+        <p:nvPr/>
+      </p:nvGrpSpPr>
       <p:grpSpPr>
         <a:xfrm>
           <a:off x="0" y="0"/>
@@ -4789,7 +5413,7 @@
 </p:sld>
 </file>
 
-<file path=ppt/slides/slide4.xml><?xml version="1.0" encoding="utf-8"?>
+<file path=ppt/slides/slide6.xml><?xml version="1.0" encoding="utf-8"?>
 <p:sld xmlns:a="http://schemas.openxmlformats.org/drawingml/2006/main" xmlns:r="http://schemas.openxmlformats.org/officeDocument/2006/relationships" xmlns:p="http://schemas.openxmlformats.org/presentationml/2006/main">
   <p:cSld>
     <p:spTree>
@@ -4842,7 +5466,7 @@
             </a:pPr>
             <a:r>
               <a:rPr lang="en-US" altLang="zh-CN" sz="2000"/>
-              <a:t>The CSR function is the transfer function between input and output. C</a:t>
+              <a:t>The CSR equation is the transfer function between input and output. C</a:t>
             </a:r>
             <a:r>
               <a:rPr lang="en-US" altLang="zh-CN" sz="2000" baseline="-25000"/>
@@ -4850,7 +5474,7 @@
             </a:r>
             <a:r>
               <a:rPr lang="en-US" altLang="zh-CN" sz="2000"/>
-              <a:t> is the level of a parameter and is an independent variable.  Coefficients of the CSR function contain the information of the system response to the parameters and the levels. The coefficients are unknowns. For P parameters, there are [(P</a:t>
+              <a:t> is the level of a parameter and is an independent variable.  Coefficients of the CSR equation contain the information of the system response to the parameters and the levels. The coefficients are unknowns. For P parameters, there are [(P</a:t>
             </a:r>
             <a:r>
               <a:rPr lang="en-US" altLang="zh-CN" sz="2000" baseline="30000"/>
@@ -5380,628 +6004,6 @@
 </p:sld>
 </file>
 
-<file path=ppt/slides/slide5.xml><?xml version="1.0" encoding="utf-8"?>
-<p:sld xmlns:a="http://schemas.openxmlformats.org/drawingml/2006/main" xmlns:r="http://schemas.openxmlformats.org/officeDocument/2006/relationships" xmlns:p="http://schemas.openxmlformats.org/presentationml/2006/main">
-  <p:cSld>
-    <p:spTree>
-      <p:nvGrpSpPr>
-        <p:cNvPr id="1" name=""/>
-        <p:cNvGrpSpPr/>
-        <p:nvPr/>
-      </p:nvGrpSpPr>
-      <p:grpSpPr/>
-      <p:sp>
-        <p:nvSpPr>
-          <p:cNvPr id="2" name="标题 1"/>
-          <p:cNvSpPr>
-            <a:spLocks noGrp="1"/>
-          </p:cNvSpPr>
-          <p:nvPr>
-            <p:ph type="title"/>
-          </p:nvPr>
-        </p:nvSpPr>
-        <p:spPr/>
-        <p:txBody>
-          <a:bodyPr/>
-          <a:p>
-            <a:r>
-              <a:rPr lang="en-US" altLang="zh-CN"/>
-              <a:t>Terminology</a:t>
-            </a:r>
-            <a:endParaRPr lang="en-US" altLang="zh-CN"/>
-          </a:p>
-        </p:txBody>
-      </p:sp>
-      <p:sp>
-        <p:nvSpPr>
-          <p:cNvPr id="3" name="内容占位符 2"/>
-          <p:cNvSpPr>
-            <a:spLocks noGrp="1"/>
-          </p:cNvSpPr>
-          <p:nvPr>
-            <p:ph idx="1"/>
-          </p:nvPr>
-        </p:nvSpPr>
-        <p:spPr>
-          <a:xfrm>
-            <a:off x="888365" y="1611630"/>
-            <a:ext cx="11492230" cy="4351655"/>
-          </a:xfrm>
-        </p:spPr>
-        <p:txBody>
-          <a:bodyPr>
-            <a:normAutofit fontScale="25000"/>
-          </a:bodyPr>
-          <a:p>
-            <a:pPr marL="0" indent="0">
-              <a:buNone/>
-            </a:pPr>
-            <a:r>
-              <a:rPr lang="en-US" altLang="zh-CN" sz="6400" b="1"/>
-              <a:t>1. CSR Equation (Complex Systems Response Equation)</a:t>
-            </a:r>
-            <a:endParaRPr lang="en-US" altLang="zh-CN" sz="6400" b="1"/>
-          </a:p>
-          <a:p>
-            <a:pPr marL="0" indent="0">
-              <a:buNone/>
-            </a:pPr>
-            <a:r>
-              <a:rPr lang="en-US" altLang="zh-CN" sz="6400"/>
-              <a:t>A deterministic, second-order nonlinear equation that quantitatively maps how multiple interacting parameters lead to an emergent system property. It expresses the relationship between controllable parameters </a:t>
-            </a:r>
-            <a:endParaRPr lang="en-US" altLang="zh-CN" sz="6400"/>
-          </a:p>
-          <a:p>
-            <a:pPr marL="0" indent="0">
-              <a:buNone/>
-            </a:pPr>
-            <a:r>
-              <a:rPr lang="en-US" altLang="zh-CN" sz="6400" b="1"/>
-              <a:t>2. CSR Response Surface</a:t>
-            </a:r>
-            <a:endParaRPr lang="en-US" altLang="zh-CN" sz="6400" b="1"/>
-          </a:p>
-          <a:p>
-            <a:pPr marL="0" indent="0">
-              <a:buNone/>
-            </a:pPr>
-            <a:r>
-              <a:rPr lang="en-US" altLang="zh-CN" sz="6400"/>
-              <a:t>A multidimensional surface defined by the CSR equation that visualizes how the emergent property changes with varying parameters. It can take the form of an elliptic or hyperbolic paraboloid, typically featuring a single global optimum.</a:t>
-            </a:r>
-            <a:endParaRPr lang="en-US" altLang="zh-CN" sz="6400"/>
-          </a:p>
-          <a:p>
-            <a:pPr marL="0" indent="0">
-              <a:buNone/>
-            </a:pPr>
-            <a:r>
-              <a:rPr lang="en-US" altLang="zh-CN" sz="6400" b="1"/>
-              <a:t>3. Emergent Property</a:t>
-            </a:r>
-            <a:endParaRPr lang="en-US" altLang="zh-CN" sz="6400" b="1"/>
-          </a:p>
-          <a:p>
-            <a:pPr marL="0" indent="0">
-              <a:buNone/>
-            </a:pPr>
-            <a:r>
-              <a:rPr lang="en-US" altLang="zh-CN" sz="6400"/>
-              <a:t>The measurable output or system-level behavior that arises from the interaction among all controllable and uncontrollable variables within a complex system.</a:t>
-            </a:r>
-            <a:endParaRPr lang="en-US" altLang="zh-CN" sz="6400"/>
-          </a:p>
-          <a:p>
-            <a:pPr marL="0" indent="0">
-              <a:buNone/>
-            </a:pPr>
-            <a:r>
-              <a:rPr lang="en-US" altLang="zh-CN" sz="6400" b="1"/>
-              <a:t>4. Coefficients (x</a:t>
-            </a:r>
-            <a:r>
-              <a:rPr lang="en-US" altLang="en-US" sz="6400" b="1"/>
-              <a:t>₀</a:t>
-            </a:r>
-            <a:r>
-              <a:rPr lang="en-US" altLang="zh-CN" sz="6400" b="1"/>
-              <a:t>, x</a:t>
-            </a:r>
-            <a:r>
-              <a:rPr lang="" altLang="en-US" sz="6400" b="1"/>
-              <a:t>ᵢ</a:t>
-            </a:r>
-            <a:r>
-              <a:rPr lang="en-US" altLang="zh-CN" sz="6400" b="1"/>
-              <a:t>, x</a:t>
-            </a:r>
-            <a:r>
-              <a:rPr lang="" altLang="en-US" sz="6400" b="1"/>
-              <a:t>ᵢᵢ</a:t>
-            </a:r>
-            <a:r>
-              <a:rPr lang="en-US" altLang="zh-CN" sz="6400" b="1"/>
-              <a:t>, x</a:t>
-            </a:r>
-            <a:r>
-              <a:rPr lang="" altLang="en-US" sz="6400" b="1"/>
-              <a:t>ᵢ</a:t>
-            </a:r>
-            <a:r>
-              <a:rPr lang="en-US" altLang="en-US" sz="6400" b="1"/>
-              <a:t>ⱼ</a:t>
-            </a:r>
-            <a:r>
-              <a:rPr lang="en-US" altLang="zh-CN" sz="6400" b="1"/>
-              <a:t>)</a:t>
-            </a:r>
-            <a:endParaRPr lang="en-US" altLang="zh-CN" sz="6400" b="1"/>
-          </a:p>
-          <a:p>
-            <a:pPr marL="0" indent="0">
-              <a:buNone/>
-            </a:pPr>
-            <a:r>
-              <a:rPr lang="en-US" altLang="zh-CN" sz="6400"/>
-              <a:t>Adaptive parameters in the CSR equation that represent system response characteristics. Unlike fixed regression coefficients, CSR coefficients depend on time and hidden variables, making them dynamic descriptors of system behavior.</a:t>
-            </a:r>
-            <a:endParaRPr lang="en-US" altLang="zh-CN" sz="6400"/>
-          </a:p>
-          <a:p>
-            <a:pPr marL="0" indent="0">
-              <a:buNone/>
-            </a:pPr>
-            <a:r>
-              <a:rPr lang="en-US" altLang="zh-CN" sz="6400">
-                <a:sym typeface="+mn-ea"/>
-              </a:rPr>
-              <a:t>x</a:t>
-            </a:r>
-            <a:r>
-              <a:rPr lang="en-US" altLang="en-US" sz="6400">
-                <a:sym typeface="+mn-ea"/>
-              </a:rPr>
-              <a:t>₀: </a:t>
-            </a:r>
-            <a:r>
-              <a:rPr lang="en-US" altLang="zh-CN" sz="6400">
-                <a:sym typeface="+mn-ea"/>
-              </a:rPr>
-              <a:t>Baseline response or intercept term, representing the system’s intrinsic state when all controllable parameters are zero</a:t>
-            </a:r>
-            <a:endParaRPr lang="en-US" altLang="zh-CN" sz="6400">
-              <a:sym typeface="+mn-ea"/>
-            </a:endParaRPr>
-          </a:p>
-          <a:p>
-            <a:pPr marL="0" indent="0">
-              <a:buNone/>
-            </a:pPr>
-            <a:r>
-              <a:rPr lang="en-US" altLang="zh-CN" sz="6400">
-                <a:sym typeface="+mn-ea"/>
-              </a:rPr>
-              <a:t>x</a:t>
-            </a:r>
-            <a:r>
-              <a:rPr lang="en-US" altLang="en-US" sz="6400">
-                <a:sym typeface="+mn-ea"/>
-              </a:rPr>
-              <a:t>ᵢ: </a:t>
-            </a:r>
-            <a:r>
-              <a:rPr lang="en-US" altLang="zh-CN" sz="6400">
-                <a:sym typeface="+mn-ea"/>
-              </a:rPr>
-              <a:t>First-order response coefficient showing the direct influence of parameter c</a:t>
-            </a:r>
-            <a:r>
-              <a:rPr lang="en-US" altLang="en-US" sz="6400">
-                <a:sym typeface="+mn-ea"/>
-              </a:rPr>
-              <a:t>ᵢ </a:t>
-            </a:r>
-            <a:r>
-              <a:rPr lang="en-US" altLang="zh-CN" sz="6400">
-                <a:sym typeface="+mn-ea"/>
-              </a:rPr>
-              <a:t>on the emergent property.</a:t>
-            </a:r>
-            <a:endParaRPr lang="en-US" altLang="zh-CN" sz="6400">
-              <a:sym typeface="+mn-ea"/>
-            </a:endParaRPr>
-          </a:p>
-          <a:p>
-            <a:pPr marL="0" indent="0">
-              <a:buNone/>
-            </a:pPr>
-            <a:r>
-              <a:rPr lang="en-US" altLang="zh-CN" sz="6400">
-                <a:sym typeface="+mn-ea"/>
-              </a:rPr>
-              <a:t>x</a:t>
-            </a:r>
-            <a:r>
-              <a:rPr lang="en-US" altLang="en-US" sz="6400">
-                <a:sym typeface="+mn-ea"/>
-              </a:rPr>
-              <a:t>ᵢᵢ: </a:t>
-            </a:r>
-            <a:r>
-              <a:rPr lang="en-US" altLang="zh-CN" sz="6400">
-                <a:sym typeface="+mn-ea"/>
-              </a:rPr>
-              <a:t>Second-order self-interaction term that captures nonlinearity of parameter </a:t>
-            </a:r>
-            <a:r>
-              <a:rPr lang="en-US" altLang="zh-CN" sz="6400">
-                <a:sym typeface="+mn-ea"/>
-              </a:rPr>
-              <a:t>c</a:t>
-            </a:r>
-            <a:r>
-              <a:rPr lang="en-US" altLang="en-US" sz="6400">
-                <a:sym typeface="+mn-ea"/>
-              </a:rPr>
-              <a:t>ᵢ</a:t>
-            </a:r>
-            <a:r>
-              <a:rPr lang="en-US" altLang="zh-CN" sz="6400">
-                <a:sym typeface="+mn-ea"/>
-              </a:rPr>
-              <a:t>’s individual effect</a:t>
-            </a:r>
-            <a:endParaRPr lang="en-US" altLang="zh-CN" sz="6400">
-              <a:sym typeface="+mn-ea"/>
-            </a:endParaRPr>
-          </a:p>
-          <a:p>
-            <a:pPr marL="0" indent="0">
-              <a:buNone/>
-            </a:pPr>
-            <a:r>
-              <a:rPr lang="en-US" altLang="zh-CN" sz="6400">
-                <a:sym typeface="+mn-ea"/>
-              </a:rPr>
-              <a:t>x</a:t>
-            </a:r>
-            <a:r>
-              <a:rPr lang="en-US" altLang="en-US" sz="6400">
-                <a:sym typeface="+mn-ea"/>
-              </a:rPr>
-              <a:t>ᵢⱼ: </a:t>
-            </a:r>
-            <a:r>
-              <a:rPr lang="en-US" altLang="zh-CN" sz="6400">
-                <a:sym typeface="+mn-ea"/>
-              </a:rPr>
-              <a:t>Cross-interaction coefficient quantifying the coupling effect between parameters c</a:t>
-            </a:r>
-            <a:r>
-              <a:rPr lang="en-US" altLang="en-US" sz="6400">
-                <a:sym typeface="+mn-ea"/>
-              </a:rPr>
-              <a:t>ᵢ</a:t>
-            </a:r>
-            <a:r>
-              <a:rPr lang="en-US" altLang="zh-CN" sz="6400">
-                <a:sym typeface="+mn-ea"/>
-              </a:rPr>
-              <a:t> and c</a:t>
-            </a:r>
-            <a:r>
-              <a:rPr lang="en-US" altLang="en-US" sz="6400">
-                <a:sym typeface="+mn-ea"/>
-              </a:rPr>
-              <a:t>ⱼ</a:t>
-            </a:r>
-            <a:endParaRPr lang="en-US" altLang="zh-CN" sz="6400"/>
-          </a:p>
-        </p:txBody>
-      </p:sp>
-    </p:spTree>
-  </p:cSld>
-  <p:clrMapOvr>
-    <a:masterClrMapping/>
-  </p:clrMapOvr>
-</p:sld>
-</file>
-
-<file path=ppt/slides/slide6.xml><?xml version="1.0" encoding="utf-8"?>
-<p:sld xmlns:a="http://schemas.openxmlformats.org/drawingml/2006/main" xmlns:r="http://schemas.openxmlformats.org/officeDocument/2006/relationships" xmlns:p="http://schemas.openxmlformats.org/presentationml/2006/main">
-  <p:cSld>
-    <p:spTree>
-      <p:nvGrpSpPr>
-        <p:cNvPr id="1" name=""/>
-        <p:cNvGrpSpPr/>
-        <p:nvPr/>
-      </p:nvGrpSpPr>
-      <p:grpSpPr/>
-      <p:sp>
-        <p:nvSpPr>
-          <p:cNvPr id="2" name="标题 1"/>
-          <p:cNvSpPr>
-            <a:spLocks noGrp="1"/>
-          </p:cNvSpPr>
-          <p:nvPr>
-            <p:ph type="title"/>
-          </p:nvPr>
-        </p:nvSpPr>
-        <p:spPr/>
-        <p:txBody>
-          <a:bodyPr/>
-          <a:p>
-            <a:r>
-              <a:rPr lang="en-US" altLang="zh-CN">
-                <a:sym typeface="+mn-ea"/>
-              </a:rPr>
-              <a:t>Terminology</a:t>
-            </a:r>
-            <a:endParaRPr lang="zh-CN" altLang="en-US"/>
-          </a:p>
-        </p:txBody>
-      </p:sp>
-      <p:sp>
-        <p:nvSpPr>
-          <p:cNvPr id="3" name="内容占位符 2"/>
-          <p:cNvSpPr>
-            <a:spLocks noGrp="1"/>
-          </p:cNvSpPr>
-          <p:nvPr>
-            <p:ph idx="1"/>
-          </p:nvPr>
-        </p:nvSpPr>
-        <p:spPr>
-          <a:xfrm>
-            <a:off x="838200" y="1691005"/>
-            <a:ext cx="10515600" cy="4351338"/>
-          </a:xfrm>
-        </p:spPr>
-        <p:txBody>
-          <a:bodyPr>
-            <a:normAutofit fontScale="25000"/>
-          </a:bodyPr>
-          <a:p>
-            <a:pPr marL="0" indent="0">
-              <a:buNone/>
-            </a:pPr>
-            <a:r>
-              <a:rPr lang="en-US" altLang="zh-CN" sz="5600" b="1">
-                <a:sym typeface="+mn-ea"/>
-              </a:rPr>
-              <a:t>5. </a:t>
-            </a:r>
-            <a:r>
-              <a:rPr lang="en-US" altLang="zh-CN" sz="5600" b="1">
-                <a:sym typeface="+mn-ea"/>
-              </a:rPr>
-              <a:t>Orthogonal Array Composite Design (OACD)</a:t>
-            </a:r>
-            <a:endParaRPr lang="en-US" altLang="zh-CN" sz="5600" b="1"/>
-          </a:p>
-          <a:p>
-            <a:pPr marL="0" indent="0">
-              <a:buNone/>
-            </a:pPr>
-            <a:r>
-              <a:rPr lang="en-US" altLang="zh-CN" sz="5600">
-                <a:sym typeface="+mn-ea"/>
-              </a:rPr>
-              <a:t>A design-of-experiments (DOE) method that determines the minimal number of calibration tests needed to estimate CSR coefficients.</a:t>
-            </a:r>
-            <a:endParaRPr lang="en-US" altLang="zh-CN" sz="5600"/>
-          </a:p>
-          <a:p>
-            <a:pPr marL="0" indent="0">
-              <a:buNone/>
-            </a:pPr>
-            <a:r>
-              <a:rPr lang="en-US" altLang="zh-CN" sz="5600">
-                <a:sym typeface="+mn-ea"/>
-              </a:rPr>
-              <a:t>For P parameters, only (P</a:t>
-            </a:r>
-            <a:r>
-              <a:rPr lang="en-US" altLang="en-US" sz="5600">
-                <a:sym typeface="+mn-ea"/>
-              </a:rPr>
-              <a:t>²</a:t>
-            </a:r>
-            <a:r>
-              <a:rPr lang="en-US" altLang="zh-CN" sz="5600">
-                <a:sym typeface="+mn-ea"/>
-              </a:rPr>
-              <a:t> + 3P + 2)/2 tests are required instead of exploring all possible combinations.</a:t>
-            </a:r>
-            <a:endParaRPr lang="en-US" altLang="zh-CN" sz="5600"/>
-          </a:p>
-          <a:p>
-            <a:pPr marL="0" indent="0">
-              <a:buNone/>
-            </a:pPr>
-            <a:r>
-              <a:rPr lang="en-US" altLang="zh-CN" sz="5600" b="1">
-                <a:sym typeface="+mn-ea"/>
-              </a:rPr>
-              <a:t>6. Calibration (Fitting) Process</a:t>
-            </a:r>
-            <a:endParaRPr lang="en-US" altLang="zh-CN" sz="5600" b="1"/>
-          </a:p>
-          <a:p>
-            <a:pPr marL="0" indent="0">
-              <a:buNone/>
-            </a:pPr>
-            <a:r>
-              <a:rPr lang="en-US" altLang="zh-CN" sz="5600">
-                <a:sym typeface="+mn-ea"/>
-              </a:rPr>
-              <a:t>The procedure of determining CSR coefficients by fitting experimental or simulated data according to the OACD-designed test matrix.</a:t>
-            </a:r>
-            <a:endParaRPr lang="en-US" altLang="zh-CN" sz="5600"/>
-          </a:p>
-          <a:p>
-            <a:pPr marL="0" indent="0">
-              <a:buNone/>
-            </a:pPr>
-            <a:r>
-              <a:rPr lang="en-US" altLang="zh-CN" sz="5600" b="1">
-                <a:sym typeface="+mn-ea"/>
-              </a:rPr>
-              <a:t>7. Extremum (Global Optimum)</a:t>
-            </a:r>
-            <a:endParaRPr lang="en-US" altLang="zh-CN" sz="5600" b="1"/>
-          </a:p>
-          <a:p>
-            <a:pPr marL="0" indent="0">
-              <a:buNone/>
-            </a:pPr>
-            <a:r>
-              <a:rPr lang="en-US" altLang="zh-CN" sz="5600">
-                <a:sym typeface="+mn-ea"/>
-              </a:rPr>
-              <a:t>The maximum or minimum point on the CSR surface representing the best achievable system performance under given constraints.</a:t>
-            </a:r>
-            <a:endParaRPr lang="en-US" altLang="zh-CN" sz="5600"/>
-          </a:p>
-          <a:p>
-            <a:pPr marL="0" indent="0">
-              <a:buNone/>
-            </a:pPr>
-            <a:r>
-              <a:rPr lang="en-US" altLang="zh-CN" sz="5600" b="1">
-                <a:sym typeface="+mn-ea"/>
-              </a:rPr>
-              <a:t>8. Normalization</a:t>
-            </a:r>
-            <a:endParaRPr lang="en-US" altLang="zh-CN" sz="5600" b="1"/>
-          </a:p>
-          <a:p>
-            <a:pPr marL="0" indent="0">
-              <a:buNone/>
-            </a:pPr>
-            <a:r>
-              <a:rPr lang="en-US" altLang="zh-CN" sz="5600">
-                <a:sym typeface="+mn-ea"/>
-              </a:rPr>
-              <a:t>Normalization scales input magnitudes to a user-defined range.</a:t>
-            </a:r>
-            <a:endParaRPr lang="en-US" altLang="zh-CN" sz="5600"/>
-          </a:p>
-          <a:p>
-            <a:pPr marL="0" indent="0">
-              <a:buNone/>
-            </a:pPr>
-            <a:r>
-              <a:rPr lang="en-US" altLang="zh-CN" sz="5600" b="1">
-                <a:sym typeface="+mn-ea"/>
-              </a:rPr>
-              <a:t>9. Model Fit Metrics (R</a:t>
-            </a:r>
-            <a:r>
-              <a:rPr lang="en-US" altLang="en-US" sz="5600" b="1">
-                <a:sym typeface="+mn-ea"/>
-              </a:rPr>
-              <a:t>²</a:t>
-            </a:r>
-            <a:r>
-              <a:rPr lang="en-US" altLang="zh-CN" sz="5600" b="1">
-                <a:sym typeface="+mn-ea"/>
-              </a:rPr>
-              <a:t>, MSE)</a:t>
-            </a:r>
-            <a:endParaRPr lang="en-US" altLang="zh-CN" sz="5600" b="1"/>
-          </a:p>
-          <a:p>
-            <a:pPr marL="0" indent="0">
-              <a:buNone/>
-            </a:pPr>
-            <a:r>
-              <a:rPr lang="en-US" altLang="zh-CN" sz="5600">
-                <a:sym typeface="+mn-ea"/>
-              </a:rPr>
-              <a:t>Quantitative measures used to evaluate the CSR model:</a:t>
-            </a:r>
-            <a:endParaRPr lang="en-US" altLang="zh-CN" sz="5600"/>
-          </a:p>
-          <a:p>
-            <a:pPr marL="0" indent="0">
-              <a:buNone/>
-            </a:pPr>
-            <a:r>
-              <a:rPr lang="en-US" altLang="zh-CN" sz="5600">
-                <a:sym typeface="+mn-ea"/>
-              </a:rPr>
-              <a:t>R</a:t>
-            </a:r>
-            <a:r>
-              <a:rPr lang="en-US" altLang="en-US" sz="5600">
-                <a:sym typeface="+mn-ea"/>
-              </a:rPr>
-              <a:t>²</a:t>
-            </a:r>
-            <a:r>
-              <a:rPr lang="en-US" altLang="zh-CN" sz="5600">
-                <a:sym typeface="+mn-ea"/>
-              </a:rPr>
-              <a:t> (Coefficient of Determination): Indicates how well the CSR equation explains observed data.</a:t>
-            </a:r>
-            <a:endParaRPr lang="en-US" altLang="zh-CN" sz="5600"/>
-          </a:p>
-          <a:p>
-            <a:pPr marL="0" indent="0">
-              <a:buNone/>
-            </a:pPr>
-            <a:r>
-              <a:rPr lang="en-US" altLang="zh-CN" sz="5600">
-                <a:sym typeface="+mn-ea"/>
-              </a:rPr>
-              <a:t>MSE (Mean Squared Error): Measures prediction error between actual and modeled results.</a:t>
-            </a:r>
-            <a:endParaRPr lang="en-US" altLang="zh-CN" sz="5600">
-              <a:sym typeface="+mn-ea"/>
-            </a:endParaRPr>
-          </a:p>
-          <a:p>
-            <a:pPr marL="0" indent="0">
-              <a:buNone/>
-            </a:pPr>
-            <a:r>
-              <a:rPr lang="en-US" altLang="zh-CN" sz="5600" b="1">
-                <a:sym typeface="+mn-ea"/>
-              </a:rPr>
-              <a:t>10. CSR Surface Plot</a:t>
-            </a:r>
-            <a:endParaRPr lang="en-US" altLang="zh-CN" sz="5600" b="1"/>
-          </a:p>
-          <a:p>
-            <a:pPr marL="0" indent="0">
-              <a:buNone/>
-            </a:pPr>
-            <a:r>
-              <a:rPr lang="en-US" altLang="zh-CN" sz="5600">
-                <a:sym typeface="+mn-ea"/>
-              </a:rPr>
-              <a:t>Visual representations of the CSR response surface, showing parameter interactions and system trends. The extremum point corresponds to the optimal condition predicted by the CSR model</a:t>
-            </a:r>
-            <a:endParaRPr lang="en-US" altLang="zh-CN" sz="5600"/>
-          </a:p>
-          <a:p>
-            <a:endParaRPr lang="en-US" altLang="zh-CN" sz="5600"/>
-          </a:p>
-          <a:p>
-            <a:endParaRPr lang="zh-CN" altLang="en-US" sz="5600"/>
-          </a:p>
-        </p:txBody>
-      </p:sp>
-    </p:spTree>
-  </p:cSld>
-  <p:clrMapOvr>
-    <a:masterClrMapping/>
-  </p:clrMapOvr>
-</p:sld>
-</file>
-
 <file path=ppt/slides/slide7.xml><?xml version="1.0" encoding="utf-8"?>
 <p:sld xmlns:a="http://schemas.openxmlformats.org/drawingml/2006/main" xmlns:r="http://schemas.openxmlformats.org/officeDocument/2006/relationships" xmlns:p="http://schemas.openxmlformats.org/presentationml/2006/main">
   <p:cSld>
@@ -6167,54 +6169,7 @@
             <a:pPr algn="ctr"/>
             <a:r>
               <a:rPr lang="en-US" altLang="en-US" b="1"/>
-              <a:t>Result display</a:t>
-            </a:r>
-            <a:endParaRPr lang="en-US" altLang="en-US" b="1"/>
-          </a:p>
-        </p:txBody>
-      </p:sp>
-      <p:sp>
-        <p:nvSpPr>
-          <p:cNvPr id="7" name="Rectangles 6"/>
-          <p:cNvSpPr/>
-          <p:nvPr>
-            <p:custDataLst>
-              <p:tags r:id="rId3"/>
-            </p:custDataLst>
-          </p:nvPr>
-        </p:nvSpPr>
-        <p:spPr>
-          <a:xfrm>
-            <a:off x="9820910" y="3101975"/>
-            <a:ext cx="1751965" cy="654050"/>
-          </a:xfrm>
-          <a:prstGeom prst="rect">
-            <a:avLst/>
-          </a:prstGeom>
-        </p:spPr>
-        <p:style>
-          <a:lnRef idx="2">
-            <a:schemeClr val="accent1">
-              <a:lumMod val="75000"/>
-            </a:schemeClr>
-          </a:lnRef>
-          <a:fillRef idx="1">
-            <a:schemeClr val="accent1"/>
-          </a:fillRef>
-          <a:effectRef idx="0">
-            <a:srgbClr val="FFFFFF"/>
-          </a:effectRef>
-          <a:fontRef idx="minor">
-            <a:schemeClr val="lt1"/>
-          </a:fontRef>
-        </p:style>
-        <p:txBody>
-          <a:bodyPr rtlCol="0" anchor="ctr"/>
-          <a:p>
-            <a:pPr algn="ctr"/>
-            <a:r>
-              <a:rPr lang="en-US" altLang="en-US" b="1"/>
-              <a:t>Coefficeint analysis</a:t>
+              <a:t>Output</a:t>
             </a:r>
             <a:endParaRPr lang="en-US" altLang="en-US" b="1"/>
           </a:p>
@@ -6229,7 +6184,7 @@
           </p:cNvCxnSpPr>
           <p:nvPr>
             <p:custDataLst>
-              <p:tags r:id="rId4"/>
+              <p:tags r:id="rId3"/>
             </p:custDataLst>
           </p:nvPr>
         </p:nvCxnSpPr>
@@ -6260,60 +6215,20 @@
           </a:fontRef>
         </p:style>
       </p:cxnSp>
-      <p:cxnSp>
-        <p:nvCxnSpPr>
-          <p:cNvPr id="10" name="Straight Arrow Connector 9"/>
-          <p:cNvCxnSpPr>
-            <a:stCxn id="6" idx="3"/>
-            <a:endCxn id="7" idx="1"/>
-          </p:cNvCxnSpPr>
-          <p:nvPr>
-            <p:custDataLst>
-              <p:tags r:id="rId5"/>
-            </p:custDataLst>
-          </p:nvPr>
-        </p:nvCxnSpPr>
-        <p:spPr>
-          <a:xfrm>
-            <a:off x="9203690" y="3429000"/>
-            <a:ext cx="617220" cy="0"/>
-          </a:xfrm>
-          <a:prstGeom prst="straightConnector1">
-            <a:avLst/>
-          </a:prstGeom>
-          <a:ln>
-            <a:tailEnd type="arrow"/>
-          </a:ln>
-        </p:spPr>
-        <p:style>
-          <a:lnRef idx="2">
-            <a:schemeClr val="accent1"/>
-          </a:lnRef>
-          <a:fillRef idx="0">
-            <a:srgbClr val="FFFFFF"/>
-          </a:fillRef>
-          <a:effectRef idx="0">
-            <a:srgbClr val="FFFFFF"/>
-          </a:effectRef>
-          <a:fontRef idx="minor">
-            <a:schemeClr val="tx1"/>
-          </a:fontRef>
-        </p:style>
-      </p:cxnSp>
       <p:sp>
         <p:nvSpPr>
           <p:cNvPr id="11" name="Text Box 10"/>
           <p:cNvSpPr txBox="1"/>
           <p:nvPr>
             <p:custDataLst>
-              <p:tags r:id="rId6"/>
+              <p:tags r:id="rId4"/>
             </p:custDataLst>
           </p:nvPr>
         </p:nvSpPr>
         <p:spPr>
           <a:xfrm>
             <a:off x="2407285" y="3956050"/>
-            <a:ext cx="3035300" cy="1076325"/>
+            <a:ext cx="3035300" cy="829945"/>
           </a:xfrm>
           <a:prstGeom prst="rect">
             <a:avLst/>
@@ -6348,9 +6263,9 @@
               <a:rPr lang="en-US" sz="1600" b="1">
                 <a:sym typeface="+mn-ea"/>
               </a:rPr>
-              <a:t>Normalization Standard</a:t>
-            </a:r>
-            <a:endParaRPr lang="en-US" sz="1600">
+              <a:t>Normalization</a:t>
+            </a:r>
+            <a:endParaRPr lang="en-US" sz="1600" b="1">
               <a:sym typeface="+mn-ea"/>
             </a:endParaRPr>
           </a:p>
@@ -6363,27 +6278,12 @@
               <a:rPr lang="en-US" sz="1600" b="1">
                 <a:sym typeface="+mn-ea"/>
               </a:rPr>
-              <a:t>Regularization Parameter</a:t>
+              <a:t>Select Factors to Include</a:t>
             </a:r>
             <a:endParaRPr lang="en-US" sz="1600" b="1">
               <a:sym typeface="+mn-ea"/>
             </a:endParaRPr>
           </a:p>
-          <a:p>
-            <a:pPr marL="285750" indent="-285750">
-              <a:buFont typeface="Arial" panose="020B0604020202020204" pitchFamily="34" charset="0"/>
-              <a:buChar char="•"/>
-            </a:pPr>
-            <a:r>
-              <a:rPr lang="en-US" sz="1600" b="1">
-                <a:sym typeface="+mn-ea"/>
-              </a:rPr>
-              <a:t>Select Factors to Include</a:t>
-            </a:r>
-            <a:endParaRPr lang="en-US" sz="1600" b="1">
-              <a:sym typeface="+mn-ea"/>
-            </a:endParaRPr>
-          </a:p>
         </p:txBody>
       </p:sp>
       <p:sp>
@@ -6392,7 +6292,7 @@
           <p:cNvSpPr/>
           <p:nvPr>
             <p:custDataLst>
-              <p:tags r:id="rId7"/>
+              <p:tags r:id="rId5"/>
             </p:custDataLst>
           </p:nvPr>
         </p:nvSpPr>
@@ -6453,7 +6353,7 @@
           </p:cNvCxnSpPr>
           <p:nvPr>
             <p:custDataLst>
-              <p:tags r:id="rId8"/>
+              <p:tags r:id="rId6"/>
             </p:custDataLst>
           </p:nvPr>
         </p:nvCxnSpPr>
@@ -6490,7 +6390,7 @@
           <p:cNvCxnSpPr/>
           <p:nvPr>
             <p:custDataLst>
-              <p:tags r:id="rId9"/>
+              <p:tags r:id="rId7"/>
             </p:custDataLst>
           </p:nvPr>
         </p:nvCxnSpPr>
@@ -6527,14 +6427,14 @@
           <p:cNvSpPr txBox="1"/>
           <p:nvPr>
             <p:custDataLst>
-              <p:tags r:id="rId10"/>
+              <p:tags r:id="rId8"/>
             </p:custDataLst>
           </p:nvPr>
         </p:nvSpPr>
         <p:spPr>
           <a:xfrm>
             <a:off x="6785610" y="3956050"/>
-            <a:ext cx="3035300" cy="1322070"/>
+            <a:ext cx="3902075" cy="2061210"/>
           </a:xfrm>
           <a:prstGeom prst="rect">
             <a:avLst/>
@@ -6620,32 +6520,6 @@
               <a:sym typeface="+mn-ea"/>
             </a:endParaRPr>
           </a:p>
-        </p:txBody>
-      </p:sp>
-      <p:sp>
-        <p:nvSpPr>
-          <p:cNvPr id="9" name="Text Box 14"/>
-          <p:cNvSpPr txBox="1"/>
-          <p:nvPr>
-            <p:custDataLst>
-              <p:tags r:id="rId11"/>
-            </p:custDataLst>
-          </p:nvPr>
-        </p:nvSpPr>
-        <p:spPr>
-          <a:xfrm>
-            <a:off x="9605010" y="3956050"/>
-            <a:ext cx="2586355" cy="1322070"/>
-          </a:xfrm>
-          <a:prstGeom prst="rect">
-            <a:avLst/>
-          </a:prstGeom>
-          <a:noFill/>
-        </p:spPr>
-        <p:txBody>
-          <a:bodyPr wrap="square" rtlCol="0" anchor="t">
-            <a:spAutoFit/>
-          </a:bodyPr>
           <a:p>
             <a:pPr marL="285750" indent="-285750">
               <a:buFont typeface="Arial" panose="020B0604020202020204" pitchFamily="34" charset="0"/>
@@ -6951,18 +6825,6 @@
 <file path=ppt/tags/tag1.xml><?xml version="1.0" encoding="utf-8"?>
 <p:tagLst xmlns:p="http://schemas.openxmlformats.org/presentationml/2006/main">
   <p:tag name="KSO_WM_DIAGRAM_VIRTUALLY_FRAME" val="{&quot;height&quot;:171.35,&quot;left&quot;:165.05,&quot;top&quot;:244.25,&quot;width&quot;:746.2}"/>
-</p:tagLst>
-</file>
-
-<file path=ppt/tags/tag10.xml><?xml version="1.0" encoding="utf-8"?>
-<p:tagLst xmlns:p="http://schemas.openxmlformats.org/presentationml/2006/main">
-  <p:tag name="KSO_WM_DIAGRAM_VIRTUALLY_FRAME" val="{&quot;height&quot;:171.35,&quot;left&quot;:165.05,&quot;top&quot;:244.25,&quot;width&quot;:746.2}"/>
-</p:tagLst>
-</file>
-
-<file path=ppt/tags/tag11.xml><?xml version="1.0" encoding="utf-8"?>
-<p:tagLst xmlns:p="http://schemas.openxmlformats.org/presentationml/2006/main">
-  <p:tag name="KSO_WM_DIAGRAM_VIRTUALLY_FRAME" val="{&quot;height&quot;:152,&quot;left&quot;:165.05,&quot;top&quot;:244.25,&quot;width&quot;:746.2}"/>
 </p:tagLst>
 </file>
 
@@ -7003,12 +6865,6 @@
 </file>
 
 <file path=ppt/tags/tag8.xml><?xml version="1.0" encoding="utf-8"?>
-<p:tagLst xmlns:p="http://schemas.openxmlformats.org/presentationml/2006/main">
-  <p:tag name="KSO_WM_DIAGRAM_VIRTUALLY_FRAME" val="{&quot;height&quot;:171.35,&quot;left&quot;:165.05,&quot;top&quot;:244.25,&quot;width&quot;:746.2}"/>
-</p:tagLst>
-</file>
-
-<file path=ppt/tags/tag9.xml><?xml version="1.0" encoding="utf-8"?>
 <p:tagLst xmlns:p="http://schemas.openxmlformats.org/presentationml/2006/main">
   <p:tag name="KSO_WM_DIAGRAM_VIRTUALLY_FRAME" val="{&quot;height&quot;:171.35,&quot;left&quot;:165.05,&quot;top&quot;:244.25,&quot;width&quot;:746.2}"/>
 </p:tagLst>

</xml_diff>

<commit_message>
Comprehensive opt bug fix
</commit_message>
<xml_diff>
--- a/CSR APP Instruction.pptx
+++ b/CSR APP Instruction.pptx
@@ -5,25 +5,26 @@
     <p:sldMasterId id="2147483648" r:id="rId1"/>
   </p:sldMasterIdLst>
   <p:notesMasterIdLst>
-    <p:notesMasterId r:id="rId15"/>
+    <p:notesMasterId r:id="rId8"/>
   </p:notesMasterIdLst>
   <p:handoutMasterIdLst>
-    <p:handoutMasterId r:id="rId16"/>
+    <p:handoutMasterId r:id="rId18"/>
   </p:handoutMasterIdLst>
   <p:sldIdLst>
-    <p:sldId id="256" r:id="rId2"/>
-    <p:sldId id="262" r:id="rId3"/>
-    <p:sldId id="267" r:id="rId4"/>
-    <p:sldId id="268" r:id="rId5"/>
-    <p:sldId id="258" r:id="rId6"/>
-    <p:sldId id="269" r:id="rId7"/>
-    <p:sldId id="263" r:id="rId8"/>
-    <p:sldId id="264" r:id="rId9"/>
-    <p:sldId id="257" r:id="rId10"/>
-    <p:sldId id="265" r:id="rId11"/>
-    <p:sldId id="266" r:id="rId12"/>
-    <p:sldId id="260" r:id="rId13"/>
-    <p:sldId id="261" r:id="rId14"/>
+    <p:sldId id="256" r:id="rId3"/>
+    <p:sldId id="262" r:id="rId4"/>
+    <p:sldId id="267" r:id="rId5"/>
+    <p:sldId id="268" r:id="rId6"/>
+    <p:sldId id="258" r:id="rId7"/>
+    <p:sldId id="269" r:id="rId9"/>
+    <p:sldId id="263" r:id="rId10"/>
+    <p:sldId id="271" r:id="rId11"/>
+    <p:sldId id="264" r:id="rId12"/>
+    <p:sldId id="257" r:id="rId13"/>
+    <p:sldId id="265" r:id="rId14"/>
+    <p:sldId id="270" r:id="rId15"/>
+    <p:sldId id="260" r:id="rId16"/>
+    <p:sldId id="261" r:id="rId17"/>
   </p:sldIdLst>
   <p:sldSz cx="12192000" cy="6858000"/>
   <p:notesSz cx="6858000" cy="9144000"/>
@@ -147,66 +148,6 @@
 </p:cmAuthorLst>
 </file>
 
-<file path=ppt/revisionInfo.xml><?xml version="1.0" encoding="utf-8"?>
-<p1510:revInfo xmlns:a="http://schemas.openxmlformats.org/drawingml/2006/main" xmlns:r="http://schemas.openxmlformats.org/officeDocument/2006/relationships" xmlns:p1510="http://schemas.microsoft.com/office/powerpoint/2015/10/main">
-  <p1510:revLst>
-    <p1510:client id="{3E1012C5-66BE-41A0-A83B-9A46F0571C5F}" v="1127" dt="2025-11-21T09:25:41.008"/>
-  </p1510:revLst>
-</p1510:revInfo>
-</file>
-
-<file path=ppt/changesInfos/changesInfo1.xml><?xml version="1.0" encoding="utf-8"?>
-<pc:chgInfo xmlns:a="http://schemas.openxmlformats.org/drawingml/2006/main" xmlns:r="http://schemas.openxmlformats.org/officeDocument/2006/relationships" xmlns:ac="http://schemas.microsoft.com/office/drawing/2013/main/command" xmlns:pc="http://schemas.microsoft.com/office/powerpoint/2013/main/command">
-  <pc:docChgLst>
-    <pc:chgData name="Ming Lo" userId="120b0b76e050b59f" providerId="Windows Live" clId="Web-{3E1012C5-66BE-41A0-A83B-9A46F0571C5F}"/>
-    <pc:docChg chg="modSld">
-      <pc:chgData name="Ming Lo" userId="120b0b76e050b59f" providerId="Windows Live" clId="Web-{3E1012C5-66BE-41A0-A83B-9A46F0571C5F}" dt="2025-11-21T09:25:41.008" v="1126" actId="20577"/>
-      <pc:docMkLst>
-        <pc:docMk/>
-      </pc:docMkLst>
-      <pc:sldChg chg="modSp">
-        <pc:chgData name="Ming Lo" userId="120b0b76e050b59f" providerId="Windows Live" clId="Web-{3E1012C5-66BE-41A0-A83B-9A46F0571C5F}" dt="2025-11-21T09:25:41.008" v="1126" actId="20577"/>
-        <pc:sldMkLst>
-          <pc:docMk/>
-          <pc:sldMk cId="0" sldId="264"/>
-        </pc:sldMkLst>
-        <pc:spChg chg="mod">
-          <ac:chgData name="Ming Lo" userId="120b0b76e050b59f" providerId="Windows Live" clId="Web-{3E1012C5-66BE-41A0-A83B-9A46F0571C5F}" dt="2025-11-21T09:09:15.831" v="288" actId="20577"/>
-          <ac:spMkLst>
-            <pc:docMk/>
-            <pc:sldMk cId="0" sldId="264"/>
-            <ac:spMk id="2" creationId="{00000000-0000-0000-0000-000000000000}"/>
-          </ac:spMkLst>
-        </pc:spChg>
-        <pc:spChg chg="mod">
-          <ac:chgData name="Ming Lo" userId="120b0b76e050b59f" providerId="Windows Live" clId="Web-{3E1012C5-66BE-41A0-A83B-9A46F0571C5F}" dt="2025-11-21T09:25:41.008" v="1126" actId="20577"/>
-          <ac:spMkLst>
-            <pc:docMk/>
-            <pc:sldMk cId="0" sldId="264"/>
-            <ac:spMk id="3" creationId="{00000000-0000-0000-0000-000000000000}"/>
-          </ac:spMkLst>
-        </pc:spChg>
-      </pc:sldChg>
-      <pc:sldChg chg="modSp">
-        <pc:chgData name="Ming Lo" userId="120b0b76e050b59f" providerId="Windows Live" clId="Web-{3E1012C5-66BE-41A0-A83B-9A46F0571C5F}" dt="2025-11-21T09:21:28.754" v="879" actId="1076"/>
-        <pc:sldMkLst>
-          <pc:docMk/>
-          <pc:sldMk cId="0" sldId="266"/>
-        </pc:sldMkLst>
-        <pc:spChg chg="mod">
-          <ac:chgData name="Ming Lo" userId="120b0b76e050b59f" providerId="Windows Live" clId="Web-{3E1012C5-66BE-41A0-A83B-9A46F0571C5F}" dt="2025-11-21T09:21:28.754" v="879" actId="1076"/>
-          <ac:spMkLst>
-            <pc:docMk/>
-            <pc:sldMk cId="0" sldId="266"/>
-            <ac:spMk id="3" creationId="{00000000-0000-0000-0000-000000000000}"/>
-          </ac:spMkLst>
-        </pc:spChg>
-      </pc:sldChg>
-    </pc:docChg>
-  </pc:docChgLst>
-</pc:chgInfo>
-</file>
-
 <file path=ppt/handoutMasters/handoutMaster1.xml><?xml version="1.0" encoding="utf-8"?>
 <p:handoutMaster xmlns:a="http://schemas.openxmlformats.org/drawingml/2006/main" xmlns:r="http://schemas.openxmlformats.org/officeDocument/2006/relationships" xmlns:p="http://schemas.openxmlformats.org/presentationml/2006/main">
   <p:cSld>
@@ -289,7 +230,6 @@
           <a:p>
             <a:fld id="{0F9B84EA-7D68-4D60-9CB1-D50884785D1C}" type="datetimeFigureOut">
               <a:rPr lang="zh-CN" altLang="en-US" smtClean="0"/>
-              <a:t>2025/11/21</a:t>
             </a:fld>
             <a:endParaRPr lang="zh-CN" altLang="en-US"/>
           </a:p>
@@ -355,18 +295,12 @@
           <a:p>
             <a:fld id="{8D4E0FC9-F1F8-4FAE-9988-3BA365CFD46F}" type="slidenum">
               <a:rPr lang="zh-CN" altLang="en-US" smtClean="0"/>
-              <a:t>‹#›</a:t>
             </a:fld>
             <a:endParaRPr lang="zh-CN" altLang="en-US"/>
           </a:p>
         </p:txBody>
       </p:sp>
     </p:spTree>
-    <p:extLst>
-      <p:ext uri="{BB962C8B-B14F-4D97-AF65-F5344CB8AC3E}">
-        <p14:creationId xmlns:p14="http://schemas.microsoft.com/office/powerpoint/2010/main" val="1"/>
-      </p:ext>
-    </p:extLst>
   </p:cSld>
   <p:clrMap bg1="lt1" tx1="dk1" bg2="lt2" tx2="dk2" accent1="accent1" accent2="accent2" accent3="accent3" accent4="accent4" accent5="accent5" accent6="accent6" hlink="hlink" folHlink="folHlink"/>
 </p:handoutMaster>
@@ -454,7 +388,6 @@
           <a:p>
             <a:fld id="{3EFD42F7-718C-4B98-AAEC-167E6DDD60A7}" type="datetimeFigureOut">
               <a:rPr lang="en-US" smtClean="0"/>
-              <a:t>11/21/2025</a:t>
             </a:fld>
             <a:endParaRPr lang="en-US"/>
           </a:p>
@@ -521,6 +454,7 @@
               <a:rPr lang="en-US"/>
               <a:t>Click to edit Master text styles</a:t>
             </a:r>
+            <a:endParaRPr lang="en-US"/>
           </a:p>
           <a:p>
             <a:pPr lvl="1"/>
@@ -528,6 +462,7 @@
               <a:rPr lang="en-US"/>
               <a:t>Second level</a:t>
             </a:r>
+            <a:endParaRPr lang="en-US"/>
           </a:p>
           <a:p>
             <a:pPr lvl="2"/>
@@ -535,6 +470,7 @@
               <a:rPr lang="en-US"/>
               <a:t>Third level</a:t>
             </a:r>
+            <a:endParaRPr lang="en-US"/>
           </a:p>
           <a:p>
             <a:pPr lvl="3"/>
@@ -542,6 +478,7 @@
               <a:rPr lang="en-US"/>
               <a:t>Fourth level</a:t>
             </a:r>
+            <a:endParaRPr lang="en-US"/>
           </a:p>
           <a:p>
             <a:pPr lvl="4"/>
@@ -549,6 +486,7 @@
               <a:rPr lang="en-US"/>
               <a:t>Fifth level</a:t>
             </a:r>
+            <a:endParaRPr lang="en-US"/>
           </a:p>
         </p:txBody>
       </p:sp>
@@ -612,7 +550,6 @@
           <a:p>
             <a:fld id="{21B2AA4F-B828-4D7C-AFD3-893933DAFCB4}" type="slidenum">
               <a:rPr lang="en-US" smtClean="0"/>
-              <a:t>‹#›</a:t>
             </a:fld>
             <a:endParaRPr lang="en-US"/>
           </a:p>
@@ -781,7 +718,6 @@
           <a:p>
             <a:fld id="{D6542D3B-516C-4540-A2E1-374EBBF9159E}" type="slidenum">
               <a:rPr lang="en-US" smtClean="0"/>
-              <a:t>5</a:t>
             </a:fld>
             <a:endParaRPr lang="en-US"/>
           </a:p>
@@ -840,6 +776,7 @@
               <a:rPr lang="en-US"/>
               <a:t>Click to edit Master title style</a:t>
             </a:r>
+            <a:endParaRPr lang="en-US"/>
           </a:p>
         </p:txBody>
       </p:sp>
@@ -904,6 +841,7 @@
               <a:rPr lang="en-US"/>
               <a:t>Click to edit Master subtitle style</a:t>
             </a:r>
+            <a:endParaRPr lang="en-US"/>
           </a:p>
         </p:txBody>
       </p:sp>
@@ -924,7 +862,6 @@
           <a:p>
             <a:fld id="{63A1C593-65D0-4073-BCC9-577B9352EA97}" type="datetimeFigureOut">
               <a:rPr lang="en-US" smtClean="0"/>
-              <a:t>11/21/2025</a:t>
             </a:fld>
             <a:endParaRPr lang="en-US"/>
           </a:p>
@@ -966,7 +903,6 @@
           <a:p>
             <a:fld id="{9B618960-8005-486C-9A75-10CB2AAC16F9}" type="slidenum">
               <a:rPr lang="en-US" smtClean="0"/>
-              <a:t>‹#›</a:t>
             </a:fld>
             <a:endParaRPr lang="en-US"/>
           </a:p>
@@ -1016,6 +952,7 @@
               <a:rPr lang="en-US"/>
               <a:t>Click to edit Master title style</a:t>
             </a:r>
+            <a:endParaRPr lang="en-US"/>
           </a:p>
         </p:txBody>
       </p:sp>
@@ -1039,6 +976,7 @@
               <a:rPr lang="en-US"/>
               <a:t>Click to edit Master text styles</a:t>
             </a:r>
+            <a:endParaRPr lang="en-US"/>
           </a:p>
           <a:p>
             <a:pPr lvl="1"/>
@@ -1046,6 +984,7 @@
               <a:rPr lang="en-US"/>
               <a:t>Second level</a:t>
             </a:r>
+            <a:endParaRPr lang="en-US"/>
           </a:p>
           <a:p>
             <a:pPr lvl="2"/>
@@ -1053,6 +992,7 @@
               <a:rPr lang="en-US"/>
               <a:t>Third level</a:t>
             </a:r>
+            <a:endParaRPr lang="en-US"/>
           </a:p>
           <a:p>
             <a:pPr lvl="3"/>
@@ -1060,6 +1000,7 @@
               <a:rPr lang="en-US"/>
               <a:t>Fourth level</a:t>
             </a:r>
+            <a:endParaRPr lang="en-US"/>
           </a:p>
           <a:p>
             <a:pPr lvl="4"/>
@@ -1067,6 +1008,7 @@
               <a:rPr lang="en-US"/>
               <a:t>Fifth level</a:t>
             </a:r>
+            <a:endParaRPr lang="en-US"/>
           </a:p>
         </p:txBody>
       </p:sp>
@@ -1087,7 +1029,6 @@
           <a:p>
             <a:fld id="{63A1C593-65D0-4073-BCC9-577B9352EA97}" type="datetimeFigureOut">
               <a:rPr lang="en-US" smtClean="0"/>
-              <a:t>11/21/2025</a:t>
             </a:fld>
             <a:endParaRPr lang="en-US"/>
           </a:p>
@@ -1129,7 +1070,6 @@
           <a:p>
             <a:fld id="{9B618960-8005-486C-9A75-10CB2AAC16F9}" type="slidenum">
               <a:rPr lang="en-US" smtClean="0"/>
-              <a:t>‹#›</a:t>
             </a:fld>
             <a:endParaRPr lang="en-US"/>
           </a:p>
@@ -1184,6 +1124,7 @@
               <a:rPr lang="en-US"/>
               <a:t>Click to edit Master title style</a:t>
             </a:r>
+            <a:endParaRPr lang="en-US"/>
           </a:p>
         </p:txBody>
       </p:sp>
@@ -1212,6 +1153,7 @@
               <a:rPr lang="en-US"/>
               <a:t>Click to edit Master text styles</a:t>
             </a:r>
+            <a:endParaRPr lang="en-US"/>
           </a:p>
           <a:p>
             <a:pPr lvl="1"/>
@@ -1219,6 +1161,7 @@
               <a:rPr lang="en-US"/>
               <a:t>Second level</a:t>
             </a:r>
+            <a:endParaRPr lang="en-US"/>
           </a:p>
           <a:p>
             <a:pPr lvl="2"/>
@@ -1226,6 +1169,7 @@
               <a:rPr lang="en-US"/>
               <a:t>Third level</a:t>
             </a:r>
+            <a:endParaRPr lang="en-US"/>
           </a:p>
           <a:p>
             <a:pPr lvl="3"/>
@@ -1233,6 +1177,7 @@
               <a:rPr lang="en-US"/>
               <a:t>Fourth level</a:t>
             </a:r>
+            <a:endParaRPr lang="en-US"/>
           </a:p>
           <a:p>
             <a:pPr lvl="4"/>
@@ -1240,6 +1185,7 @@
               <a:rPr lang="en-US"/>
               <a:t>Fifth level</a:t>
             </a:r>
+            <a:endParaRPr lang="en-US"/>
           </a:p>
         </p:txBody>
       </p:sp>
@@ -1260,7 +1206,6 @@
           <a:p>
             <a:fld id="{63A1C593-65D0-4073-BCC9-577B9352EA97}" type="datetimeFigureOut">
               <a:rPr lang="en-US" smtClean="0"/>
-              <a:t>11/21/2025</a:t>
             </a:fld>
             <a:endParaRPr lang="en-US"/>
           </a:p>
@@ -1302,7 +1247,6 @@
           <a:p>
             <a:fld id="{9B618960-8005-486C-9A75-10CB2AAC16F9}" type="slidenum">
               <a:rPr lang="en-US" smtClean="0"/>
-              <a:t>‹#›</a:t>
             </a:fld>
             <a:endParaRPr lang="en-US"/>
           </a:p>
@@ -1352,6 +1296,7 @@
               <a:rPr lang="en-US"/>
               <a:t>Click to edit Master title style</a:t>
             </a:r>
+            <a:endParaRPr lang="en-US"/>
           </a:p>
         </p:txBody>
       </p:sp>
@@ -1375,6 +1320,7 @@
               <a:rPr lang="en-US"/>
               <a:t>Click to edit Master text styles</a:t>
             </a:r>
+            <a:endParaRPr lang="en-US"/>
           </a:p>
           <a:p>
             <a:pPr lvl="1"/>
@@ -1382,6 +1328,7 @@
               <a:rPr lang="en-US"/>
               <a:t>Second level</a:t>
             </a:r>
+            <a:endParaRPr lang="en-US"/>
           </a:p>
           <a:p>
             <a:pPr lvl="2"/>
@@ -1389,6 +1336,7 @@
               <a:rPr lang="en-US"/>
               <a:t>Third level</a:t>
             </a:r>
+            <a:endParaRPr lang="en-US"/>
           </a:p>
           <a:p>
             <a:pPr lvl="3"/>
@@ -1396,6 +1344,7 @@
               <a:rPr lang="en-US"/>
               <a:t>Fourth level</a:t>
             </a:r>
+            <a:endParaRPr lang="en-US"/>
           </a:p>
           <a:p>
             <a:pPr lvl="4"/>
@@ -1403,6 +1352,7 @@
               <a:rPr lang="en-US"/>
               <a:t>Fifth level</a:t>
             </a:r>
+            <a:endParaRPr lang="en-US"/>
           </a:p>
         </p:txBody>
       </p:sp>
@@ -1423,7 +1373,6 @@
           <a:p>
             <a:fld id="{63A1C593-65D0-4073-BCC9-577B9352EA97}" type="datetimeFigureOut">
               <a:rPr lang="en-US" smtClean="0"/>
-              <a:t>11/21/2025</a:t>
             </a:fld>
             <a:endParaRPr lang="en-US"/>
           </a:p>
@@ -1465,7 +1414,6 @@
           <a:p>
             <a:fld id="{9B618960-8005-486C-9A75-10CB2AAC16F9}" type="slidenum">
               <a:rPr lang="en-US" smtClean="0"/>
-              <a:t>‹#›</a:t>
             </a:fld>
             <a:endParaRPr lang="en-US"/>
           </a:p>
@@ -1524,6 +1472,7 @@
               <a:rPr lang="en-US"/>
               <a:t>Click to edit Master title style</a:t>
             </a:r>
+            <a:endParaRPr lang="en-US"/>
           </a:p>
         </p:txBody>
       </p:sp>
@@ -1643,6 +1592,7 @@
               <a:rPr lang="en-US"/>
               <a:t>Click to edit Master text styles</a:t>
             </a:r>
+            <a:endParaRPr lang="en-US"/>
           </a:p>
         </p:txBody>
       </p:sp>
@@ -1663,7 +1613,6 @@
           <a:p>
             <a:fld id="{63A1C593-65D0-4073-BCC9-577B9352EA97}" type="datetimeFigureOut">
               <a:rPr lang="en-US" smtClean="0"/>
-              <a:t>11/21/2025</a:t>
             </a:fld>
             <a:endParaRPr lang="en-US"/>
           </a:p>
@@ -1705,7 +1654,6 @@
           <a:p>
             <a:fld id="{9B618960-8005-486C-9A75-10CB2AAC16F9}" type="slidenum">
               <a:rPr lang="en-US" smtClean="0"/>
-              <a:t>‹#›</a:t>
             </a:fld>
             <a:endParaRPr lang="en-US"/>
           </a:p>
@@ -1755,6 +1703,7 @@
               <a:rPr lang="en-US"/>
               <a:t>Click to edit Master title style</a:t>
             </a:r>
+            <a:endParaRPr lang="en-US"/>
           </a:p>
         </p:txBody>
       </p:sp>
@@ -1783,6 +1732,7 @@
               <a:rPr lang="en-US"/>
               <a:t>Click to edit Master text styles</a:t>
             </a:r>
+            <a:endParaRPr lang="en-US"/>
           </a:p>
           <a:p>
             <a:pPr lvl="1"/>
@@ -1790,6 +1740,7 @@
               <a:rPr lang="en-US"/>
               <a:t>Second level</a:t>
             </a:r>
+            <a:endParaRPr lang="en-US"/>
           </a:p>
           <a:p>
             <a:pPr lvl="2"/>
@@ -1797,6 +1748,7 @@
               <a:rPr lang="en-US"/>
               <a:t>Third level</a:t>
             </a:r>
+            <a:endParaRPr lang="en-US"/>
           </a:p>
           <a:p>
             <a:pPr lvl="3"/>
@@ -1804,6 +1756,7 @@
               <a:rPr lang="en-US"/>
               <a:t>Fourth level</a:t>
             </a:r>
+            <a:endParaRPr lang="en-US"/>
           </a:p>
           <a:p>
             <a:pPr lvl="4"/>
@@ -1811,6 +1764,7 @@
               <a:rPr lang="en-US"/>
               <a:t>Fifth level</a:t>
             </a:r>
+            <a:endParaRPr lang="en-US"/>
           </a:p>
         </p:txBody>
       </p:sp>
@@ -1839,6 +1793,7 @@
               <a:rPr lang="en-US"/>
               <a:t>Click to edit Master text styles</a:t>
             </a:r>
+            <a:endParaRPr lang="en-US"/>
           </a:p>
           <a:p>
             <a:pPr lvl="1"/>
@@ -1846,6 +1801,7 @@
               <a:rPr lang="en-US"/>
               <a:t>Second level</a:t>
             </a:r>
+            <a:endParaRPr lang="en-US"/>
           </a:p>
           <a:p>
             <a:pPr lvl="2"/>
@@ -1853,6 +1809,7 @@
               <a:rPr lang="en-US"/>
               <a:t>Third level</a:t>
             </a:r>
+            <a:endParaRPr lang="en-US"/>
           </a:p>
           <a:p>
             <a:pPr lvl="3"/>
@@ -1860,6 +1817,7 @@
               <a:rPr lang="en-US"/>
               <a:t>Fourth level</a:t>
             </a:r>
+            <a:endParaRPr lang="en-US"/>
           </a:p>
           <a:p>
             <a:pPr lvl="4"/>
@@ -1867,6 +1825,7 @@
               <a:rPr lang="en-US"/>
               <a:t>Fifth level</a:t>
             </a:r>
+            <a:endParaRPr lang="en-US"/>
           </a:p>
         </p:txBody>
       </p:sp>
@@ -1887,7 +1846,6 @@
           <a:p>
             <a:fld id="{63A1C593-65D0-4073-BCC9-577B9352EA97}" type="datetimeFigureOut">
               <a:rPr lang="en-US" smtClean="0"/>
-              <a:t>11/21/2025</a:t>
             </a:fld>
             <a:endParaRPr lang="en-US"/>
           </a:p>
@@ -1929,7 +1887,6 @@
           <a:p>
             <a:fld id="{9B618960-8005-486C-9A75-10CB2AAC16F9}" type="slidenum">
               <a:rPr lang="en-US" smtClean="0"/>
-              <a:t>‹#›</a:t>
             </a:fld>
             <a:endParaRPr lang="en-US"/>
           </a:p>
@@ -1984,6 +1941,7 @@
               <a:rPr lang="en-US"/>
               <a:t>Click to edit Master title style</a:t>
             </a:r>
+            <a:endParaRPr lang="en-US"/>
           </a:p>
         </p:txBody>
       </p:sp>
@@ -2049,6 +2007,7 @@
               <a:rPr lang="en-US"/>
               <a:t>Click to edit Master text styles</a:t>
             </a:r>
+            <a:endParaRPr lang="en-US"/>
           </a:p>
         </p:txBody>
       </p:sp>
@@ -2077,6 +2036,7 @@
               <a:rPr lang="en-US"/>
               <a:t>Click to edit Master text styles</a:t>
             </a:r>
+            <a:endParaRPr lang="en-US"/>
           </a:p>
           <a:p>
             <a:pPr lvl="1"/>
@@ -2084,6 +2044,7 @@
               <a:rPr lang="en-US"/>
               <a:t>Second level</a:t>
             </a:r>
+            <a:endParaRPr lang="en-US"/>
           </a:p>
           <a:p>
             <a:pPr lvl="2"/>
@@ -2091,6 +2052,7 @@
               <a:rPr lang="en-US"/>
               <a:t>Third level</a:t>
             </a:r>
+            <a:endParaRPr lang="en-US"/>
           </a:p>
           <a:p>
             <a:pPr lvl="3"/>
@@ -2098,6 +2060,7 @@
               <a:rPr lang="en-US"/>
               <a:t>Fourth level</a:t>
             </a:r>
+            <a:endParaRPr lang="en-US"/>
           </a:p>
           <a:p>
             <a:pPr lvl="4"/>
@@ -2105,6 +2068,7 @@
               <a:rPr lang="en-US"/>
               <a:t>Fifth level</a:t>
             </a:r>
+            <a:endParaRPr lang="en-US"/>
           </a:p>
         </p:txBody>
       </p:sp>
@@ -2170,6 +2134,7 @@
               <a:rPr lang="en-US"/>
               <a:t>Click to edit Master text styles</a:t>
             </a:r>
+            <a:endParaRPr lang="en-US"/>
           </a:p>
         </p:txBody>
       </p:sp>
@@ -2198,6 +2163,7 @@
               <a:rPr lang="en-US"/>
               <a:t>Click to edit Master text styles</a:t>
             </a:r>
+            <a:endParaRPr lang="en-US"/>
           </a:p>
           <a:p>
             <a:pPr lvl="1"/>
@@ -2205,6 +2171,7 @@
               <a:rPr lang="en-US"/>
               <a:t>Second level</a:t>
             </a:r>
+            <a:endParaRPr lang="en-US"/>
           </a:p>
           <a:p>
             <a:pPr lvl="2"/>
@@ -2212,6 +2179,7 @@
               <a:rPr lang="en-US"/>
               <a:t>Third level</a:t>
             </a:r>
+            <a:endParaRPr lang="en-US"/>
           </a:p>
           <a:p>
             <a:pPr lvl="3"/>
@@ -2219,6 +2187,7 @@
               <a:rPr lang="en-US"/>
               <a:t>Fourth level</a:t>
             </a:r>
+            <a:endParaRPr lang="en-US"/>
           </a:p>
           <a:p>
             <a:pPr lvl="4"/>
@@ -2226,6 +2195,7 @@
               <a:rPr lang="en-US"/>
               <a:t>Fifth level</a:t>
             </a:r>
+            <a:endParaRPr lang="en-US"/>
           </a:p>
         </p:txBody>
       </p:sp>
@@ -2246,7 +2216,6 @@
           <a:p>
             <a:fld id="{63A1C593-65D0-4073-BCC9-577B9352EA97}" type="datetimeFigureOut">
               <a:rPr lang="en-US" smtClean="0"/>
-              <a:t>11/21/2025</a:t>
             </a:fld>
             <a:endParaRPr lang="en-US"/>
           </a:p>
@@ -2288,7 +2257,6 @@
           <a:p>
             <a:fld id="{9B618960-8005-486C-9A75-10CB2AAC16F9}" type="slidenum">
               <a:rPr lang="en-US" smtClean="0"/>
-              <a:t>‹#›</a:t>
             </a:fld>
             <a:endParaRPr lang="en-US"/>
           </a:p>
@@ -2338,6 +2306,7 @@
               <a:rPr lang="en-US"/>
               <a:t>Click to edit Master title style</a:t>
             </a:r>
+            <a:endParaRPr lang="en-US"/>
           </a:p>
         </p:txBody>
       </p:sp>
@@ -2358,7 +2327,6 @@
           <a:p>
             <a:fld id="{63A1C593-65D0-4073-BCC9-577B9352EA97}" type="datetimeFigureOut">
               <a:rPr lang="en-US" smtClean="0"/>
-              <a:t>11/21/2025</a:t>
             </a:fld>
             <a:endParaRPr lang="en-US"/>
           </a:p>
@@ -2400,7 +2368,6 @@
           <a:p>
             <a:fld id="{9B618960-8005-486C-9A75-10CB2AAC16F9}" type="slidenum">
               <a:rPr lang="en-US" smtClean="0"/>
-              <a:t>‹#›</a:t>
             </a:fld>
             <a:endParaRPr lang="en-US"/>
           </a:p>
@@ -2448,7 +2415,6 @@
           <a:p>
             <a:fld id="{63A1C593-65D0-4073-BCC9-577B9352EA97}" type="datetimeFigureOut">
               <a:rPr lang="en-US" smtClean="0"/>
-              <a:t>11/21/2025</a:t>
             </a:fld>
             <a:endParaRPr lang="en-US"/>
           </a:p>
@@ -2490,7 +2456,6 @@
           <a:p>
             <a:fld id="{9B618960-8005-486C-9A75-10CB2AAC16F9}" type="slidenum">
               <a:rPr lang="en-US" smtClean="0"/>
-              <a:t>‹#›</a:t>
             </a:fld>
             <a:endParaRPr lang="en-US"/>
           </a:p>
@@ -2549,6 +2514,7 @@
               <a:rPr lang="en-US"/>
               <a:t>Click to edit Master title style</a:t>
             </a:r>
+            <a:endParaRPr lang="en-US"/>
           </a:p>
         </p:txBody>
       </p:sp>
@@ -2605,6 +2571,7 @@
               <a:rPr lang="en-US"/>
               <a:t>Click to edit Master text styles</a:t>
             </a:r>
+            <a:endParaRPr lang="en-US"/>
           </a:p>
           <a:p>
             <a:pPr lvl="1"/>
@@ -2612,6 +2579,7 @@
               <a:rPr lang="en-US"/>
               <a:t>Second level</a:t>
             </a:r>
+            <a:endParaRPr lang="en-US"/>
           </a:p>
           <a:p>
             <a:pPr lvl="2"/>
@@ -2619,6 +2587,7 @@
               <a:rPr lang="en-US"/>
               <a:t>Third level</a:t>
             </a:r>
+            <a:endParaRPr lang="en-US"/>
           </a:p>
           <a:p>
             <a:pPr lvl="3"/>
@@ -2626,6 +2595,7 @@
               <a:rPr lang="en-US"/>
               <a:t>Fourth level</a:t>
             </a:r>
+            <a:endParaRPr lang="en-US"/>
           </a:p>
           <a:p>
             <a:pPr lvl="4"/>
@@ -2633,6 +2603,7 @@
               <a:rPr lang="en-US"/>
               <a:t>Fifth level</a:t>
             </a:r>
+            <a:endParaRPr lang="en-US"/>
           </a:p>
         </p:txBody>
       </p:sp>
@@ -2698,6 +2669,7 @@
               <a:rPr lang="en-US"/>
               <a:t>Click to edit Master text styles</a:t>
             </a:r>
+            <a:endParaRPr lang="en-US"/>
           </a:p>
         </p:txBody>
       </p:sp>
@@ -2718,7 +2690,6 @@
           <a:p>
             <a:fld id="{63A1C593-65D0-4073-BCC9-577B9352EA97}" type="datetimeFigureOut">
               <a:rPr lang="en-US" smtClean="0"/>
-              <a:t>11/21/2025</a:t>
             </a:fld>
             <a:endParaRPr lang="en-US"/>
           </a:p>
@@ -2760,7 +2731,6 @@
           <a:p>
             <a:fld id="{9B618960-8005-486C-9A75-10CB2AAC16F9}" type="slidenum">
               <a:rPr lang="en-US" smtClean="0"/>
-              <a:t>‹#›</a:t>
             </a:fld>
             <a:endParaRPr lang="en-US"/>
           </a:p>
@@ -2819,6 +2789,7 @@
               <a:rPr lang="en-US"/>
               <a:t>Click to edit Master title style</a:t>
             </a:r>
+            <a:endParaRPr lang="en-US"/>
           </a:p>
         </p:txBody>
       </p:sp>
@@ -2945,6 +2916,7 @@
               <a:rPr lang="en-US"/>
               <a:t>Click to edit Master text styles</a:t>
             </a:r>
+            <a:endParaRPr lang="en-US"/>
           </a:p>
         </p:txBody>
       </p:sp>
@@ -2965,7 +2937,6 @@
           <a:p>
             <a:fld id="{63A1C593-65D0-4073-BCC9-577B9352EA97}" type="datetimeFigureOut">
               <a:rPr lang="en-US" smtClean="0"/>
-              <a:t>11/21/2025</a:t>
             </a:fld>
             <a:endParaRPr lang="en-US"/>
           </a:p>
@@ -3007,7 +2978,6 @@
           <a:p>
             <a:fld id="{9B618960-8005-486C-9A75-10CB2AAC16F9}" type="slidenum">
               <a:rPr lang="en-US" smtClean="0"/>
-              <a:t>‹#›</a:t>
             </a:fld>
             <a:endParaRPr lang="en-US"/>
           </a:p>
@@ -3072,6 +3042,7 @@
               <a:rPr lang="en-US"/>
               <a:t>Click to edit Master title style</a:t>
             </a:r>
+            <a:endParaRPr lang="en-US"/>
           </a:p>
         </p:txBody>
       </p:sp>
@@ -3105,6 +3076,7 @@
               <a:rPr lang="en-US"/>
               <a:t>Click to edit Master text styles</a:t>
             </a:r>
+            <a:endParaRPr lang="en-US"/>
           </a:p>
           <a:p>
             <a:pPr lvl="1"/>
@@ -3112,6 +3084,7 @@
               <a:rPr lang="en-US"/>
               <a:t>Second level</a:t>
             </a:r>
+            <a:endParaRPr lang="en-US"/>
           </a:p>
           <a:p>
             <a:pPr lvl="2"/>
@@ -3119,6 +3092,7 @@
               <a:rPr lang="en-US"/>
               <a:t>Third level</a:t>
             </a:r>
+            <a:endParaRPr lang="en-US"/>
           </a:p>
           <a:p>
             <a:pPr lvl="3"/>
@@ -3126,6 +3100,7 @@
               <a:rPr lang="en-US"/>
               <a:t>Fourth level</a:t>
             </a:r>
+            <a:endParaRPr lang="en-US"/>
           </a:p>
           <a:p>
             <a:pPr lvl="4"/>
@@ -3133,6 +3108,7 @@
               <a:rPr lang="en-US"/>
               <a:t>Fifth level</a:t>
             </a:r>
+            <a:endParaRPr lang="en-US"/>
           </a:p>
         </p:txBody>
       </p:sp>
@@ -3171,7 +3147,6 @@
           <a:p>
             <a:fld id="{63A1C593-65D0-4073-BCC9-577B9352EA97}" type="datetimeFigureOut">
               <a:rPr lang="en-US" smtClean="0"/>
-              <a:t>11/21/2025</a:t>
             </a:fld>
             <a:endParaRPr lang="en-US"/>
           </a:p>
@@ -3249,7 +3224,6 @@
           <a:p>
             <a:fld id="{9B618960-8005-486C-9A75-10CB2AAC16F9}" type="slidenum">
               <a:rPr lang="en-US" smtClean="0"/>
-              <a:t>‹#›</a:t>
             </a:fld>
             <a:endParaRPr lang="en-US"/>
           </a:p>
@@ -3590,6 +3564,7 @@
               <a:rPr lang="en-US" altLang="en-US" dirty="0"/>
               <a:t>CSR APP Instruction</a:t>
             </a:r>
+            <a:endParaRPr lang="en-US" altLang="en-US" dirty="0"/>
           </a:p>
         </p:txBody>
       </p:sp>
@@ -3612,6 +3587,7 @@
               <a:rPr lang="en-US"/>
               <a:t>Sept 2025</a:t>
             </a:r>
+            <a:endParaRPr lang="en-US"/>
           </a:p>
         </p:txBody>
       </p:sp>
@@ -3656,10 +3632,8 @@
           <a:lstStyle/>
           <a:p>
             <a:r>
-              <a:rPr lang="en-US">
-                <a:sym typeface="+mn-ea"/>
-              </a:rPr>
-              <a:t>Step 3 -- Configure setting</a:t>
+              <a:rPr lang="en-US"/>
+              <a:t>Step 2 -- Load data</a:t>
             </a:r>
             <a:endParaRPr lang="en-US"/>
           </a:p>
@@ -3675,79 +3649,109 @@
             <p:ph idx="1"/>
           </p:nvPr>
         </p:nvSpPr>
+        <p:spPr/>
+        <p:txBody>
+          <a:bodyPr/>
+          <a:lstStyle/>
+          <a:p>
+            <a:r>
+              <a:rPr lang="en-US" altLang="en-US"/>
+              <a:t>Navigate to the</a:t>
+            </a:r>
+            <a:r>
+              <a:rPr lang="en-US"/>
+              <a:t> </a:t>
+            </a:r>
+            <a:r>
+              <a:rPr lang="en-US" b="1"/>
+              <a:t>CSR Integration</a:t>
+            </a:r>
+            <a:r>
+              <a:rPr lang="en-US"/>
+              <a:t> tab --&gt; Click on </a:t>
+            </a:r>
+            <a:r>
+              <a:rPr lang="en-US" b="1"/>
+              <a:t>Select Data File</a:t>
+            </a:r>
+            <a:r>
+              <a:rPr lang="en-US"/>
+              <a:t> --&gt; Choose the </a:t>
+            </a:r>
+            <a:r>
+              <a:rPr lang="en-US" b="1"/>
+              <a:t>.xlsx</a:t>
+            </a:r>
+            <a:r>
+              <a:rPr lang="en-US"/>
+              <a:t> file containing experimental data</a:t>
+            </a:r>
+            <a:endParaRPr lang="en-US"/>
+          </a:p>
+          <a:p>
+            <a:r>
+              <a:rPr lang="en-US"/>
+              <a:t>The .xlsx file must follow the following format:</a:t>
+            </a:r>
+            <a:endParaRPr lang="en-US"/>
+          </a:p>
+          <a:p>
+            <a:pPr lvl="1"/>
+            <a:r>
+              <a:rPr lang="en-US" altLang="en-US"/>
+              <a:t>The first row specifies the names of all factors and results</a:t>
+            </a:r>
+            <a:r>
+              <a:rPr lang="en-US"/>
+              <a:t> </a:t>
+            </a:r>
+            <a:endParaRPr lang="en-US"/>
+          </a:p>
+          <a:p>
+            <a:pPr lvl="1"/>
+            <a:r>
+              <a:rPr lang="en-US"/>
+              <a:t>S</a:t>
+            </a:r>
+            <a:r>
+              <a:rPr lang="en-US" altLang="en-US"/>
+              <a:t>ubsequent rows contain the corresponding data entries.</a:t>
+            </a:r>
+            <a:endParaRPr lang="en-US" altLang="en-US"/>
+          </a:p>
+          <a:p>
+            <a:r>
+              <a:rPr lang="en-US"/>
+              <a:t>Example:</a:t>
+            </a:r>
+            <a:endParaRPr lang="en-US"/>
+          </a:p>
+        </p:txBody>
+      </p:sp>
+      <p:pic>
+        <p:nvPicPr>
+          <p:cNvPr id="5" name="Picture 4"/>
+          <p:cNvPicPr>
+            <a:picLocks noChangeAspect="1"/>
+          </p:cNvPicPr>
+          <p:nvPr/>
+        </p:nvPicPr>
+        <p:blipFill>
+          <a:blip r:embed="rId1"/>
+          <a:stretch>
+            <a:fillRect/>
+          </a:stretch>
+        </p:blipFill>
         <p:spPr>
           <a:xfrm>
-            <a:off x="521970" y="1825625"/>
-            <a:ext cx="11012805" cy="4351655"/>
+            <a:off x="4078605" y="4362450"/>
+            <a:ext cx="4827270" cy="2156460"/>
           </a:xfrm>
+          <a:prstGeom prst="rect">
+            <a:avLst/>
+          </a:prstGeom>
         </p:spPr>
-        <p:txBody>
-          <a:bodyPr>
-            <a:noAutofit/>
-          </a:bodyPr>
-          <a:lstStyle/>
-          <a:p>
-            <a:r>
-              <a:rPr lang="en-US" b="1"/>
-              <a:t>Global Optimum</a:t>
-            </a:r>
-            <a:r>
-              <a:rPr lang="en-US"/>
-              <a:t>: Select between Maximum, Minimum, Maximum absolute value and </a:t>
-            </a:r>
-            <a:r>
-              <a:rPr lang="en-US">
-                <a:sym typeface="+mn-ea"/>
-              </a:rPr>
-              <a:t>Minimum absolute value </a:t>
-            </a:r>
-          </a:p>
-          <a:p>
-            <a:r>
-              <a:rPr lang="en-US" b="1">
-                <a:sym typeface="+mn-ea"/>
-              </a:rPr>
-              <a:t>Normalization</a:t>
-            </a:r>
-            <a:r>
-              <a:rPr lang="en-US">
-                <a:sym typeface="+mn-ea"/>
-              </a:rPr>
-              <a:t>: Select between [-1, 1] and  [0, 1]</a:t>
-            </a:r>
-          </a:p>
-          <a:p>
-            <a:r>
-              <a:rPr lang="en-US" altLang="zh-CN">
-                <a:sym typeface="+mn-ea"/>
-              </a:rPr>
-              <a:t>Under </a:t>
-            </a:r>
-            <a:r>
-              <a:rPr lang="en-US" altLang="zh-CN" b="1">
-                <a:sym typeface="+mn-ea"/>
-              </a:rPr>
-              <a:t>Parameter or Outcome?</a:t>
-            </a:r>
-            <a:r>
-              <a:rPr lang="en-US" altLang="zh-CN">
-                <a:sym typeface="+mn-ea"/>
-              </a:rPr>
-              <a:t>, select if the parameter belongs to parameter, outcome, or ignore. If more than one parameters are chosen, then multiple objective optimization is activated.</a:t>
-            </a:r>
-          </a:p>
-          <a:p>
-            <a:endParaRPr lang="en-US">
-              <a:sym typeface="+mn-ea"/>
-            </a:endParaRPr>
-          </a:p>
-          <a:p>
-            <a:endParaRPr lang="en-US" b="1">
-              <a:sym typeface="+mn-ea"/>
-            </a:endParaRPr>
-          </a:p>
-        </p:txBody>
-      </p:sp>
+      </p:pic>
     </p:spTree>
   </p:cSld>
   <p:clrMapOvr>
@@ -3812,7 +3816,7 @@
             </p:nvSpPr>
             <p:spPr>
               <a:xfrm>
-                <a:off x="521970" y="1825625"/>
+                <a:off x="521970" y="1870710"/>
                 <a:ext cx="11012805" cy="4351655"/>
               </a:xfrm>
             </p:spPr>
@@ -3821,6 +3825,59 @@
                 <a:noAutofit/>
               </a:bodyPr>
               <a:lstStyle/>
+              <a:p>
+                <a:r>
+                  <a:rPr lang="en-US" b="1"/>
+                  <a:t>Extremum Objective</a:t>
+                </a:r>
+                <a:r>
+                  <a:rPr lang="en-US"/>
+                  <a:t>: Select between Maximum, Minimum, Maximum absolute value and </a:t>
+                </a:r>
+                <a:r>
+                  <a:rPr lang="en-US">
+                    <a:sym typeface="+mn-ea"/>
+                  </a:rPr>
+                  <a:t>Minimum absolute value </a:t>
+                </a:r>
+                <a:endParaRPr lang="en-US">
+                  <a:sym typeface="+mn-ea"/>
+                </a:endParaRPr>
+              </a:p>
+              <a:p>
+                <a:r>
+                  <a:rPr lang="en-US" b="1">
+                    <a:sym typeface="+mn-ea"/>
+                  </a:rPr>
+                  <a:t>Normalization</a:t>
+                </a:r>
+                <a:r>
+                  <a:rPr lang="en-US">
+                    <a:sym typeface="+mn-ea"/>
+                  </a:rPr>
+                  <a:t>: Select between [-1, 1] and  [0, 1]</a:t>
+                </a:r>
+                <a:endParaRPr lang="en-US">
+                  <a:sym typeface="+mn-ea"/>
+                </a:endParaRPr>
+              </a:p>
+              <a:p>
+                <a:r>
+                  <a:rPr lang="en-US" b="1">
+                    <a:sym typeface="+mn-ea"/>
+                  </a:rPr>
+                  <a:t>Show results for all parameter combinations (N down to 1) </a:t>
+                </a:r>
+                <a:r>
+                  <a:rPr lang="en-US">
+                    <a:sym typeface="+mn-ea"/>
+                  </a:rPr>
+                  <a:t>should be checked if one is interested in seeing all possible combinations</a:t>
+                </a:r>
+                <a:endParaRPr lang="en-US">
+                  <a:sym typeface="+mn-ea"/>
+                </a:endParaRPr>
+              </a:p>
               <a:p>
                 <a:r>
                   <a:rPr lang="en-US" altLang="zh-CN">
@@ -3835,7 +3892,7 @@
                         <m:ctrlPr>
                           <a:rPr lang="en-US" altLang="zh-CN" i="1">
                             <a:latin typeface="Cambria Math" panose="02040503050406030204" pitchFamily="18" charset="0"/>
-                            <a:cs typeface="Cambria Math" panose="02040503050406030204" charset="0"/>
+                            <a:cs typeface="Cambria Math" panose="02040503050406030204" pitchFamily="18" charset="0"/>
                             <a:sym typeface="+mn-ea"/>
                           </a:rPr>
                         </m:ctrlPr>
@@ -3843,8 +3900,8 @@
                       <m:e>
                         <m:r>
                           <a:rPr lang="en-US" altLang="zh-CN" i="1">
-                            <a:latin typeface="Cambria Math" panose="02040503050406030204" charset="0"/>
-                            <a:cs typeface="Cambria Math" panose="02040503050406030204" charset="0"/>
+                            <a:latin typeface="Cambria Math" panose="02040503050406030204" pitchFamily="18" charset="0"/>
+                            <a:cs typeface="Cambria Math" panose="02040503050406030204" pitchFamily="18" charset="0"/>
                             <a:sym typeface="+mn-ea"/>
                           </a:rPr>
                           <m:t>𝐶</m:t>
@@ -3853,8 +3910,8 @@
                       <m:sub>
                         <m:r>
                           <a:rPr lang="en-US" altLang="zh-CN" i="1">
-                            <a:latin typeface="Cambria Math" panose="02040503050406030204" charset="0"/>
-                            <a:cs typeface="Cambria Math" panose="02040503050406030204" charset="0"/>
+                            <a:latin typeface="Cambria Math" panose="02040503050406030204" pitchFamily="18" charset="0"/>
+                            <a:cs typeface="Cambria Math" panose="02040503050406030204" pitchFamily="18" charset="0"/>
                             <a:sym typeface="+mn-ea"/>
                           </a:rPr>
                           <m:t>1</m:t>
@@ -3863,8 +3920,8 @@
                     </m:sSub>
                     <m:r>
                       <a:rPr lang="en-US" altLang="zh-CN" i="1">
-                        <a:latin typeface="Cambria Math" panose="02040503050406030204" charset="0"/>
-                        <a:cs typeface="Cambria Math" panose="02040503050406030204" charset="0"/>
+                        <a:latin typeface="Cambria Math" panose="02040503050406030204" pitchFamily="18" charset="0"/>
+                        <a:cs typeface="Cambria Math" panose="02040503050406030204" pitchFamily="18" charset="0"/>
                         <a:sym typeface="+mn-ea"/>
                       </a:rPr>
                       <m:t>+</m:t>
@@ -3874,7 +3931,7 @@
                         <m:ctrlPr>
                           <a:rPr lang="en-US" altLang="zh-CN" i="1">
                             <a:latin typeface="Cambria Math" panose="02040503050406030204" pitchFamily="18" charset="0"/>
-                            <a:cs typeface="Cambria Math" panose="02040503050406030204" charset="0"/>
+                            <a:cs typeface="Cambria Math" panose="02040503050406030204" pitchFamily="18" charset="0"/>
                             <a:sym typeface="+mn-ea"/>
                           </a:rPr>
                         </m:ctrlPr>
@@ -3882,8 +3939,8 @@
                       <m:e>
                         <m:r>
                           <a:rPr lang="en-US" altLang="zh-CN" i="1">
-                            <a:latin typeface="Cambria Math" panose="02040503050406030204" charset="0"/>
-                            <a:cs typeface="Cambria Math" panose="02040503050406030204" charset="0"/>
+                            <a:latin typeface="Cambria Math" panose="02040503050406030204" pitchFamily="18" charset="0"/>
+                            <a:cs typeface="Cambria Math" panose="02040503050406030204" pitchFamily="18" charset="0"/>
                             <a:sym typeface="+mn-ea"/>
                           </a:rPr>
                           <m:t>𝐶</m:t>
@@ -3892,8 +3949,8 @@
                       <m:sub>
                         <m:r>
                           <a:rPr lang="en-US" altLang="zh-CN" i="1">
-                            <a:latin typeface="Cambria Math" panose="02040503050406030204" charset="0"/>
-                            <a:cs typeface="Cambria Math" panose="02040503050406030204" charset="0"/>
+                            <a:latin typeface="Cambria Math" panose="02040503050406030204" pitchFamily="18" charset="0"/>
+                            <a:cs typeface="Cambria Math" panose="02040503050406030204" pitchFamily="18" charset="0"/>
                             <a:sym typeface="+mn-ea"/>
                           </a:rPr>
                           <m:t>2</m:t>
@@ -3902,8 +3959,8 @@
                     </m:sSub>
                     <m:r>
                       <a:rPr lang="en-US" altLang="zh-CN" i="1">
-                        <a:latin typeface="Cambria Math" panose="02040503050406030204" charset="0"/>
-                        <a:cs typeface="Cambria Math" panose="02040503050406030204" charset="0"/>
+                        <a:latin typeface="Cambria Math" panose="02040503050406030204" pitchFamily="18" charset="0"/>
+                        <a:cs typeface="Cambria Math" panose="02040503050406030204" pitchFamily="18" charset="0"/>
                         <a:sym typeface="+mn-ea"/>
                       </a:rPr>
                       <m:t>+</m:t>
@@ -3913,7 +3970,7 @@
                         <m:ctrlPr>
                           <a:rPr lang="en-US" altLang="zh-CN" i="1">
                             <a:latin typeface="Cambria Math" panose="02040503050406030204" pitchFamily="18" charset="0"/>
-                            <a:cs typeface="Cambria Math" panose="02040503050406030204" charset="0"/>
+                            <a:cs typeface="Cambria Math" panose="02040503050406030204" pitchFamily="18" charset="0"/>
                             <a:sym typeface="+mn-ea"/>
                           </a:rPr>
                         </m:ctrlPr>
@@ -3921,8 +3978,8 @@
                       <m:e>
                         <m:r>
                           <a:rPr lang="en-US" altLang="zh-CN" i="1">
-                            <a:latin typeface="Cambria Math" panose="02040503050406030204" charset="0"/>
-                            <a:cs typeface="Cambria Math" panose="02040503050406030204" charset="0"/>
+                            <a:latin typeface="Cambria Math" panose="02040503050406030204" pitchFamily="18" charset="0"/>
+                            <a:cs typeface="Cambria Math" panose="02040503050406030204" pitchFamily="18" charset="0"/>
                             <a:sym typeface="+mn-ea"/>
                           </a:rPr>
                           <m:t>𝐶</m:t>
@@ -3931,8 +3988,8 @@
                       <m:sub>
                         <m:r>
                           <a:rPr lang="en-US" altLang="zh-CN" i="1">
-                            <a:latin typeface="Cambria Math" panose="02040503050406030204" charset="0"/>
-                            <a:cs typeface="Cambria Math" panose="02040503050406030204" charset="0"/>
+                            <a:latin typeface="Cambria Math" panose="02040503050406030204" pitchFamily="18" charset="0"/>
+                            <a:cs typeface="Cambria Math" panose="02040503050406030204" pitchFamily="18" charset="0"/>
                             <a:sym typeface="+mn-ea"/>
                           </a:rPr>
                           <m:t>3</m:t>
@@ -3941,11 +3998,19 @@
                     </m:sSub>
                     <m:r>
                       <a:rPr lang="en-US" altLang="zh-CN" i="1">
-                        <a:latin typeface="Cambria Math" panose="02040503050406030204" charset="0"/>
-                        <a:cs typeface="Cambria Math" panose="02040503050406030204" charset="0"/>
+                        <a:latin typeface="Cambria Math" panose="02040503050406030204" pitchFamily="18" charset="0"/>
+                        <a:cs typeface="Cambria Math" panose="02040503050406030204" pitchFamily="18" charset="0"/>
                         <a:sym typeface="+mn-ea"/>
                       </a:rPr>
-                      <m:t>&lt;100</m:t>
+                      <m:t>=</m:t>
+                    </m:r>
+                    <m:r>
+                      <a:rPr lang="en-US" altLang="zh-CN" i="1">
+                        <a:latin typeface="Cambria Math" panose="02040503050406030204" pitchFamily="18" charset="0"/>
+                        <a:cs typeface="Cambria Math" panose="02040503050406030204" pitchFamily="18" charset="0"/>
+                        <a:sym typeface="+mn-ea"/>
+                      </a:rPr>
+                      <m:t>100</m:t>
                     </m:r>
                   </m:oMath>
                 </a14:m>
@@ -4009,29 +4074,27 @@
                   </a:rPr>
                   <a:t>Clear all</a:t>
                 </a:r>
-                <a:endParaRPr lang="en-US" altLang="zh-CN">
+                <a:endParaRPr lang="en-US">
                   <a:sym typeface="+mn-ea"/>
                 </a:endParaRPr>
               </a:p>
               <a:p>
-                <a:r>
-                  <a:rPr lang="en-US" altLang="zh-CN">
-                    <a:sym typeface="+mn-ea"/>
-                  </a:rPr>
-                  <a:t>After all is set, click on </a:t>
-                </a:r>
-                <a:r>
-                  <a:rPr lang="en-US" altLang="zh-CN" b="1">
-                    <a:sym typeface="+mn-ea"/>
-                  </a:rPr>
-                  <a:t>Run Fitting Process</a:t>
-                </a:r>
                 <a:endParaRPr lang="en-US" altLang="zh-CN">
                   <a:sym typeface="+mn-ea"/>
                 </a:endParaRPr>
               </a:p>
               <a:p>
                 <a:endParaRPr lang="en-US" altLang="zh-CN">
+                  <a:sym typeface="+mn-ea"/>
+                </a:endParaRPr>
+              </a:p>
+              <a:p>
+                <a:endParaRPr lang="en-US">
+                  <a:sym typeface="+mn-ea"/>
+                </a:endParaRPr>
+              </a:p>
+              <a:p>
+                <a:endParaRPr lang="en-US" b="1">
                   <a:sym typeface="+mn-ea"/>
                 </a:endParaRPr>
               </a:p>
@@ -4043,7 +4106,7 @@
             <p:nvSpPr>
               <p:cNvPr id="3" name="Content Placeholder 2"/>
               <p:cNvSpPr>
-                <a:spLocks noGrp="1" noRot="1" noChangeAspect="1" noMove="1" noResize="1" noEditPoints="1" noAdjustHandles="1" noChangeArrowheads="1" noChangeShapeType="1" noTextEdit="1"/>
+                <a:spLocks noRot="1" noChangeAspect="1" noMove="1" noResize="1" noEditPoints="1" noAdjustHandles="1" noChangeArrowheads="1" noChangeShapeType="1" noTextEdit="1"/>
               </p:cNvSpPr>
               <p:nvPr>
                 <p:ph idx="1"/>
@@ -4051,13 +4114,13 @@
             </p:nvSpPr>
             <p:spPr>
               <a:xfrm>
-                <a:off x="521970" y="1825625"/>
+                <a:off x="521970" y="1870710"/>
                 <a:ext cx="11012805" cy="4351655"/>
               </a:xfrm>
-              <a:blipFill>
-                <a:blip r:embed="rId2"/>
+              <a:blipFill rotWithShape="1">
+                <a:blip r:embed="rId1"/>
                 <a:stretch>
-                  <a:fillRect l="-997" t="-2241" r="-664"/>
+                  <a:fillRect b="-44871"/>
                 </a:stretch>
               </a:blipFill>
             </p:spPr>
@@ -4066,7 +4129,7 @@
               <a:lstStyle/>
               <a:p>
                 <a:r>
-                  <a:rPr lang="en-US">
+                  <a:rPr lang="zh-CN" altLang="en-US">
                     <a:noFill/>
                   </a:rPr>
                   <a:t> </a:t>
@@ -4120,7 +4183,7 @@
               <a:rPr lang="en-US">
                 <a:sym typeface="+mn-ea"/>
               </a:rPr>
-              <a:t>Step 4 -- Output</a:t>
+              <a:t>Step 3 -- Configure setting</a:t>
             </a:r>
             <a:endParaRPr lang="en-US"/>
           </a:p>
@@ -4138,130 +4201,80 @@
         </p:nvSpPr>
         <p:spPr>
           <a:xfrm>
-            <a:off x="838200" y="1825625"/>
-            <a:ext cx="10515600" cy="4940935"/>
+            <a:off x="521970" y="1735455"/>
+            <a:ext cx="11012805" cy="4351655"/>
           </a:xfrm>
         </p:spPr>
         <p:txBody>
           <a:bodyPr>
-            <a:normAutofit lnSpcReduction="20000"/>
+            <a:noAutofit/>
           </a:bodyPr>
           <a:lstStyle/>
           <a:p>
-            <a:pPr fontAlgn="auto">
-              <a:lnSpc>
-                <a:spcPct val="90000"/>
-              </a:lnSpc>
-              <a:spcBef>
-                <a:spcPts val="1300"/>
-              </a:spcBef>
-            </a:pPr>
-            <a:r>
-              <a:rPr lang="en-US" altLang="en-US" b="1"/>
-              <a:t>CSR Equation </a:t>
-            </a:r>
-            <a:r>
-              <a:rPr lang="en-US" altLang="en-US"/>
-              <a:t>displays the numerical expression of the fitted equation.</a:t>
-            </a:r>
-          </a:p>
-          <a:p>
-            <a:pPr fontAlgn="auto">
-              <a:lnSpc>
-                <a:spcPct val="90000"/>
-              </a:lnSpc>
-              <a:spcBef>
-                <a:spcPts val="1300"/>
-              </a:spcBef>
-            </a:pPr>
-            <a:r>
-              <a:rPr lang="en-US" altLang="en-US" b="1"/>
-              <a:t>Parameter Definitions</a:t>
-            </a:r>
-            <a:r>
-              <a:rPr lang="en-US" altLang="en-US"/>
-              <a:t> list the names of the parameters used in the function.</a:t>
-            </a:r>
-          </a:p>
-          <a:p>
-            <a:pPr fontAlgn="auto">
-              <a:lnSpc>
-                <a:spcPct val="90000"/>
-              </a:lnSpc>
-              <a:spcBef>
-                <a:spcPts val="1300"/>
-              </a:spcBef>
-            </a:pPr>
-            <a:r>
-              <a:rPr lang="en-US" altLang="en-US" b="1"/>
-              <a:t>Extremum</a:t>
-            </a:r>
-            <a:r>
-              <a:rPr lang="en-US" altLang="en-US"/>
-              <a:t> indicates the maximum/minimum point of the plot. If multiple result columns are selected, then </a:t>
-            </a:r>
-            <a:r>
-              <a:rPr lang="en-US" altLang="en-US" b="1"/>
-              <a:t>Individual Results at Extremum</a:t>
-            </a:r>
-            <a:r>
-              <a:rPr lang="en-US" altLang="en-US"/>
-              <a:t> will be shown below</a:t>
-            </a:r>
-          </a:p>
-          <a:p>
-            <a:pPr fontAlgn="auto">
-              <a:lnSpc>
-                <a:spcPct val="90000"/>
-              </a:lnSpc>
-              <a:spcBef>
-                <a:spcPts val="1300"/>
-              </a:spcBef>
-            </a:pPr>
-            <a:r>
-              <a:rPr lang="en-US" altLang="en-US" b="1"/>
-              <a:t>Model Fit</a:t>
-            </a:r>
-            <a:r>
-              <a:rPr lang="en-US" altLang="en-US"/>
-              <a:t> provides the R-square and root mean square error (RMSE) value of the model</a:t>
-            </a:r>
-          </a:p>
-          <a:p>
-            <a:pPr fontAlgn="auto">
-              <a:lnSpc>
-                <a:spcPct val="90000"/>
-              </a:lnSpc>
-              <a:spcBef>
-                <a:spcPts val="1300"/>
-              </a:spcBef>
-            </a:pPr>
-            <a:r>
-              <a:rPr lang="en-US" altLang="en-US" b="1"/>
-              <a:t>Actual vs. Predicted Values</a:t>
-            </a:r>
-            <a:r>
-              <a:rPr lang="en-US" altLang="en-US"/>
-              <a:t> presents the deviations between predicted outcomes and observed data.</a:t>
-            </a:r>
-          </a:p>
-          <a:p>
-            <a:pPr fontAlgn="auto">
-              <a:lnSpc>
-                <a:spcPct val="90000"/>
-              </a:lnSpc>
-              <a:spcBef>
-                <a:spcPts val="1300"/>
-              </a:spcBef>
-            </a:pPr>
-            <a:r>
-              <a:rPr lang="en-US" altLang="en-US" b="1"/>
-              <a:t>CSR Response Surface Plot</a:t>
-            </a:r>
-            <a:r>
-              <a:rPr lang="en-US" altLang="en-US"/>
-              <a:t> provides a graphical representation of the fitted CSR function.</a:t>
-            </a:r>
+            <a:r>
+              <a:rPr lang="en-US" altLang="en-US">
+                <a:sym typeface="+mn-ea"/>
+              </a:rPr>
+              <a:t>Under </a:t>
+            </a:r>
+            <a:r>
+              <a:rPr lang="en-US" altLang="en-US" b="1">
+                <a:sym typeface="+mn-ea"/>
+              </a:rPr>
+              <a:t>Parameter or Outcome?</a:t>
+            </a:r>
+            <a:r>
+              <a:rPr lang="en-US" altLang="en-US">
+                <a:sym typeface="+mn-ea"/>
+              </a:rPr>
+              <a:t>, select if the parameter belongs to parameter, outcome, or ignore. If more than one outcomes are chosen, then multiple objective optimization is activated. outcome(+) denotes maximizing the outcome, </a:t>
+            </a:r>
+            <a:r>
+              <a:rPr lang="en-US" altLang="en-US">
+                <a:sym typeface="+mn-ea"/>
+              </a:rPr>
+              <a:t>outcome(-) denotes minimizing the outcome</a:t>
+            </a:r>
+            <a:endParaRPr lang="en-US" altLang="en-US">
+              <a:sym typeface="+mn-ea"/>
+            </a:endParaRPr>
+          </a:p>
+          <a:p>
+            <a:r>
+              <a:rPr lang="en-US" altLang="en-US">
+                <a:sym typeface="+mn-ea"/>
+              </a:rPr>
+              <a:t>After all is set, click on </a:t>
+            </a:r>
+            <a:r>
+              <a:rPr lang="en-US" altLang="en-US" b="1">
+                <a:sym typeface="+mn-ea"/>
+              </a:rPr>
+              <a:t>Run Fitting Process</a:t>
+            </a:r>
+            <a:endParaRPr lang="en-US" altLang="en-US" b="1">
+              <a:sym typeface="+mn-ea"/>
+            </a:endParaRPr>
+          </a:p>
+          <a:p>
+            <a:endParaRPr lang="en-US" altLang="en-US">
+              <a:sym typeface="+mn-ea"/>
+            </a:endParaRPr>
+          </a:p>
+          <a:p>
+            <a:endParaRPr lang="en-US" altLang="zh-CN">
+              <a:sym typeface="+mn-ea"/>
+            </a:endParaRPr>
+          </a:p>
+          <a:p>
+            <a:endParaRPr lang="en-US">
+              <a:sym typeface="+mn-ea"/>
+            </a:endParaRPr>
+          </a:p>
+          <a:p>
+            <a:endParaRPr lang="en-US" b="1">
+              <a:sym typeface="+mn-ea"/>
+            </a:endParaRPr>
           </a:p>
         </p:txBody>
       </p:sp>
@@ -4328,6 +4341,201 @@
         <p:spPr>
           <a:xfrm>
             <a:off x="838200" y="1825625"/>
+            <a:ext cx="10515600" cy="4940935"/>
+          </a:xfrm>
+        </p:spPr>
+        <p:txBody>
+          <a:bodyPr>
+            <a:normAutofit lnSpcReduction="20000"/>
+          </a:bodyPr>
+          <a:lstStyle/>
+          <a:p>
+            <a:pPr fontAlgn="auto">
+              <a:lnSpc>
+                <a:spcPct val="90000"/>
+              </a:lnSpc>
+              <a:spcBef>
+                <a:spcPts val="1300"/>
+              </a:spcBef>
+            </a:pPr>
+            <a:r>
+              <a:rPr lang="en-US" altLang="en-US" b="1"/>
+              <a:t>CSR Equation </a:t>
+            </a:r>
+            <a:r>
+              <a:rPr lang="en-US" altLang="en-US"/>
+              <a:t>displays the numerical expression of the fitted equation.</a:t>
+            </a:r>
+            <a:endParaRPr lang="en-US" altLang="en-US"/>
+          </a:p>
+          <a:p>
+            <a:pPr fontAlgn="auto">
+              <a:lnSpc>
+                <a:spcPct val="90000"/>
+              </a:lnSpc>
+              <a:spcBef>
+                <a:spcPts val="1300"/>
+              </a:spcBef>
+            </a:pPr>
+            <a:r>
+              <a:rPr lang="en-US" altLang="en-US" b="1"/>
+              <a:t>Parameter Definitions</a:t>
+            </a:r>
+            <a:r>
+              <a:rPr lang="en-US" altLang="en-US"/>
+              <a:t> list the names of the parameters used in the function.</a:t>
+            </a:r>
+            <a:endParaRPr lang="en-US" altLang="en-US"/>
+          </a:p>
+          <a:p>
+            <a:pPr fontAlgn="auto">
+              <a:lnSpc>
+                <a:spcPct val="90000"/>
+              </a:lnSpc>
+              <a:spcBef>
+                <a:spcPts val="1300"/>
+              </a:spcBef>
+            </a:pPr>
+            <a:r>
+              <a:rPr lang="en-US" altLang="en-US" b="1"/>
+              <a:t>Extremum</a:t>
+            </a:r>
+            <a:r>
+              <a:rPr lang="en-US" altLang="en-US"/>
+              <a:t> indicates the maximum/minimum point of the plot. If multiple result columns are selected, then </a:t>
+            </a:r>
+            <a:r>
+              <a:rPr lang="en-US" altLang="en-US" b="1"/>
+              <a:t>Individual Results at Extremum</a:t>
+            </a:r>
+            <a:r>
+              <a:rPr lang="en-US" altLang="en-US"/>
+              <a:t> will be shown below</a:t>
+            </a:r>
+            <a:endParaRPr lang="en-US" altLang="en-US"/>
+          </a:p>
+          <a:p>
+            <a:pPr fontAlgn="auto">
+              <a:lnSpc>
+                <a:spcPct val="90000"/>
+              </a:lnSpc>
+              <a:spcBef>
+                <a:spcPts val="1300"/>
+              </a:spcBef>
+            </a:pPr>
+            <a:r>
+              <a:rPr lang="en-US" altLang="en-US" b="1"/>
+              <a:t>Model Fit</a:t>
+            </a:r>
+            <a:r>
+              <a:rPr lang="en-US" altLang="en-US"/>
+              <a:t> provides the R-square and root mean square error (RMSE) value of the model</a:t>
+            </a:r>
+            <a:endParaRPr lang="en-US" altLang="en-US"/>
+          </a:p>
+          <a:p>
+            <a:pPr fontAlgn="auto">
+              <a:lnSpc>
+                <a:spcPct val="90000"/>
+              </a:lnSpc>
+              <a:spcBef>
+                <a:spcPts val="1300"/>
+              </a:spcBef>
+            </a:pPr>
+            <a:r>
+              <a:rPr lang="en-US" altLang="en-US" b="1"/>
+              <a:t>Actual vs. Predicted Values</a:t>
+            </a:r>
+            <a:r>
+              <a:rPr lang="en-US" altLang="en-US"/>
+              <a:t> presents the deviations between predicted outcomes and observed data.</a:t>
+            </a:r>
+            <a:endParaRPr lang="en-US" altLang="en-US"/>
+          </a:p>
+          <a:p>
+            <a:pPr fontAlgn="auto">
+              <a:lnSpc>
+                <a:spcPct val="90000"/>
+              </a:lnSpc>
+              <a:spcBef>
+                <a:spcPts val="1300"/>
+              </a:spcBef>
+            </a:pPr>
+            <a:r>
+              <a:rPr lang="en-US" altLang="en-US" b="1"/>
+              <a:t>CSR Response Surface Plot</a:t>
+            </a:r>
+            <a:r>
+              <a:rPr lang="en-US" altLang="en-US"/>
+              <a:t> provides a graphical representation of the fitted CSR function.</a:t>
+            </a:r>
+            <a:endParaRPr lang="en-US" altLang="en-US"/>
+          </a:p>
+        </p:txBody>
+      </p:sp>
+    </p:spTree>
+  </p:cSld>
+  <p:clrMapOvr>
+    <a:masterClrMapping/>
+  </p:clrMapOvr>
+</p:sld>
+</file>
+
+<file path=ppt/slides/slide14.xml><?xml version="1.0" encoding="utf-8"?>
+<p:sld xmlns:a="http://schemas.openxmlformats.org/drawingml/2006/main" xmlns:r="http://schemas.openxmlformats.org/officeDocument/2006/relationships" xmlns:p="http://schemas.openxmlformats.org/presentationml/2006/main">
+  <p:cSld>
+    <p:spTree>
+      <p:nvGrpSpPr>
+        <p:cNvPr id="1" name=""/>
+        <p:cNvGrpSpPr/>
+        <p:nvPr/>
+      </p:nvGrpSpPr>
+      <p:grpSpPr>
+        <a:xfrm>
+          <a:off x="0" y="0"/>
+          <a:ext cx="0" cy="0"/>
+          <a:chOff x="0" y="0"/>
+          <a:chExt cx="0" cy="0"/>
+        </a:xfrm>
+      </p:grpSpPr>
+      <p:sp>
+        <p:nvSpPr>
+          <p:cNvPr id="2" name="Title 1"/>
+          <p:cNvSpPr>
+            <a:spLocks noGrp="1"/>
+          </p:cNvSpPr>
+          <p:nvPr>
+            <p:ph type="title"/>
+          </p:nvPr>
+        </p:nvSpPr>
+        <p:spPr/>
+        <p:txBody>
+          <a:bodyPr/>
+          <a:lstStyle/>
+          <a:p>
+            <a:r>
+              <a:rPr lang="en-US">
+                <a:sym typeface="+mn-ea"/>
+              </a:rPr>
+              <a:t>Step 4 -- Output</a:t>
+            </a:r>
+            <a:endParaRPr lang="en-US"/>
+          </a:p>
+        </p:txBody>
+      </p:sp>
+      <p:sp>
+        <p:nvSpPr>
+          <p:cNvPr id="3" name="Content Placeholder 2"/>
+          <p:cNvSpPr>
+            <a:spLocks noGrp="1"/>
+          </p:cNvSpPr>
+          <p:nvPr>
+            <p:ph idx="1"/>
+          </p:nvPr>
+        </p:nvSpPr>
+        <p:spPr>
+          <a:xfrm>
+            <a:off x="838200" y="1825625"/>
             <a:ext cx="10124440" cy="4351655"/>
           </a:xfrm>
         </p:spPr>
@@ -4359,6 +4567,9 @@
               </a:rPr>
               <a:t> tab after fitting is complete</a:t>
             </a:r>
+            <a:endParaRPr lang="en-US">
+              <a:sym typeface="+mn-ea"/>
+            </a:endParaRPr>
           </a:p>
           <a:p>
             <a:r>
@@ -4379,6 +4590,9 @@
               </a:rPr>
               <a:t>select whether the coefficient shall be determined when the factors are at minimum, maximum or extremum</a:t>
             </a:r>
+            <a:endParaRPr lang="en-US">
+              <a:sym typeface="+mn-ea"/>
+            </a:endParaRPr>
           </a:p>
           <a:p>
             <a:r>
@@ -4433,6 +4647,7 @@
               <a:rPr lang="en-US"/>
               <a:t>) terms</a:t>
             </a:r>
+            <a:endParaRPr lang="en-US"/>
           </a:p>
         </p:txBody>
       </p:sp>
@@ -4480,6 +4695,7 @@
               <a:rPr lang="en-US"/>
               <a:t>Disclaimer</a:t>
             </a:r>
+            <a:endParaRPr lang="en-US"/>
           </a:p>
         </p:txBody>
       </p:sp>
@@ -4507,6 +4723,7 @@
               <a:rPr lang="en-US" altLang="zh-CN"/>
               <a:t>This software is provided free of charge for anyone to download and use. While every effort has been made to ensure its functionality and stability, the developers make no warranties or guarantees regarding the accuracy, reliability, or suitability of the results produced.</a:t>
             </a:r>
+            <a:endParaRPr lang="en-US" altLang="zh-CN"/>
           </a:p>
           <a:p>
             <a:pPr marL="0" indent="0">
@@ -4516,6 +4733,7 @@
               <a:rPr lang="en-US" altLang="zh-CN"/>
               <a:t>Users are solely responsible for how they interpret, apply, or rely upon any outputs generated by the software. The developers shall not be held liable for any errors, misinterpretations, losses, or consequences arising from its use.</a:t>
             </a:r>
+            <a:endParaRPr lang="en-US" altLang="zh-CN"/>
           </a:p>
           <a:p>
             <a:pPr marL="0" indent="0">
@@ -4525,6 +4743,7 @@
               <a:rPr lang="en-US" altLang="zh-CN"/>
               <a:t>Furthermore, the developers do not collect, store, or retain any user data. All computations and outputs remain entirely under the user’s control.</a:t>
             </a:r>
+            <a:endParaRPr lang="en-US" altLang="zh-CN"/>
           </a:p>
           <a:p>
             <a:pPr marL="0" indent="0">
@@ -4534,6 +4753,7 @@
               <a:rPr lang="en-US" altLang="zh-CN"/>
               <a:t>By downloading or using this software, the user acknowledges and agrees to these terms.</a:t>
             </a:r>
+            <a:endParaRPr lang="en-US" altLang="zh-CN"/>
           </a:p>
         </p:txBody>
       </p:sp>
@@ -4586,6 +4806,7 @@
               <a:rPr lang="en-US" altLang="zh-CN"/>
               <a:t>Terminology</a:t>
             </a:r>
+            <a:endParaRPr lang="en-US" altLang="zh-CN"/>
           </a:p>
         </p:txBody>
       </p:sp>
@@ -4618,6 +4839,7 @@
               <a:rPr lang="en-US" altLang="zh-CN" sz="6400" b="1"/>
               <a:t>1. CSR Equation (Complex Systems Response Equation)</a:t>
             </a:r>
+            <a:endParaRPr lang="en-US" altLang="zh-CN" sz="6400" b="1"/>
           </a:p>
           <a:p>
             <a:pPr marL="0" indent="0">
@@ -4627,6 +4849,7 @@
               <a:rPr lang="en-US" altLang="zh-CN" sz="6400"/>
               <a:t>A deterministic, second-order nonlinear equation that quantitatively maps how multiple interacting parameters lead to an emergent system property. It expresses the relationship between controllable parameters </a:t>
             </a:r>
+            <a:endParaRPr lang="en-US" altLang="zh-CN" sz="6400"/>
           </a:p>
           <a:p>
             <a:pPr marL="0" indent="0">
@@ -4636,6 +4859,7 @@
               <a:rPr lang="en-US" altLang="zh-CN" sz="6400" b="1"/>
               <a:t>2. CSR Response Surface</a:t>
             </a:r>
+            <a:endParaRPr lang="en-US" altLang="zh-CN" sz="6400" b="1"/>
           </a:p>
           <a:p>
             <a:pPr marL="0" indent="0">
@@ -4645,6 +4869,7 @@
               <a:rPr lang="en-US" altLang="zh-CN" sz="6400"/>
               <a:t>A multidimensional surface defined by the CSR equation that visualizes how the emergent property changes with varying parameters. It can take the form of an elliptic or hyperbolic paraboloid, typically featuring a single global optimum.</a:t>
             </a:r>
+            <a:endParaRPr lang="en-US" altLang="zh-CN" sz="6400"/>
           </a:p>
           <a:p>
             <a:pPr marL="0" indent="0">
@@ -4654,6 +4879,7 @@
               <a:rPr lang="en-US" altLang="zh-CN" sz="6400" b="1"/>
               <a:t>3. Parameters, parameter levels and parameter range</a:t>
             </a:r>
+            <a:endParaRPr lang="en-US" altLang="zh-CN" sz="6400" b="1"/>
           </a:p>
           <a:p>
             <a:pPr marL="0" indent="0">
@@ -4663,6 +4889,7 @@
               <a:rPr lang="en-US" altLang="zh-CN" sz="6400"/>
               <a:t>Parameters are the controllable factors in the complex system that are of interest to researchers. Parameter levels are the specific values of the parameters that researchers choose when investigating a complex system. Parameter range is defined by the minimum and maximum of the parameter levels.</a:t>
             </a:r>
+            <a:endParaRPr lang="en-US" altLang="zh-CN" sz="6400"/>
           </a:p>
           <a:p>
             <a:pPr marL="0" indent="0">
@@ -4704,6 +4931,7 @@
               <a:rPr lang="en-US" altLang="zh-CN" sz="6400" b="1"/>
               <a:t>)</a:t>
             </a:r>
+            <a:endParaRPr lang="en-US" altLang="zh-CN" sz="6400" b="1"/>
           </a:p>
           <a:p>
             <a:pPr marL="0" indent="0">
@@ -4713,6 +4941,7 @@
               <a:rPr lang="en-US" altLang="zh-CN" sz="6400"/>
               <a:t>Adaptive parameters in the CSR equation that represent system response characteristics. Unlike fixed regression coefficients, CSR coefficients depend on time and hidden variables, making them dynamic descriptors of system behavior.</a:t>
             </a:r>
+            <a:endParaRPr lang="en-US" altLang="zh-CN" sz="6400"/>
           </a:p>
           <a:p>
             <a:pPr marL="0" indent="0">
@@ -4736,6 +4965,9 @@
               </a:rPr>
               <a:t>Baseline response or intercept term, representing the system’s intrinsic state when all controllable parameters are zero</a:t>
             </a:r>
+            <a:endParaRPr lang="en-US" altLang="zh-CN" sz="6400">
+              <a:sym typeface="+mn-ea"/>
+            </a:endParaRPr>
           </a:p>
           <a:p>
             <a:pPr marL="0" indent="0">
@@ -4771,6 +5003,9 @@
               </a:rPr>
               <a:t>on the emergent property.</a:t>
             </a:r>
+            <a:endParaRPr lang="en-US" altLang="zh-CN" sz="6400">
+              <a:sym typeface="+mn-ea"/>
+            </a:endParaRPr>
           </a:p>
           <a:p>
             <a:pPr marL="0" indent="0">
@@ -4806,6 +5041,9 @@
               </a:rPr>
               <a:t>’s individual effect</a:t>
             </a:r>
+            <a:endParaRPr lang="en-US" altLang="zh-CN" sz="6400">
+              <a:sym typeface="+mn-ea"/>
+            </a:endParaRPr>
           </a:p>
           <a:p>
             <a:pPr marL="0" indent="0">
@@ -4992,6 +5230,9 @@
               </a:rPr>
               <a:t>The procedure of determining CSR coefficients by fitting experimental data to CSR equation.</a:t>
             </a:r>
+            <a:endParaRPr lang="en-US" altLang="zh-CN" sz="7200">
+              <a:sym typeface="+mn-ea"/>
+            </a:endParaRPr>
           </a:p>
           <a:p>
             <a:pPr marL="0" indent="0">
@@ -5003,6 +5244,9 @@
               </a:rPr>
               <a:t>7. Multiple objective optimization (MOO)</a:t>
             </a:r>
+            <a:endParaRPr lang="en-US" altLang="zh-CN" sz="7200" b="1">
+              <a:sym typeface="+mn-ea"/>
+            </a:endParaRPr>
           </a:p>
           <a:p>
             <a:pPr marL="0" indent="0">
@@ -5012,6 +5256,7 @@
               <a:rPr lang="en-US" altLang="zh-CN" sz="7200"/>
               <a:t>When there are more then one outcomes that need to be optimized, a more advanced fitting process, multiple objective optimization, is applied. This optimization process makes sure that each outcome to be optimized is considered and gives a balanced result where each outcome is as optimized as possible.</a:t>
             </a:r>
+            <a:endParaRPr lang="en-US" altLang="zh-CN" sz="7200"/>
           </a:p>
           <a:p>
             <a:pPr marL="0" indent="0">
@@ -5118,6 +5363,7 @@
               <a:rPr lang="en-US" sz="2400" b="1" dirty="0"/>
               <a:t>CSR Equation</a:t>
             </a:r>
+            <a:endParaRPr lang="en-US" sz="2400" b="1" dirty="0"/>
           </a:p>
           <a:p>
             <a:pPr algn="just">
@@ -5145,6 +5391,7 @@
               <a:rPr lang="en-US" sz="1600" dirty="0"/>
               <a:t> space for the optimal parameter-level  combination. </a:t>
             </a:r>
+            <a:endParaRPr lang="en-US" sz="1600" dirty="0"/>
           </a:p>
           <a:p>
             <a:pPr algn="just">
@@ -5159,6 +5406,7 @@
               <a:rPr lang="en-US" sz="1600" dirty="0"/>
               <a:t>With an artificial neural networks analysis of a set of test data, the input-output response was found to be a smooth surface. The complex system response (CSR) surface can be represented by the CSR equation. </a:t>
             </a:r>
+            <a:endParaRPr lang="en-US" sz="1600" dirty="0"/>
           </a:p>
           <a:p>
             <a:pPr algn="just">
@@ -5186,6 +5434,7 @@
               <a:rPr lang="en-US" sz="1600" dirty="0"/>
               <a:t>                                                                                                                                                                                                                  ……………… Equation (1)</a:t>
             </a:r>
+            <a:endParaRPr lang="en-US" sz="1600" dirty="0"/>
           </a:p>
           <a:p>
             <a:pPr algn="just">
@@ -5365,6 +5614,10 @@
               </a:rPr>
               <a:t> space. </a:t>
             </a:r>
+            <a:endParaRPr lang="en-US" altLang="zh-CN" sz="1600" kern="100" dirty="0">
+              <a:ea typeface="宋体" panose="02010600030101010101" pitchFamily="2" charset="-122"/>
+              <a:cs typeface="Calibri" panose="020F0502020204030204" charset="0"/>
+            </a:endParaRPr>
           </a:p>
         </p:txBody>
       </p:sp>
@@ -5413,6 +5666,7 @@
               <a:rPr lang="en-US"/>
               <a:t>Introduction to CSR Equation</a:t>
             </a:r>
+            <a:endParaRPr lang="en-US"/>
           </a:p>
         </p:txBody>
       </p:sp>
@@ -5425,7 +5679,7 @@
           <p:nvPr/>
         </p:nvPicPr>
         <p:blipFill>
-          <a:blip r:embed="rId3"/>
+          <a:blip r:embed="rId1"/>
           <a:stretch>
             <a:fillRect/>
           </a:stretch>
@@ -5528,6 +5782,7 @@
               <a:rPr lang="en-US" altLang="zh-CN" sz="2000"/>
               <a:t>+3P+2)/2] coefficients (Table 1).  	</a:t>
             </a:r>
+            <a:endParaRPr lang="en-US" altLang="zh-CN" sz="2000"/>
           </a:p>
           <a:p>
             <a:pPr marL="0" indent="0">
@@ -5553,6 +5808,7 @@
               <a:rPr lang="en-US" altLang="zh-CN" sz="2000"/>
               <a:t> space.  </a:t>
             </a:r>
+            <a:endParaRPr lang="en-US" altLang="zh-CN" sz="2000"/>
           </a:p>
         </p:txBody>
       </p:sp>
@@ -5575,27 +5831,9 @@
                 <a:tableStyleId>{5940675A-B579-460E-94D1-54222C63F5DA}</a:tableStyleId>
               </a:tblPr>
               <a:tblGrid>
-                <a:gridCol w="1803684">
-                  <a:extLst>
-                    <a:ext uri="{9D8B030D-6E8A-4147-A177-3AD203B41FA5}">
-                      <a16:colId xmlns:a16="http://schemas.microsoft.com/office/drawing/2014/main" val="20000"/>
-                    </a:ext>
-                  </a:extLst>
-                </a:gridCol>
-                <a:gridCol w="1803684">
-                  <a:extLst>
-                    <a:ext uri="{9D8B030D-6E8A-4147-A177-3AD203B41FA5}">
-                      <a16:colId xmlns:a16="http://schemas.microsoft.com/office/drawing/2014/main" val="20001"/>
-                    </a:ext>
-                  </a:extLst>
-                </a:gridCol>
-                <a:gridCol w="1803684">
-                  <a:extLst>
-                    <a:ext uri="{9D8B030D-6E8A-4147-A177-3AD203B41FA5}">
-                      <a16:colId xmlns:a16="http://schemas.microsoft.com/office/drawing/2014/main" val="20002"/>
-                    </a:ext>
-                  </a:extLst>
-                </a:gridCol>
+                <a:gridCol w="1803684"/>
+                <a:gridCol w="1803684"/>
+                <a:gridCol w="1803684"/>
               </a:tblGrid>
               <a:tr h="123829">
                 <a:tc>
@@ -5608,6 +5846,7 @@
                         <a:rPr lang="en-US" sz="1050" dirty="0"/>
                         <a:t>No. of Parameters</a:t>
                       </a:r>
+                      <a:endParaRPr lang="en-US" sz="1050" dirty="0"/>
                     </a:p>
                   </a:txBody>
                   <a:tcPr/>
@@ -5662,15 +5901,11 @@
                         <a:rPr lang="en-US" sz="1050" dirty="0"/>
                         <a:t> (M=10)</a:t>
                       </a:r>
+                      <a:endParaRPr lang="en-US" sz="1050" dirty="0"/>
                     </a:p>
                   </a:txBody>
                   <a:tcPr/>
                 </a:tc>
-                <a:extLst>
-                  <a:ext uri="{0D108BD9-81ED-4DB2-BD59-A6C34878D82A}">
-                    <a16:rowId xmlns:a16="http://schemas.microsoft.com/office/drawing/2014/main" val="10000"/>
-                  </a:ext>
-                </a:extLst>
               </a:tr>
               <a:tr h="123829">
                 <a:tc>
@@ -5683,6 +5918,7 @@
                         <a:rPr lang="en-US" sz="1050" dirty="0"/>
                         <a:t>1</a:t>
                       </a:r>
+                      <a:endParaRPr lang="en-US" sz="1050" dirty="0"/>
                     </a:p>
                   </a:txBody>
                   <a:tcPr/>
@@ -5697,6 +5933,7 @@
                         <a:rPr lang="en-US" sz="1050" dirty="0"/>
                         <a:t>3</a:t>
                       </a:r>
+                      <a:endParaRPr lang="en-US" sz="1050" dirty="0"/>
                     </a:p>
                   </a:txBody>
                   <a:tcPr/>
@@ -5711,15 +5948,11 @@
                         <a:rPr lang="en-US" sz="1050" dirty="0"/>
                         <a:t>10</a:t>
                       </a:r>
+                      <a:endParaRPr lang="en-US" sz="1050" dirty="0"/>
                     </a:p>
                   </a:txBody>
                   <a:tcPr/>
                 </a:tc>
-                <a:extLst>
-                  <a:ext uri="{0D108BD9-81ED-4DB2-BD59-A6C34878D82A}">
-                    <a16:rowId xmlns:a16="http://schemas.microsoft.com/office/drawing/2014/main" val="10001"/>
-                  </a:ext>
-                </a:extLst>
               </a:tr>
               <a:tr h="123829">
                 <a:tc>
@@ -5732,6 +5965,7 @@
                         <a:rPr lang="en-US" sz="1050" dirty="0"/>
                         <a:t>2</a:t>
                       </a:r>
+                      <a:endParaRPr lang="en-US" sz="1050" dirty="0"/>
                     </a:p>
                   </a:txBody>
                   <a:tcPr/>
@@ -5746,6 +5980,7 @@
                         <a:rPr lang="en-US" sz="1050" dirty="0"/>
                         <a:t>6</a:t>
                       </a:r>
+                      <a:endParaRPr lang="en-US" sz="1050" dirty="0"/>
                     </a:p>
                   </a:txBody>
                   <a:tcPr/>
@@ -5764,15 +5999,11 @@
                         <a:rPr lang="en-US" sz="1050" baseline="30000" dirty="0"/>
                         <a:t>2</a:t>
                       </a:r>
+                      <a:endParaRPr lang="en-US" sz="1050" baseline="30000" dirty="0"/>
                     </a:p>
                   </a:txBody>
                   <a:tcPr/>
                 </a:tc>
-                <a:extLst>
-                  <a:ext uri="{0D108BD9-81ED-4DB2-BD59-A6C34878D82A}">
-                    <a16:rowId xmlns:a16="http://schemas.microsoft.com/office/drawing/2014/main" val="10002"/>
-                  </a:ext>
-                </a:extLst>
               </a:tr>
               <a:tr h="123829">
                 <a:tc>
@@ -5785,6 +6016,7 @@
                         <a:rPr lang="en-US" sz="1050" dirty="0"/>
                         <a:t>3</a:t>
                       </a:r>
+                      <a:endParaRPr lang="en-US" sz="1050" dirty="0"/>
                     </a:p>
                   </a:txBody>
                   <a:tcPr/>
@@ -5799,6 +6031,7 @@
                         <a:rPr lang="en-US" sz="1050" dirty="0"/>
                         <a:t>10</a:t>
                       </a:r>
+                      <a:endParaRPr lang="en-US" sz="1050" dirty="0"/>
                     </a:p>
                   </a:txBody>
                   <a:tcPr/>
@@ -5817,15 +6050,11 @@
                         <a:rPr lang="en-US" sz="1050" baseline="30000" dirty="0"/>
                         <a:t>3</a:t>
                       </a:r>
+                      <a:endParaRPr lang="en-US" sz="1050" baseline="30000" dirty="0"/>
                     </a:p>
                   </a:txBody>
                   <a:tcPr/>
                 </a:tc>
-                <a:extLst>
-                  <a:ext uri="{0D108BD9-81ED-4DB2-BD59-A6C34878D82A}">
-                    <a16:rowId xmlns:a16="http://schemas.microsoft.com/office/drawing/2014/main" val="10003"/>
-                  </a:ext>
-                </a:extLst>
               </a:tr>
               <a:tr h="123829">
                 <a:tc>
@@ -5838,6 +6067,7 @@
                         <a:rPr lang="en-US" sz="1050" dirty="0"/>
                         <a:t>4</a:t>
                       </a:r>
+                      <a:endParaRPr lang="en-US" sz="1050" dirty="0"/>
                     </a:p>
                   </a:txBody>
                   <a:tcPr/>
@@ -5852,6 +6082,7 @@
                         <a:rPr lang="en-US" sz="1050" dirty="0"/>
                         <a:t>15</a:t>
                       </a:r>
+                      <a:endParaRPr lang="en-US" sz="1050" dirty="0"/>
                     </a:p>
                   </a:txBody>
                   <a:tcPr/>
@@ -5870,15 +6101,11 @@
                         <a:rPr lang="en-US" sz="1050" baseline="30000" dirty="0"/>
                         <a:t>4</a:t>
                       </a:r>
+                      <a:endParaRPr lang="en-US" sz="1050" baseline="30000" dirty="0"/>
                     </a:p>
                   </a:txBody>
                   <a:tcPr/>
                 </a:tc>
-                <a:extLst>
-                  <a:ext uri="{0D108BD9-81ED-4DB2-BD59-A6C34878D82A}">
-                    <a16:rowId xmlns:a16="http://schemas.microsoft.com/office/drawing/2014/main" val="10004"/>
-                  </a:ext>
-                </a:extLst>
               </a:tr>
               <a:tr h="123829">
                 <a:tc>
@@ -5891,6 +6118,7 @@
                         <a:rPr lang="en-US" sz="1050" dirty="0"/>
                         <a:t>5</a:t>
                       </a:r>
+                      <a:endParaRPr lang="en-US" sz="1050" dirty="0"/>
                     </a:p>
                   </a:txBody>
                   <a:tcPr/>
@@ -5905,6 +6133,7 @@
                         <a:rPr lang="en-US" sz="1050" dirty="0"/>
                         <a:t>21</a:t>
                       </a:r>
+                      <a:endParaRPr lang="en-US" sz="1050" dirty="0"/>
                     </a:p>
                   </a:txBody>
                   <a:tcPr/>
@@ -5923,15 +6152,11 @@
                         <a:rPr lang="en-US" sz="1050" baseline="30000" dirty="0"/>
                         <a:t>5</a:t>
                       </a:r>
+                      <a:endParaRPr lang="en-US" sz="1050" baseline="30000" dirty="0"/>
                     </a:p>
                   </a:txBody>
                   <a:tcPr/>
                 </a:tc>
-                <a:extLst>
-                  <a:ext uri="{0D108BD9-81ED-4DB2-BD59-A6C34878D82A}">
-                    <a16:rowId xmlns:a16="http://schemas.microsoft.com/office/drawing/2014/main" val="10005"/>
-                  </a:ext>
-                </a:extLst>
               </a:tr>
               <a:tr h="123829">
                 <a:tc>
@@ -5944,6 +6169,7 @@
                         <a:rPr lang="en-US" sz="1050" dirty="0"/>
                         <a:t>6</a:t>
                       </a:r>
+                      <a:endParaRPr lang="en-US" sz="1050" dirty="0"/>
                     </a:p>
                   </a:txBody>
                   <a:tcPr/>
@@ -5958,6 +6184,7 @@
                         <a:rPr lang="en-US" sz="1050" dirty="0"/>
                         <a:t>28</a:t>
                       </a:r>
+                      <a:endParaRPr lang="en-US" sz="1050" dirty="0"/>
                     </a:p>
                   </a:txBody>
                   <a:tcPr/>
@@ -5976,15 +6203,11 @@
                         <a:rPr lang="en-US" sz="1050" baseline="30000" dirty="0"/>
                         <a:t>6</a:t>
                       </a:r>
+                      <a:endParaRPr lang="en-US" sz="1050" baseline="30000" dirty="0"/>
                     </a:p>
                   </a:txBody>
                   <a:tcPr/>
                 </a:tc>
-                <a:extLst>
-                  <a:ext uri="{0D108BD9-81ED-4DB2-BD59-A6C34878D82A}">
-                    <a16:rowId xmlns:a16="http://schemas.microsoft.com/office/drawing/2014/main" val="10006"/>
-                  </a:ext>
-                </a:extLst>
               </a:tr>
               <a:tr h="123829">
                 <a:tc>
@@ -5997,6 +6220,7 @@
                         <a:rPr lang="en-US" sz="1050" dirty="0"/>
                         <a:t>12</a:t>
                       </a:r>
+                      <a:endParaRPr lang="en-US" sz="1050" dirty="0"/>
                     </a:p>
                   </a:txBody>
                   <a:tcPr/>
@@ -6011,6 +6235,7 @@
                         <a:rPr lang="en-US" sz="1050" dirty="0"/>
                         <a:t>91</a:t>
                       </a:r>
+                      <a:endParaRPr lang="en-US" sz="1050" dirty="0"/>
                     </a:p>
                   </a:txBody>
                   <a:tcPr/>
@@ -6029,15 +6254,11 @@
                         <a:rPr lang="en-US" sz="1050" baseline="30000" dirty="0"/>
                         <a:t>12</a:t>
                       </a:r>
+                      <a:endParaRPr lang="en-US" sz="1050" baseline="30000" dirty="0"/>
                     </a:p>
                   </a:txBody>
                   <a:tcPr/>
                 </a:tc>
-                <a:extLst>
-                  <a:ext uri="{0D108BD9-81ED-4DB2-BD59-A6C34878D82A}">
-                    <a16:rowId xmlns:a16="http://schemas.microsoft.com/office/drawing/2014/main" val="10007"/>
-                  </a:ext>
-                </a:extLst>
               </a:tr>
             </a:tbl>
           </a:graphicData>
@@ -6069,6 +6290,7 @@
               <a:rPr lang="en-US" dirty="0"/>
               <a:t>Table 1:   The number of tests  </a:t>
             </a:r>
+            <a:endParaRPr lang="en-US" dirty="0"/>
           </a:p>
         </p:txBody>
       </p:sp>
@@ -6116,6 +6338,7 @@
               <a:rPr lang="en-US"/>
               <a:t>Flow chart</a:t>
             </a:r>
+            <a:endParaRPr lang="en-US"/>
           </a:p>
         </p:txBody>
       </p:sp>
@@ -6159,6 +6382,7 @@
               <a:rPr lang="en-US" b="1"/>
               <a:t>Load data</a:t>
             </a:r>
+            <a:endParaRPr lang="en-US" b="1"/>
           </a:p>
         </p:txBody>
       </p:sp>
@@ -6256,6 +6480,7 @@
               <a:rPr lang="en-US" altLang="en-US" b="1"/>
               <a:t>Output</a:t>
             </a:r>
+            <a:endParaRPr lang="en-US" altLang="en-US" b="1"/>
           </a:p>
         </p:txBody>
       </p:sp>
@@ -6312,7 +6537,7 @@
         <p:spPr>
           <a:xfrm>
             <a:off x="2309495" y="3956050"/>
-            <a:ext cx="3035300" cy="829945"/>
+            <a:ext cx="3475990" cy="829945"/>
           </a:xfrm>
           <a:prstGeom prst="rect">
             <a:avLst/>
@@ -6335,6 +6560,9 @@
               </a:rPr>
               <a:t>Extremum Objective</a:t>
             </a:r>
+            <a:endParaRPr lang="en-US" sz="1600" b="1">
+              <a:sym typeface="+mn-ea"/>
+            </a:endParaRPr>
           </a:p>
           <a:p>
             <a:pPr marL="285750" indent="-285750">
@@ -6347,6 +6575,9 @@
               </a:rPr>
               <a:t>Normalization</a:t>
             </a:r>
+            <a:endParaRPr lang="en-US" sz="1600" b="1">
+              <a:sym typeface="+mn-ea"/>
+            </a:endParaRPr>
           </a:p>
           <a:p>
             <a:pPr marL="285750" indent="-285750">
@@ -6357,8 +6588,11 @@
               <a:rPr lang="en-US" sz="1600" b="1">
                 <a:sym typeface="+mn-ea"/>
               </a:rPr>
-              <a:t>Set parameter </a:t>
-            </a:r>
+              <a:t>Determine parameter or outcome </a:t>
+            </a:r>
+            <a:endParaRPr lang="en-US" sz="1600" b="1">
+              <a:sym typeface="+mn-ea"/>
+            </a:endParaRPr>
           </a:p>
         </p:txBody>
       </p:sp>
@@ -6408,6 +6642,9 @@
               </a:rPr>
               <a:t>Data processing</a:t>
             </a:r>
+            <a:endParaRPr lang="en-US" sz="1400" b="1">
+              <a:sym typeface="+mn-ea"/>
+            </a:endParaRPr>
           </a:p>
           <a:p>
             <a:pPr algn="ctr"/>
@@ -6415,6 +6652,7 @@
               <a:rPr lang="en-US" sz="1400" b="1"/>
               <a:t>based on CSR equation</a:t>
             </a:r>
+            <a:endParaRPr lang="en-US" sz="1400" b="1"/>
           </a:p>
         </p:txBody>
       </p:sp>
@@ -6545,6 +6783,9 @@
               </a:rPr>
               <a:t>CSR Response Surface Plot</a:t>
             </a:r>
+            <a:endParaRPr lang="en-US" altLang="en-US" sz="1600" b="1">
+              <a:sym typeface="+mn-ea"/>
+            </a:endParaRPr>
           </a:p>
           <a:p>
             <a:pPr marL="285750" indent="-285750">
@@ -6557,6 +6798,9 @@
               </a:rPr>
               <a:t>Extremum</a:t>
             </a:r>
+            <a:endParaRPr lang="en-US" altLang="en-US" sz="1600" b="1">
+              <a:sym typeface="+mn-ea"/>
+            </a:endParaRPr>
           </a:p>
           <a:p>
             <a:pPr marL="285750" indent="-285750">
@@ -6569,6 +6813,9 @@
               </a:rPr>
               <a:t>Actual vs. Predicted Values</a:t>
             </a:r>
+            <a:endParaRPr lang="en-US" altLang="en-US" sz="1600" b="1">
+              <a:sym typeface="+mn-ea"/>
+            </a:endParaRPr>
           </a:p>
           <a:p>
             <a:pPr marL="285750" indent="-285750">
@@ -6581,6 +6828,9 @@
               </a:rPr>
               <a:t>R-square, mean squared error</a:t>
             </a:r>
+            <a:endParaRPr lang="en-US" sz="1600" b="1">
+              <a:sym typeface="+mn-ea"/>
+            </a:endParaRPr>
           </a:p>
           <a:p>
             <a:pPr marL="285750" indent="-285750">
@@ -6677,14 +6927,7 @@
         <p:cNvGrpSpPr/>
         <p:nvPr/>
       </p:nvGrpSpPr>
-      <p:grpSpPr>
-        <a:xfrm>
-          <a:off x="0" y="0"/>
-          <a:ext cx="0" cy="0"/>
-          <a:chOff x="0" y="0"/>
-          <a:chExt cx="0" cy="0"/>
-        </a:xfrm>
-      </p:grpSpPr>
+      <p:grpSpPr/>
       <p:sp>
         <p:nvSpPr>
           <p:cNvPr id="2" name="标题 1"/>
@@ -6698,20 +6941,12 @@
         <p:spPr/>
         <p:txBody>
           <a:bodyPr/>
-          <a:lstStyle/>
-          <a:p>
-            <a:r>
-              <a:rPr lang="en-US" dirty="0">
-                <a:sym typeface="+mn-ea"/>
-              </a:rPr>
-              <a:t>Step 1  -- </a:t>
-            </a:r>
-            <a:r>
-              <a:rPr lang="en-US" altLang="zh-CN" dirty="0">
-                <a:ea typeface="宋体"/>
-              </a:rPr>
-              <a:t>OACD table generation</a:t>
-            </a:r>
+          <a:p>
+            <a:r>
+              <a:rPr lang="en-US" altLang="zh-CN"/>
+              <a:t>Downloading the CSR app</a:t>
+            </a:r>
+            <a:endParaRPr lang="en-US" altLang="zh-CN"/>
           </a:p>
         </p:txBody>
       </p:sp>
@@ -6725,286 +6960,89 @@
             <p:ph idx="1"/>
           </p:nvPr>
         </p:nvSpPr>
+        <p:spPr/>
+        <p:txBody>
+          <a:bodyPr/>
+          <a:p>
+            <a:r>
+              <a:rPr lang="en-US" altLang="zh-CN"/>
+              <a:t>Please fill out the </a:t>
+            </a:r>
+            <a:r>
+              <a:rPr lang="en-US" altLang="zh-CN">
+                <a:hlinkClick r:id="rId1" tooltip="" action="ppaction://hlinkfile"/>
+              </a:rPr>
+              <a:t>google form</a:t>
+            </a:r>
+            <a:endParaRPr lang="en-US" altLang="zh-CN">
+              <a:hlinkClick r:id="rId1" tooltip="" action="ppaction://hlinkfile"/>
+            </a:endParaRPr>
+          </a:p>
+          <a:p>
+            <a:endParaRPr lang="en-US" altLang="zh-CN"/>
+          </a:p>
+          <a:p>
+            <a:endParaRPr lang="en-US" altLang="zh-CN"/>
+          </a:p>
+          <a:p>
+            <a:r>
+              <a:rPr lang="en-US" altLang="zh-CN"/>
+              <a:t>Then, we’ll send you a copy of CSR.exe along with this slide containing detailed instructions for the software</a:t>
+            </a:r>
+            <a:endParaRPr lang="en-US" altLang="zh-CN"/>
+          </a:p>
+        </p:txBody>
+      </p:sp>
+      <p:pic>
+        <p:nvPicPr>
+          <p:cNvPr id="4" name="图片 3" descr="bJtUQx"/>
+          <p:cNvPicPr>
+            <a:picLocks noChangeAspect="1"/>
+          </p:cNvPicPr>
+          <p:nvPr/>
+        </p:nvPicPr>
+        <p:blipFill>
+          <a:blip r:embed="rId2"/>
+          <a:stretch>
+            <a:fillRect/>
+          </a:stretch>
+        </p:blipFill>
         <p:spPr>
           <a:xfrm>
-            <a:off x="838200" y="1825625"/>
-            <a:ext cx="10515600" cy="4836246"/>
+            <a:off x="8578215" y="365125"/>
+            <a:ext cx="2440940" cy="2440940"/>
           </a:xfrm>
+          <a:prstGeom prst="rect">
+            <a:avLst/>
+          </a:prstGeom>
         </p:spPr>
-        <p:txBody>
-          <a:bodyPr vert="horz" lIns="91440" tIns="45720" rIns="91440" bIns="45720" rtlCol="0" anchor="t">
-            <a:normAutofit fontScale="92500" lnSpcReduction="20000"/>
+      </p:pic>
+      <p:sp>
+        <p:nvSpPr>
+          <p:cNvPr id="5" name="文本框 4"/>
+          <p:cNvSpPr txBox="1"/>
+          <p:nvPr/>
+        </p:nvSpPr>
+        <p:spPr>
+          <a:xfrm>
+            <a:off x="8459470" y="2732405"/>
+            <a:ext cx="2839720" cy="368300"/>
+          </a:xfrm>
+          <a:prstGeom prst="rect">
+            <a:avLst/>
+          </a:prstGeom>
+          <a:noFill/>
+        </p:spPr>
+        <p:txBody>
+          <a:bodyPr wrap="square" rtlCol="0">
+            <a:spAutoFit/>
           </a:bodyPr>
-          <a:lstStyle/>
-          <a:p>
-            <a:pPr marL="0" indent="0">
-              <a:buNone/>
-            </a:pPr>
-            <a:r>
-              <a:rPr lang="zh-CN" altLang="en-US">
-                <a:ea typeface="宋体"/>
-                <a:cs typeface="Calibri"/>
-              </a:rPr>
-              <a:t>Use OACD generation to create correct runs for your experiment</a:t>
-            </a:r>
-          </a:p>
-          <a:p>
-            <a:pPr>
-              <a:buFont typeface="Arial"/>
-              <a:buChar char="•"/>
-            </a:pPr>
-            <a:r>
-              <a:rPr lang="en-US" altLang="zh-CN" dirty="0">
-                <a:ea typeface="宋体"/>
-                <a:cs typeface="Calibri"/>
-              </a:rPr>
-              <a:t>Navigate to the </a:t>
-            </a:r>
-            <a:r>
-              <a:rPr lang="en-US" altLang="zh-CN" b="1" dirty="0">
-                <a:ea typeface="宋体"/>
-                <a:cs typeface="Calibri"/>
-              </a:rPr>
-              <a:t>OACD Table Builder</a:t>
-            </a:r>
-            <a:r>
-              <a:rPr lang="en-US" altLang="zh-CN" dirty="0">
-                <a:ea typeface="宋体"/>
-                <a:cs typeface="Calibri"/>
-              </a:rPr>
-              <a:t> tab</a:t>
-            </a:r>
-          </a:p>
-          <a:p>
-            <a:pPr>
-              <a:buFont typeface="Arial"/>
-              <a:buChar char="•"/>
-            </a:pPr>
-            <a:r>
-              <a:rPr lang="en-US" altLang="zh-CN" dirty="0">
-                <a:ea typeface="宋体"/>
-                <a:cs typeface="Calibri"/>
-              </a:rPr>
-              <a:t>Select </a:t>
-            </a:r>
-            <a:r>
-              <a:rPr lang="en-US" altLang="zh-CN" b="1" dirty="0">
-                <a:ea typeface="宋体"/>
-                <a:cs typeface="Calibri"/>
-              </a:rPr>
-              <a:t>Number of Factors </a:t>
-            </a:r>
-            <a:r>
-              <a:rPr lang="en-US" altLang="zh-CN" dirty="0">
-                <a:ea typeface="宋体"/>
-                <a:cs typeface="Calibri"/>
-              </a:rPr>
-              <a:t>–</a:t>
-            </a:r>
-            <a:r>
-              <a:rPr lang="en-US" altLang="zh-CN" b="1" dirty="0">
-                <a:ea typeface="宋体"/>
-                <a:cs typeface="Calibri"/>
-              </a:rPr>
-              <a:t> </a:t>
-            </a:r>
-            <a:r>
-              <a:rPr lang="en-US" altLang="zh-CN" dirty="0">
-                <a:ea typeface="宋体"/>
-                <a:cs typeface="Calibri"/>
-              </a:rPr>
-              <a:t>number of variables in the system</a:t>
-            </a:r>
-          </a:p>
-          <a:p>
-            <a:pPr>
-              <a:buFont typeface="Arial"/>
-              <a:buChar char="•"/>
-            </a:pPr>
-            <a:r>
-              <a:rPr lang="en-US" altLang="zh-CN" dirty="0">
-                <a:ea typeface="宋体"/>
-                <a:cs typeface="Calibri"/>
-              </a:rPr>
-              <a:t>Select </a:t>
-            </a:r>
-            <a:r>
-              <a:rPr lang="en-US" altLang="zh-CN" b="1" dirty="0">
-                <a:ea typeface="宋体"/>
-                <a:cs typeface="Calibri"/>
-              </a:rPr>
-              <a:t>Table Size</a:t>
-            </a:r>
-            <a:r>
-              <a:rPr lang="en-US" altLang="zh-CN" dirty="0">
-                <a:ea typeface="宋体"/>
-                <a:cs typeface="Calibri"/>
-              </a:rPr>
-              <a:t> – this scales the number of runs in the experiment</a:t>
-            </a:r>
-          </a:p>
-          <a:p>
-            <a:pPr>
-              <a:buFont typeface="Arial"/>
-              <a:buChar char="•"/>
-            </a:pPr>
-            <a:r>
-              <a:rPr lang="en-US" dirty="0">
-                <a:ea typeface="Calibri"/>
-                <a:cs typeface="Calibri"/>
-              </a:rPr>
-              <a:t>Under </a:t>
-            </a:r>
-            <a:r>
-              <a:rPr lang="en-US" b="1" dirty="0">
-                <a:ea typeface="Calibri"/>
-                <a:cs typeface="Calibri"/>
-              </a:rPr>
-              <a:t>Factor Min/Max</a:t>
-            </a:r>
-            <a:r>
-              <a:rPr lang="en-US" dirty="0">
-                <a:ea typeface="Calibri"/>
-                <a:cs typeface="Calibri"/>
-              </a:rPr>
-              <a:t>,</a:t>
-            </a:r>
-            <a:r>
-              <a:rPr lang="en-US" b="1" dirty="0">
-                <a:ea typeface="Calibri"/>
-                <a:cs typeface="Calibri"/>
-              </a:rPr>
-              <a:t> </a:t>
-            </a:r>
-            <a:r>
-              <a:rPr lang="en-US" dirty="0">
-                <a:ea typeface="Calibri"/>
-                <a:cs typeface="Calibri"/>
-              </a:rPr>
-              <a:t>s</a:t>
-            </a:r>
-            <a:r>
-              <a:rPr lang="en-US" altLang="zh-CN" dirty="0">
-                <a:ea typeface="宋体"/>
-                <a:cs typeface="Calibri"/>
-              </a:rPr>
-              <a:t>et min and max values for each factor. Alternatively, you can import </a:t>
-            </a:r>
-            <a:r>
-              <a:rPr lang="en-US" altLang="zh-CN" dirty="0" err="1">
-                <a:ea typeface="宋体"/>
-                <a:cs typeface="Calibri"/>
-              </a:rPr>
-              <a:t>extrenum</a:t>
-            </a:r>
-            <a:r>
-              <a:rPr lang="en-US" altLang="zh-CN" dirty="0">
-                <a:ea typeface="宋体"/>
-                <a:cs typeface="Calibri"/>
-              </a:rPr>
-              <a:t> from a .xlsx file.</a:t>
-            </a:r>
-            <a:endParaRPr lang="en-US" altLang="zh-CN" b="1" dirty="0">
-              <a:ea typeface="宋体"/>
-              <a:cs typeface="Calibri"/>
-            </a:endParaRPr>
-          </a:p>
-          <a:p>
-            <a:pPr>
-              <a:buFont typeface="Arial"/>
-              <a:buChar char="•"/>
-            </a:pPr>
-            <a:r>
-              <a:rPr lang="en-US" altLang="zh-CN" dirty="0">
-                <a:ea typeface="宋体"/>
-                <a:cs typeface="Calibri"/>
-              </a:rPr>
-              <a:t>If you only need a certain amount of factors to be non-zero, you can remove all experiments with more using </a:t>
-            </a:r>
-            <a:r>
-              <a:rPr lang="en-US" altLang="zh-CN" b="1" dirty="0">
-                <a:ea typeface="宋体"/>
-                <a:cs typeface="Calibri"/>
-              </a:rPr>
-              <a:t>Max Nonzero Factors</a:t>
-            </a:r>
-          </a:p>
-          <a:p>
-            <a:pPr>
-              <a:buFont typeface="Arial"/>
-              <a:buChar char="•"/>
-            </a:pPr>
-            <a:r>
-              <a:rPr lang="en-US" altLang="zh-CN" dirty="0">
-                <a:ea typeface="宋体"/>
-                <a:cs typeface="Calibri"/>
-              </a:rPr>
-              <a:t>If a limitation is needed (ex: C1 + C2 + C3 &lt; 100), add a limit in </a:t>
-            </a:r>
-            <a:r>
-              <a:rPr lang="en-US" altLang="zh-CN" b="1" dirty="0">
-                <a:ea typeface="宋体"/>
-                <a:cs typeface="Calibri"/>
-              </a:rPr>
-              <a:t>Parameter Limits</a:t>
-            </a:r>
-            <a:r>
-              <a:rPr lang="en-US" altLang="zh-CN" dirty="0">
-                <a:ea typeface="宋体"/>
-                <a:cs typeface="Calibri"/>
-              </a:rPr>
-              <a:t>, then select that limit next to the corresponding factors in </a:t>
-            </a:r>
-            <a:r>
-              <a:rPr lang="en-US" altLang="zh-CN" b="1" dirty="0">
-                <a:ea typeface="宋体"/>
-                <a:cs typeface="Calibri"/>
-              </a:rPr>
-              <a:t>Factor Min/Max</a:t>
-            </a:r>
-          </a:p>
-          <a:p>
-            <a:pPr>
-              <a:buFont typeface="Arial"/>
-              <a:buChar char="•"/>
-            </a:pPr>
-            <a:r>
-              <a:rPr lang="en-US" altLang="zh-CN" b="1" dirty="0">
-                <a:ea typeface="宋体"/>
-                <a:cs typeface="Calibri"/>
-              </a:rPr>
-              <a:t>Generate OACD Table</a:t>
-            </a:r>
-            <a:r>
-              <a:rPr lang="en-US" altLang="zh-CN" dirty="0">
-                <a:ea typeface="宋体"/>
-                <a:cs typeface="Calibri"/>
-              </a:rPr>
-              <a:t>! You may then </a:t>
-            </a:r>
-            <a:r>
-              <a:rPr lang="en-US" altLang="zh-CN" b="1" dirty="0">
-                <a:ea typeface="宋体"/>
-                <a:cs typeface="Calibri"/>
-              </a:rPr>
-              <a:t>Export as Excel </a:t>
-            </a:r>
-            <a:r>
-              <a:rPr lang="en-US" altLang="zh-CN" dirty="0">
-                <a:ea typeface="宋体"/>
-                <a:cs typeface="Calibri"/>
-              </a:rPr>
-              <a:t>to have your experiment runs as a .xlsx file.</a:t>
-            </a:r>
-          </a:p>
-          <a:p>
-            <a:pPr marL="0" indent="0">
-              <a:buNone/>
-            </a:pPr>
-            <a:endParaRPr lang="zh-CN" altLang="en-US" dirty="0">
-              <a:ea typeface="宋体"/>
-              <a:cs typeface="Calibri"/>
-            </a:endParaRPr>
+          <a:p>
+            <a:r>
+              <a:rPr lang="en-US" altLang="zh-CN"/>
+              <a:t>QR code for the google form</a:t>
+            </a:r>
+            <a:endParaRPr lang="en-US" altLang="zh-CN"/>
           </a:p>
         </p:txBody>
       </p:sp>
@@ -7035,7 +7073,7 @@
       </p:grpSpPr>
       <p:sp>
         <p:nvSpPr>
-          <p:cNvPr id="2" name="Title 1"/>
+          <p:cNvPr id="2" name="标题 1"/>
           <p:cNvSpPr>
             <a:spLocks noGrp="1"/>
           </p:cNvSpPr>
@@ -7049,15 +7087,26 @@
           <a:lstStyle/>
           <a:p>
             <a:r>
-              <a:rPr lang="en-US"/>
-              <a:t>Step 2 -- Load data</a:t>
-            </a:r>
-          </a:p>
-        </p:txBody>
-      </p:sp>
-      <p:sp>
-        <p:nvSpPr>
-          <p:cNvPr id="3" name="Content Placeholder 2"/>
+              <a:rPr lang="en-US" dirty="0">
+                <a:sym typeface="+mn-ea"/>
+              </a:rPr>
+              <a:t>Step 1  -- </a:t>
+            </a:r>
+            <a:r>
+              <a:rPr lang="en-US" altLang="zh-CN" dirty="0">
+                <a:ea typeface="宋体" panose="02010600030101010101" pitchFamily="2" charset="-122"/>
+              </a:rPr>
+              <a:t>OACD table generation</a:t>
+            </a:r>
+            <a:endParaRPr lang="en-US" altLang="zh-CN" dirty="0">
+              <a:ea typeface="宋体" panose="02010600030101010101" pitchFamily="2" charset="-122"/>
+            </a:endParaRPr>
+          </a:p>
+        </p:txBody>
+      </p:sp>
+      <p:sp>
+        <p:nvSpPr>
+          <p:cNvPr id="3" name="内容占位符 2"/>
           <p:cNvSpPr>
             <a:spLocks noGrp="1"/>
           </p:cNvSpPr>
@@ -7065,104 +7114,317 @@
             <p:ph idx="1"/>
           </p:nvPr>
         </p:nvSpPr>
-        <p:spPr/>
-        <p:txBody>
-          <a:bodyPr/>
-          <a:lstStyle/>
-          <a:p>
-            <a:r>
-              <a:rPr lang="en-US" altLang="en-US"/>
-              <a:t>Navigate to the</a:t>
-            </a:r>
-            <a:r>
-              <a:rPr lang="en-US"/>
-              <a:t> </a:t>
-            </a:r>
-            <a:r>
-              <a:rPr lang="en-US" b="1"/>
-              <a:t>CSR Integration</a:t>
-            </a:r>
-            <a:r>
-              <a:rPr lang="en-US"/>
-              <a:t> tab --&gt; Click on </a:t>
-            </a:r>
-            <a:r>
-              <a:rPr lang="en-US" b="1"/>
-              <a:t>Select Data File</a:t>
-            </a:r>
-            <a:r>
-              <a:rPr lang="en-US"/>
-              <a:t> --&gt; Choose the </a:t>
-            </a:r>
-            <a:r>
-              <a:rPr lang="en-US" b="1"/>
-              <a:t>.xlsx</a:t>
-            </a:r>
-            <a:r>
-              <a:rPr lang="en-US"/>
-              <a:t> file containing experimental data</a:t>
-            </a:r>
-          </a:p>
-          <a:p>
-            <a:r>
-              <a:rPr lang="en-US"/>
-              <a:t>The .xlsx file must follow the following format:</a:t>
-            </a:r>
-          </a:p>
-          <a:p>
-            <a:pPr lvl="1"/>
-            <a:r>
-              <a:rPr lang="en-US" altLang="en-US"/>
-              <a:t>The first row specifies the names of all factors and results</a:t>
-            </a:r>
-            <a:r>
-              <a:rPr lang="en-US"/>
-              <a:t> </a:t>
-            </a:r>
-          </a:p>
-          <a:p>
-            <a:pPr lvl="1"/>
-            <a:r>
-              <a:rPr lang="en-US"/>
-              <a:t>S</a:t>
-            </a:r>
-            <a:r>
-              <a:rPr lang="en-US" altLang="en-US"/>
-              <a:t>ubsequent rows contain the corresponding data entries.</a:t>
-            </a:r>
-          </a:p>
-          <a:p>
-            <a:r>
-              <a:rPr lang="en-US"/>
-              <a:t>Example:</a:t>
-            </a:r>
-          </a:p>
-        </p:txBody>
-      </p:sp>
-      <p:pic>
-        <p:nvPicPr>
-          <p:cNvPr id="5" name="Picture 4"/>
-          <p:cNvPicPr>
-            <a:picLocks noChangeAspect="1"/>
-          </p:cNvPicPr>
-          <p:nvPr/>
-        </p:nvPicPr>
-        <p:blipFill>
-          <a:blip r:embed="rId2"/>
-          <a:stretch>
-            <a:fillRect/>
-          </a:stretch>
-        </p:blipFill>
         <p:spPr>
           <a:xfrm>
-            <a:off x="4078605" y="4362450"/>
-            <a:ext cx="4827270" cy="2156460"/>
+            <a:off x="838200" y="1825625"/>
+            <a:ext cx="10515600" cy="4836246"/>
           </a:xfrm>
-          <a:prstGeom prst="rect">
-            <a:avLst/>
-          </a:prstGeom>
         </p:spPr>
-      </p:pic>
+        <p:txBody>
+          <a:bodyPr vert="horz" lIns="91440" tIns="45720" rIns="91440" bIns="45720" rtlCol="0" anchor="t">
+            <a:normAutofit fontScale="92500" lnSpcReduction="20000"/>
+          </a:bodyPr>
+          <a:lstStyle/>
+          <a:p>
+            <a:pPr marL="0" indent="0">
+              <a:buNone/>
+            </a:pPr>
+            <a:r>
+              <a:rPr lang="zh-CN" altLang="en-US">
+                <a:ea typeface="宋体" panose="02010600030101010101" pitchFamily="2" charset="-122"/>
+                <a:cs typeface="Calibri" panose="020F0502020204030204"/>
+              </a:rPr>
+              <a:t>Use OACD generation to create correct runs for your experiment</a:t>
+            </a:r>
+            <a:endParaRPr lang="zh-CN" altLang="en-US">
+              <a:ea typeface="宋体" panose="02010600030101010101" pitchFamily="2" charset="-122"/>
+              <a:cs typeface="Calibri" panose="020F0502020204030204"/>
+            </a:endParaRPr>
+          </a:p>
+          <a:p>
+            <a:pPr>
+              <a:buFont typeface="Arial" panose="020B0604020202020204"/>
+              <a:buChar char="•"/>
+            </a:pPr>
+            <a:r>
+              <a:rPr lang="en-US" altLang="zh-CN" dirty="0">
+                <a:ea typeface="宋体" panose="02010600030101010101" pitchFamily="2" charset="-122"/>
+                <a:cs typeface="Calibri" panose="020F0502020204030204"/>
+              </a:rPr>
+              <a:t>Navigate to the </a:t>
+            </a:r>
+            <a:r>
+              <a:rPr lang="en-US" altLang="zh-CN" b="1" dirty="0">
+                <a:ea typeface="宋体" panose="02010600030101010101" pitchFamily="2" charset="-122"/>
+                <a:cs typeface="Calibri" panose="020F0502020204030204"/>
+              </a:rPr>
+              <a:t>OACD Table Builder</a:t>
+            </a:r>
+            <a:r>
+              <a:rPr lang="en-US" altLang="zh-CN" dirty="0">
+                <a:ea typeface="宋体" panose="02010600030101010101" pitchFamily="2" charset="-122"/>
+                <a:cs typeface="Calibri" panose="020F0502020204030204"/>
+              </a:rPr>
+              <a:t> tab</a:t>
+            </a:r>
+            <a:endParaRPr lang="en-US" altLang="zh-CN" dirty="0">
+              <a:ea typeface="宋体" panose="02010600030101010101" pitchFamily="2" charset="-122"/>
+              <a:cs typeface="Calibri" panose="020F0502020204030204"/>
+            </a:endParaRPr>
+          </a:p>
+          <a:p>
+            <a:pPr>
+              <a:buFont typeface="Arial" panose="020B0604020202020204"/>
+              <a:buChar char="•"/>
+            </a:pPr>
+            <a:r>
+              <a:rPr lang="en-US" altLang="zh-CN" dirty="0">
+                <a:ea typeface="宋体" panose="02010600030101010101" pitchFamily="2" charset="-122"/>
+                <a:cs typeface="Calibri" panose="020F0502020204030204"/>
+              </a:rPr>
+              <a:t>Select </a:t>
+            </a:r>
+            <a:r>
+              <a:rPr lang="en-US" altLang="zh-CN" b="1" dirty="0">
+                <a:ea typeface="宋体" panose="02010600030101010101" pitchFamily="2" charset="-122"/>
+                <a:cs typeface="Calibri" panose="020F0502020204030204"/>
+              </a:rPr>
+              <a:t>Number of Factors </a:t>
+            </a:r>
+            <a:r>
+              <a:rPr lang="en-US" altLang="zh-CN" dirty="0">
+                <a:ea typeface="宋体" panose="02010600030101010101" pitchFamily="2" charset="-122"/>
+                <a:cs typeface="Calibri" panose="020F0502020204030204"/>
+              </a:rPr>
+              <a:t>–</a:t>
+            </a:r>
+            <a:r>
+              <a:rPr lang="en-US" altLang="zh-CN" b="1" dirty="0">
+                <a:ea typeface="宋体" panose="02010600030101010101" pitchFamily="2" charset="-122"/>
+                <a:cs typeface="Calibri" panose="020F0502020204030204"/>
+              </a:rPr>
+              <a:t> </a:t>
+            </a:r>
+            <a:r>
+              <a:rPr lang="en-US" altLang="zh-CN" dirty="0">
+                <a:ea typeface="宋体" panose="02010600030101010101" pitchFamily="2" charset="-122"/>
+                <a:cs typeface="Calibri" panose="020F0502020204030204"/>
+              </a:rPr>
+              <a:t>number of variables in the system</a:t>
+            </a:r>
+            <a:endParaRPr lang="en-US" altLang="zh-CN" dirty="0">
+              <a:ea typeface="宋体" panose="02010600030101010101" pitchFamily="2" charset="-122"/>
+              <a:cs typeface="Calibri" panose="020F0502020204030204"/>
+            </a:endParaRPr>
+          </a:p>
+          <a:p>
+            <a:pPr>
+              <a:buFont typeface="Arial" panose="020B0604020202020204"/>
+              <a:buChar char="•"/>
+            </a:pPr>
+            <a:r>
+              <a:rPr lang="en-US" altLang="zh-CN" dirty="0">
+                <a:ea typeface="宋体" panose="02010600030101010101" pitchFamily="2" charset="-122"/>
+                <a:cs typeface="Calibri" panose="020F0502020204030204"/>
+              </a:rPr>
+              <a:t>Select </a:t>
+            </a:r>
+            <a:r>
+              <a:rPr lang="en-US" altLang="zh-CN" b="1" dirty="0">
+                <a:ea typeface="宋体" panose="02010600030101010101" pitchFamily="2" charset="-122"/>
+                <a:cs typeface="Calibri" panose="020F0502020204030204"/>
+              </a:rPr>
+              <a:t>Table Size</a:t>
+            </a:r>
+            <a:r>
+              <a:rPr lang="en-US" altLang="zh-CN" dirty="0">
+                <a:ea typeface="宋体" panose="02010600030101010101" pitchFamily="2" charset="-122"/>
+                <a:cs typeface="Calibri" panose="020F0502020204030204"/>
+              </a:rPr>
+              <a:t> – this scales the number of runs in the experiment</a:t>
+            </a:r>
+            <a:endParaRPr lang="en-US" altLang="zh-CN" dirty="0">
+              <a:ea typeface="宋体" panose="02010600030101010101" pitchFamily="2" charset="-122"/>
+              <a:cs typeface="Calibri" panose="020F0502020204030204"/>
+            </a:endParaRPr>
+          </a:p>
+          <a:p>
+            <a:pPr>
+              <a:buFont typeface="Arial" panose="020B0604020202020204"/>
+              <a:buChar char="•"/>
+            </a:pPr>
+            <a:r>
+              <a:rPr lang="en-US" dirty="0">
+                <a:ea typeface="Calibri" panose="020F0502020204030204"/>
+                <a:cs typeface="Calibri" panose="020F0502020204030204"/>
+              </a:rPr>
+              <a:t>Under </a:t>
+            </a:r>
+            <a:r>
+              <a:rPr lang="en-US" b="1" dirty="0">
+                <a:ea typeface="Calibri" panose="020F0502020204030204"/>
+                <a:cs typeface="Calibri" panose="020F0502020204030204"/>
+              </a:rPr>
+              <a:t>Factor Min/Max</a:t>
+            </a:r>
+            <a:r>
+              <a:rPr lang="en-US" dirty="0">
+                <a:ea typeface="Calibri" panose="020F0502020204030204"/>
+                <a:cs typeface="Calibri" panose="020F0502020204030204"/>
+              </a:rPr>
+              <a:t>,</a:t>
+            </a:r>
+            <a:r>
+              <a:rPr lang="en-US" b="1" dirty="0">
+                <a:ea typeface="Calibri" panose="020F0502020204030204"/>
+                <a:cs typeface="Calibri" panose="020F0502020204030204"/>
+              </a:rPr>
+              <a:t> </a:t>
+            </a:r>
+            <a:r>
+              <a:rPr lang="en-US" dirty="0">
+                <a:ea typeface="Calibri" panose="020F0502020204030204"/>
+                <a:cs typeface="Calibri" panose="020F0502020204030204"/>
+              </a:rPr>
+              <a:t>s</a:t>
+            </a:r>
+            <a:r>
+              <a:rPr lang="en-US" altLang="zh-CN" dirty="0">
+                <a:ea typeface="宋体" panose="02010600030101010101" pitchFamily="2" charset="-122"/>
+                <a:cs typeface="Calibri" panose="020F0502020204030204"/>
+              </a:rPr>
+              <a:t>et min and max values for each factor. Alternatively, you can import </a:t>
+            </a:r>
+            <a:r>
+              <a:rPr lang="en-US" altLang="zh-CN" dirty="0" err="1">
+                <a:ea typeface="宋体" panose="02010600030101010101" pitchFamily="2" charset="-122"/>
+                <a:cs typeface="Calibri" panose="020F0502020204030204"/>
+              </a:rPr>
+              <a:t>extrenum</a:t>
+            </a:r>
+            <a:r>
+              <a:rPr lang="en-US" altLang="zh-CN" dirty="0">
+                <a:ea typeface="宋体" panose="02010600030101010101" pitchFamily="2" charset="-122"/>
+                <a:cs typeface="Calibri" panose="020F0502020204030204"/>
+              </a:rPr>
+              <a:t> from a .xlsx file.</a:t>
+            </a:r>
+            <a:endParaRPr lang="en-US" altLang="zh-CN" b="1" dirty="0">
+              <a:ea typeface="宋体" panose="02010600030101010101" pitchFamily="2" charset="-122"/>
+              <a:cs typeface="Calibri" panose="020F0502020204030204"/>
+            </a:endParaRPr>
+          </a:p>
+          <a:p>
+            <a:pPr>
+              <a:buFont typeface="Arial" panose="020B0604020202020204"/>
+              <a:buChar char="•"/>
+            </a:pPr>
+            <a:r>
+              <a:rPr lang="en-US" altLang="zh-CN" dirty="0">
+                <a:ea typeface="宋体" panose="02010600030101010101" pitchFamily="2" charset="-122"/>
+                <a:cs typeface="Calibri" panose="020F0502020204030204"/>
+              </a:rPr>
+              <a:t>If you only need a certain amount of factors to be non-zero, you can remove all experiments with more using </a:t>
+            </a:r>
+            <a:r>
+              <a:rPr lang="en-US" altLang="zh-CN" b="1" dirty="0">
+                <a:ea typeface="宋体" panose="02010600030101010101" pitchFamily="2" charset="-122"/>
+                <a:cs typeface="Calibri" panose="020F0502020204030204"/>
+              </a:rPr>
+              <a:t>Max Nonzero Factors</a:t>
+            </a:r>
+            <a:endParaRPr lang="en-US" altLang="zh-CN" b="1" dirty="0">
+              <a:ea typeface="宋体" panose="02010600030101010101" pitchFamily="2" charset="-122"/>
+              <a:cs typeface="Calibri" panose="020F0502020204030204"/>
+            </a:endParaRPr>
+          </a:p>
+          <a:p>
+            <a:pPr>
+              <a:buFont typeface="Arial" panose="020B0604020202020204"/>
+              <a:buChar char="•"/>
+            </a:pPr>
+            <a:r>
+              <a:rPr lang="en-US" altLang="zh-CN" dirty="0">
+                <a:ea typeface="宋体" panose="02010600030101010101" pitchFamily="2" charset="-122"/>
+                <a:cs typeface="Calibri" panose="020F0502020204030204"/>
+              </a:rPr>
+              <a:t>If a limitation is needed (ex: C1 + C2 + C3 &lt; 100), add a limit in </a:t>
+            </a:r>
+            <a:r>
+              <a:rPr lang="en-US" altLang="zh-CN" b="1" dirty="0">
+                <a:ea typeface="宋体" panose="02010600030101010101" pitchFamily="2" charset="-122"/>
+                <a:cs typeface="Calibri" panose="020F0502020204030204"/>
+              </a:rPr>
+              <a:t>Parameter Limits</a:t>
+            </a:r>
+            <a:r>
+              <a:rPr lang="en-US" altLang="zh-CN" dirty="0">
+                <a:ea typeface="宋体" panose="02010600030101010101" pitchFamily="2" charset="-122"/>
+                <a:cs typeface="Calibri" panose="020F0502020204030204"/>
+              </a:rPr>
+              <a:t>, then select that limit next to the corresponding factors in </a:t>
+            </a:r>
+            <a:r>
+              <a:rPr lang="en-US" altLang="zh-CN" b="1" dirty="0">
+                <a:ea typeface="宋体" panose="02010600030101010101" pitchFamily="2" charset="-122"/>
+                <a:cs typeface="Calibri" panose="020F0502020204030204"/>
+              </a:rPr>
+              <a:t>Factor Min/Max</a:t>
+            </a:r>
+            <a:endParaRPr lang="en-US" altLang="zh-CN" b="1" dirty="0">
+              <a:ea typeface="宋体" panose="02010600030101010101" pitchFamily="2" charset="-122"/>
+              <a:cs typeface="Calibri" panose="020F0502020204030204"/>
+            </a:endParaRPr>
+          </a:p>
+          <a:p>
+            <a:pPr>
+              <a:buFont typeface="Arial" panose="020B0604020202020204"/>
+              <a:buChar char="•"/>
+            </a:pPr>
+            <a:r>
+              <a:rPr lang="en-US" altLang="zh-CN" b="1" dirty="0">
+                <a:ea typeface="宋体" panose="02010600030101010101" pitchFamily="2" charset="-122"/>
+                <a:cs typeface="Calibri" panose="020F0502020204030204"/>
+              </a:rPr>
+              <a:t>Generate OACD Table</a:t>
+            </a:r>
+            <a:r>
+              <a:rPr lang="en-US" altLang="zh-CN" dirty="0">
+                <a:ea typeface="宋体" panose="02010600030101010101" pitchFamily="2" charset="-122"/>
+                <a:cs typeface="Calibri" panose="020F0502020204030204"/>
+              </a:rPr>
+              <a:t>! You may then </a:t>
+            </a:r>
+            <a:r>
+              <a:rPr lang="en-US" altLang="zh-CN" b="1" dirty="0">
+                <a:ea typeface="宋体" panose="02010600030101010101" pitchFamily="2" charset="-122"/>
+                <a:cs typeface="Calibri" panose="020F0502020204030204"/>
+              </a:rPr>
+              <a:t>Export as Excel </a:t>
+            </a:r>
+            <a:r>
+              <a:rPr lang="en-US" altLang="zh-CN" dirty="0">
+                <a:ea typeface="宋体" panose="02010600030101010101" pitchFamily="2" charset="-122"/>
+                <a:cs typeface="Calibri" panose="020F0502020204030204"/>
+              </a:rPr>
+              <a:t>to have your experiment runs as a .xlsx file.</a:t>
+            </a:r>
+            <a:endParaRPr lang="en-US" altLang="zh-CN" dirty="0">
+              <a:ea typeface="宋体" panose="02010600030101010101" pitchFamily="2" charset="-122"/>
+              <a:cs typeface="Calibri" panose="020F0502020204030204"/>
+            </a:endParaRPr>
+          </a:p>
+          <a:p>
+            <a:pPr marL="0" indent="0">
+              <a:buNone/>
+            </a:pPr>
+            <a:endParaRPr lang="zh-CN" altLang="en-US" dirty="0">
+              <a:ea typeface="宋体" panose="02010600030101010101" pitchFamily="2" charset="-122"/>
+              <a:cs typeface="Calibri" panose="020F0502020204030204"/>
+            </a:endParaRPr>
+          </a:p>
+        </p:txBody>
+      </p:sp>
     </p:spTree>
   </p:cSld>
   <p:clrMapOvr>
@@ -7172,49 +7434,49 @@
 </file>
 
 <file path=ppt/tags/tag1.xml><?xml version="1.0" encoding="utf-8"?>
-<p:tagLst xmlns:a="http://schemas.openxmlformats.org/drawingml/2006/main" xmlns:r="http://schemas.openxmlformats.org/officeDocument/2006/relationships" xmlns:p="http://schemas.openxmlformats.org/presentationml/2006/main">
+<p:tagLst xmlns:p="http://schemas.openxmlformats.org/presentationml/2006/main">
   <p:tag name="KSO_WM_DIAGRAM_VIRTUALLY_FRAME" val="{&quot;height&quot;:171.35,&quot;left&quot;:165.05,&quot;top&quot;:244.25,&quot;width&quot;:746.2}"/>
 </p:tagLst>
 </file>
 
 <file path=ppt/tags/tag2.xml><?xml version="1.0" encoding="utf-8"?>
-<p:tagLst xmlns:a="http://schemas.openxmlformats.org/drawingml/2006/main" xmlns:r="http://schemas.openxmlformats.org/officeDocument/2006/relationships" xmlns:p="http://schemas.openxmlformats.org/presentationml/2006/main">
+<p:tagLst xmlns:p="http://schemas.openxmlformats.org/presentationml/2006/main">
   <p:tag name="KSO_WM_DIAGRAM_VIRTUALLY_FRAME" val="{&quot;height&quot;:171.35,&quot;left&quot;:165.05,&quot;top&quot;:244.25,&quot;width&quot;:746.2}"/>
 </p:tagLst>
 </file>
 
 <file path=ppt/tags/tag3.xml><?xml version="1.0" encoding="utf-8"?>
-<p:tagLst xmlns:a="http://schemas.openxmlformats.org/drawingml/2006/main" xmlns:r="http://schemas.openxmlformats.org/officeDocument/2006/relationships" xmlns:p="http://schemas.openxmlformats.org/presentationml/2006/main">
+<p:tagLst xmlns:p="http://schemas.openxmlformats.org/presentationml/2006/main">
   <p:tag name="KSO_WM_DIAGRAM_VIRTUALLY_FRAME" val="{&quot;height&quot;:171.35,&quot;left&quot;:165.05,&quot;top&quot;:244.25,&quot;width&quot;:746.2}"/>
 </p:tagLst>
 </file>
 
 <file path=ppt/tags/tag4.xml><?xml version="1.0" encoding="utf-8"?>
-<p:tagLst xmlns:a="http://schemas.openxmlformats.org/drawingml/2006/main" xmlns:r="http://schemas.openxmlformats.org/officeDocument/2006/relationships" xmlns:p="http://schemas.openxmlformats.org/presentationml/2006/main">
+<p:tagLst xmlns:p="http://schemas.openxmlformats.org/presentationml/2006/main">
   <p:tag name="KSO_WM_DIAGRAM_VIRTUALLY_FRAME" val="{&quot;height&quot;:171.35,&quot;left&quot;:165.05,&quot;top&quot;:244.25,&quot;width&quot;:746.2}"/>
 </p:tagLst>
 </file>
 
 <file path=ppt/tags/tag5.xml><?xml version="1.0" encoding="utf-8"?>
-<p:tagLst xmlns:a="http://schemas.openxmlformats.org/drawingml/2006/main" xmlns:r="http://schemas.openxmlformats.org/officeDocument/2006/relationships" xmlns:p="http://schemas.openxmlformats.org/presentationml/2006/main">
+<p:tagLst xmlns:p="http://schemas.openxmlformats.org/presentationml/2006/main">
   <p:tag name="KSO_WM_DIAGRAM_VIRTUALLY_FRAME" val="{&quot;height&quot;:171.35,&quot;left&quot;:165.05,&quot;top&quot;:244.25,&quot;width&quot;:746.2}"/>
 </p:tagLst>
 </file>
 
 <file path=ppt/tags/tag6.xml><?xml version="1.0" encoding="utf-8"?>
-<p:tagLst xmlns:a="http://schemas.openxmlformats.org/drawingml/2006/main" xmlns:r="http://schemas.openxmlformats.org/officeDocument/2006/relationships" xmlns:p="http://schemas.openxmlformats.org/presentationml/2006/main">
+<p:tagLst xmlns:p="http://schemas.openxmlformats.org/presentationml/2006/main">
   <p:tag name="KSO_WM_DIAGRAM_VIRTUALLY_FRAME" val="{&quot;height&quot;:171.35,&quot;left&quot;:165.05,&quot;top&quot;:244.25,&quot;width&quot;:746.2}"/>
 </p:tagLst>
 </file>
 
 <file path=ppt/tags/tag7.xml><?xml version="1.0" encoding="utf-8"?>
-<p:tagLst xmlns:a="http://schemas.openxmlformats.org/drawingml/2006/main" xmlns:r="http://schemas.openxmlformats.org/officeDocument/2006/relationships" xmlns:p="http://schemas.openxmlformats.org/presentationml/2006/main">
+<p:tagLst xmlns:p="http://schemas.openxmlformats.org/presentationml/2006/main">
   <p:tag name="KSO_WM_DIAGRAM_VIRTUALLY_FRAME" val="{&quot;height&quot;:171.35,&quot;left&quot;:165.05,&quot;top&quot;:244.25,&quot;width&quot;:746.2}"/>
 </p:tagLst>
 </file>
 
 <file path=ppt/tags/tag8.xml><?xml version="1.0" encoding="utf-8"?>
-<p:tagLst xmlns:a="http://schemas.openxmlformats.org/drawingml/2006/main" xmlns:r="http://schemas.openxmlformats.org/officeDocument/2006/relationships" xmlns:p="http://schemas.openxmlformats.org/presentationml/2006/main">
+<p:tagLst xmlns:p="http://schemas.openxmlformats.org/presentationml/2006/main">
   <p:tag name="KSO_WM_DIAGRAM_VIRTUALLY_FRAME" val="{&quot;height&quot;:171.35,&quot;left&quot;:165.05,&quot;top&quot;:244.25,&quot;width&quot;:746.2}"/>
 </p:tagLst>
 </file>
@@ -7470,8 +7732,6 @@
       </a:bgFillStyleLst>
     </a:fmtScheme>
   </a:themeElements>
-  <a:objectDefaults/>
-  <a:extraClrSchemeLst/>
   <a:extLst>
     <a:ext uri="{05A4C25C-085E-4340-85A3-A5531E510DB2}">
       <thm15:themeFamily xmlns:thm15="http://schemas.microsoft.com/office/thememl/2012/main" name="Office Theme" id="{62F939B6-93AF-4DB8-9C6B-D6C7DFDC589F}" vid="{4A3C46E8-61CC-4603-A589-7422A47A8E4A}"/>
@@ -7731,8 +7991,6 @@
       </a:bgFillStyleLst>
     </a:fmtScheme>
   </a:themeElements>
-  <a:objectDefaults/>
-  <a:extraClrSchemeLst/>
   <a:extLst>
     <a:ext uri="{05A4C25C-085E-4340-85A3-A5531E510DB2}">
       <thm15:themeFamily xmlns:thm15="http://schemas.microsoft.com/office/thememl/2012/main" name="Office Theme" id="{62F939B6-93AF-4DB8-9C6B-D6C7DFDC589F}" vid="{4A3C46E8-61CC-4603-A589-7422A47A8E4A}"/>
@@ -7992,8 +8250,6 @@
       </a:bgFillStyleLst>
     </a:fmtScheme>
   </a:themeElements>
-  <a:objectDefaults/>
-  <a:extraClrSchemeLst/>
   <a:extLst>
     <a:ext uri="{05A4C25C-085E-4340-85A3-A5531E510DB2}">
       <thm15:themeFamily xmlns:thm15="http://schemas.microsoft.com/office/thememl/2012/main" name="Office Theme" id="{62F939B6-93AF-4DB8-9C6B-D6C7DFDC589F}" vid="{4A3C46E8-61CC-4603-A589-7422A47A8E4A}"/>

</xml_diff>